<commit_message>
Building models for prediction. Added functions to create data sets, now testing ML models
</commit_message>
<xml_diff>
--- a/TDI/TDI_pitch.pptx
+++ b/TDI/TDI_pitch.pptx
@@ -5,7 +5,7 @@
     <p:sldMasterId id="2147483660" r:id="rId1"/>
   </p:sldMasterIdLst>
   <p:notesMasterIdLst>
-    <p:notesMasterId r:id="rId8"/>
+    <p:notesMasterId r:id="rId9"/>
   </p:notesMasterIdLst>
   <p:sldIdLst>
     <p:sldId id="260" r:id="rId2"/>
@@ -13,7 +13,8 @@
     <p:sldId id="259" r:id="rId4"/>
     <p:sldId id="256" r:id="rId5"/>
     <p:sldId id="257" r:id="rId6"/>
-    <p:sldId id="262" r:id="rId7"/>
+    <p:sldId id="263" r:id="rId7"/>
+    <p:sldId id="262" r:id="rId8"/>
   </p:sldIdLst>
   <p:sldSz cx="12192000" cy="6858000"/>
   <p:notesSz cx="6858000" cy="9144000"/>
@@ -202,7 +203,7 @@
           <a:p>
             <a:fld id="{DF3E082A-6A49-4DD0-9794-99AC4565B14C}" type="datetimeFigureOut">
               <a:rPr lang="en-US" smtClean="0"/>
-              <a:t>10/8/2021</a:t>
+              <a:t>10/14/2021</a:t>
             </a:fld>
             <a:endParaRPr lang="en-US"/>
           </a:p>
@@ -513,39 +514,6 @@
           <a:bodyPr/>
           <a:lstStyle/>
           <a:p>
-            <a:r>
-              <a:rPr lang="en-US" dirty="0"/>
-              <a:t>Skip the intro, avoid the academic ness.</a:t>
-            </a:r>
-          </a:p>
-          <a:p>
-            <a:endParaRPr lang="en-US" dirty="0"/>
-          </a:p>
-          <a:p>
-            <a:r>
-              <a:rPr lang="en-US" dirty="0"/>
-              <a:t>Just start with – people play this, people do this, </a:t>
-            </a:r>
-          </a:p>
-          <a:p>
-            <a:endParaRPr lang="en-US" dirty="0"/>
-          </a:p>
-          <a:p>
-            <a:endParaRPr lang="en-US" dirty="0"/>
-          </a:p>
-          <a:p>
-            <a:r>
-              <a:rPr lang="en-US" dirty="0"/>
-              <a:t>Try to focus it and get the story correct</a:t>
-            </a:r>
-          </a:p>
-          <a:p>
-            <a:endParaRPr lang="en-US" dirty="0"/>
-          </a:p>
-          <a:p>
-            <a:endParaRPr lang="en-US" dirty="0"/>
-          </a:p>
-          <a:p>
             <a:endParaRPr lang="en-US" dirty="0"/>
           </a:p>
         </p:txBody>
@@ -632,7 +600,7 @@
           <a:p>
             <a:r>
               <a:rPr lang="en-US" dirty="0"/>
-              <a:t>Speed this up, need to tell them why they care early on</a:t>
+              <a:t>World of warcraft is an online video game with millions of active unique users every month.</a:t>
             </a:r>
           </a:p>
           <a:p>
@@ -641,13 +609,23 @@
           <a:p>
             <a:r>
               <a:rPr lang="en-US" dirty="0"/>
-              <a:t>Talk about why they should care here, need to talk </a:t>
-            </a:r>
-            <a:r>
-              <a:rPr lang="en-US"/>
-              <a:t>more about why to fix this</a:t>
-            </a:r>
+              <a:t>Within the game, players form into groups and attempt to defeat encounters by ‘pulling’ the encounter multiple times slowly progressing until they defeat it.</a:t>
+            </a:r>
+          </a:p>
+          <a:p>
             <a:endParaRPr lang="en-US" dirty="0"/>
+          </a:p>
+          <a:p>
+            <a:r>
+              <a:rPr lang="en-US" dirty="0"/>
+              <a:t>However, understanding a groups progress over time is difficult with current tooling.</a:t>
+            </a:r>
+          </a:p>
+          <a:p>
+            <a:r>
+              <a:rPr lang="en-US" dirty="0"/>
+              <a:t>This image shows the current system, which breaks encounters down by day, making it difficult to know how groups progress over time.</a:t>
+            </a:r>
           </a:p>
         </p:txBody>
       </p:sp>
@@ -733,19 +711,58 @@
           <a:p>
             <a:r>
               <a:rPr lang="en-US" dirty="0"/>
-              <a:t>To much on the method, need more on the business side of things</a:t>
+              <a:t>What I propose is building an interactive tool that allows players to better understand their groups progression from a much higher level.</a:t>
             </a:r>
           </a:p>
           <a:p>
             <a:endParaRPr lang="en-US" dirty="0"/>
           </a:p>
           <a:p>
+            <a:r>
+              <a:rPr lang="en-US" dirty="0"/>
+              <a:t>This will allow players a few things.</a:t>
+            </a:r>
+          </a:p>
+          <a:p>
             <a:endParaRPr lang="en-US" dirty="0"/>
           </a:p>
           <a:p>
             <a:r>
               <a:rPr lang="en-US" dirty="0"/>
-              <a:t>Change color/size to make it bigger for this</a:t>
+              <a:t>First is a better understanding of their progression.</a:t>
+            </a:r>
+          </a:p>
+          <a:p>
+            <a:r>
+              <a:rPr lang="en-US" dirty="0"/>
+              <a:t>Second, the ability to compare themselves to friends or other groups more easily.</a:t>
+            </a:r>
+          </a:p>
+          <a:p>
+            <a:r>
+              <a:rPr lang="en-US" dirty="0"/>
+              <a:t>And last, the ability to have a prediction of the chance they will succeed in the encounter.</a:t>
+            </a:r>
+          </a:p>
+          <a:p>
+            <a:endParaRPr lang="en-US" dirty="0"/>
+          </a:p>
+          <a:p>
+            <a:r>
+              <a:rPr lang="en-US" dirty="0"/>
+              <a:t>Here I’m showing an example for a group’s progression over time of the first two encounters.</a:t>
+            </a:r>
+          </a:p>
+          <a:p>
+            <a:r>
+              <a:rPr lang="en-US" dirty="0"/>
+              <a:t>We can see how groups progress over the entire time, instead of just on the specific day/week.</a:t>
+            </a:r>
+          </a:p>
+          <a:p>
+            <a:r>
+              <a:rPr lang="en-US" dirty="0"/>
+              <a:t>This visualization of group progression over time much more easily digestible than previous methods.</a:t>
             </a:r>
           </a:p>
         </p:txBody>
@@ -767,7 +784,7 @@
           <a:p>
             <a:fld id="{FCF85715-091D-4CC5-B0BD-9CC5D11D4EDF}" type="slidenum">
               <a:rPr lang="en-US" smtClean="0"/>
-              <a:t>4</a:t>
+              <a:t>3</a:t>
             </a:fld>
             <a:endParaRPr lang="en-US"/>
           </a:p>
@@ -776,7 +793,7 @@
     </p:spTree>
     <p:extLst>
       <p:ext uri="{BB962C8B-B14F-4D97-AF65-F5344CB8AC3E}">
-        <p14:creationId xmlns:p14="http://schemas.microsoft.com/office/powerpoint/2010/main" val="2260032227"/>
+        <p14:creationId xmlns:p14="http://schemas.microsoft.com/office/powerpoint/2010/main" val="2999499287"/>
       </p:ext>
     </p:extLst>
   </p:cSld>
@@ -831,12 +848,122 @@
           <a:lstStyle/>
           <a:p>
             <a:r>
-              <a:rPr lang="en-US" dirty="0" err="1"/>
-              <a:t>TALk</a:t>
-            </a:r>
-            <a:r>
               <a:rPr lang="en-US" dirty="0"/>
-              <a:t> about computational model here?</a:t>
+              <a:t>To much on the method, need more on the business side of things</a:t>
+            </a:r>
+          </a:p>
+          <a:p>
+            <a:endParaRPr lang="en-US" dirty="0"/>
+          </a:p>
+          <a:p>
+            <a:endParaRPr lang="en-US" dirty="0"/>
+          </a:p>
+          <a:p>
+            <a:r>
+              <a:rPr lang="en-US" dirty="0"/>
+              <a:t>Change color/size to make it bigger for this</a:t>
+            </a:r>
+          </a:p>
+        </p:txBody>
+      </p:sp>
+      <p:sp>
+        <p:nvSpPr>
+          <p:cNvPr id="4" name="Slide Number Placeholder 3"/>
+          <p:cNvSpPr>
+            <a:spLocks noGrp="1"/>
+          </p:cNvSpPr>
+          <p:nvPr>
+            <p:ph type="sldNum" sz="quarter" idx="5"/>
+          </p:nvPr>
+        </p:nvSpPr>
+        <p:spPr/>
+        <p:txBody>
+          <a:bodyPr/>
+          <a:lstStyle/>
+          <a:p>
+            <a:fld id="{FCF85715-091D-4CC5-B0BD-9CC5D11D4EDF}" type="slidenum">
+              <a:rPr lang="en-US" smtClean="0"/>
+              <a:t>4</a:t>
+            </a:fld>
+            <a:endParaRPr lang="en-US"/>
+          </a:p>
+        </p:txBody>
+      </p:sp>
+    </p:spTree>
+    <p:extLst>
+      <p:ext uri="{BB962C8B-B14F-4D97-AF65-F5344CB8AC3E}">
+        <p14:creationId xmlns:p14="http://schemas.microsoft.com/office/powerpoint/2010/main" val="2260032227"/>
+      </p:ext>
+    </p:extLst>
+  </p:cSld>
+  <p:clrMapOvr>
+    <a:masterClrMapping/>
+  </p:clrMapOvr>
+</p:notes>
+</file>
+
+<file path=ppt/notesSlides/notesSlide5.xml><?xml version="1.0" encoding="utf-8"?>
+<p:notes xmlns:a="http://schemas.openxmlformats.org/drawingml/2006/main" xmlns:r="http://schemas.openxmlformats.org/officeDocument/2006/relationships" xmlns:p="http://schemas.openxmlformats.org/presentationml/2006/main">
+  <p:cSld>
+    <p:spTree>
+      <p:nvGrpSpPr>
+        <p:cNvPr id="1" name=""/>
+        <p:cNvGrpSpPr/>
+        <p:nvPr/>
+      </p:nvGrpSpPr>
+      <p:grpSpPr>
+        <a:xfrm>
+          <a:off x="0" y="0"/>
+          <a:ext cx="0" cy="0"/>
+          <a:chOff x="0" y="0"/>
+          <a:chExt cx="0" cy="0"/>
+        </a:xfrm>
+      </p:grpSpPr>
+      <p:sp>
+        <p:nvSpPr>
+          <p:cNvPr id="2" name="Slide Image Placeholder 1"/>
+          <p:cNvSpPr>
+            <a:spLocks noGrp="1" noRot="1" noChangeAspect="1"/>
+          </p:cNvSpPr>
+          <p:nvPr>
+            <p:ph type="sldImg"/>
+          </p:nvPr>
+        </p:nvSpPr>
+        <p:spPr/>
+      </p:sp>
+      <p:sp>
+        <p:nvSpPr>
+          <p:cNvPr id="3" name="Notes Placeholder 2"/>
+          <p:cNvSpPr>
+            <a:spLocks noGrp="1"/>
+          </p:cNvSpPr>
+          <p:nvPr>
+            <p:ph type="body" idx="1"/>
+          </p:nvPr>
+        </p:nvSpPr>
+        <p:spPr/>
+        <p:txBody>
+          <a:bodyPr/>
+          <a:lstStyle/>
+          <a:p>
+            <a:r>
+              <a:rPr lang="en-US" dirty="0"/>
+              <a:t>Along with showing individual group data, we can present the aggregated group data on a per encounter basis.</a:t>
+            </a:r>
+          </a:p>
+          <a:p>
+            <a:r>
+              <a:rPr lang="en-US" dirty="0"/>
+              <a:t>This allows groups to understand how they compare to the average in pull count, total progression time, along with average level in the game.</a:t>
+            </a:r>
+          </a:p>
+          <a:p>
+            <a:endParaRPr lang="en-US" dirty="0"/>
+          </a:p>
+          <a:p>
+            <a:r>
+              <a:rPr lang="en-US" dirty="0"/>
+              <a:t>We can also integrate this with individual groups, to view how an individual group is comparing to the rest of everyone.</a:t>
             </a:r>
           </a:p>
         </p:txBody>
@@ -868,6 +995,213 @@
     <p:extLst>
       <p:ext uri="{BB962C8B-B14F-4D97-AF65-F5344CB8AC3E}">
         <p14:creationId xmlns:p14="http://schemas.microsoft.com/office/powerpoint/2010/main" val="1761263340"/>
+      </p:ext>
+    </p:extLst>
+  </p:cSld>
+  <p:clrMapOvr>
+    <a:masterClrMapping/>
+  </p:clrMapOvr>
+</p:notes>
+</file>
+
+<file path=ppt/notesSlides/notesSlide6.xml><?xml version="1.0" encoding="utf-8"?>
+<p:notes xmlns:a="http://schemas.openxmlformats.org/drawingml/2006/main" xmlns:r="http://schemas.openxmlformats.org/officeDocument/2006/relationships" xmlns:p="http://schemas.openxmlformats.org/presentationml/2006/main">
+  <p:cSld>
+    <p:spTree>
+      <p:nvGrpSpPr>
+        <p:cNvPr id="1" name=""/>
+        <p:cNvGrpSpPr/>
+        <p:nvPr/>
+      </p:nvGrpSpPr>
+      <p:grpSpPr>
+        <a:xfrm>
+          <a:off x="0" y="0"/>
+          <a:ext cx="0" cy="0"/>
+          <a:chOff x="0" y="0"/>
+          <a:chExt cx="0" cy="0"/>
+        </a:xfrm>
+      </p:grpSpPr>
+      <p:sp>
+        <p:nvSpPr>
+          <p:cNvPr id="2" name="Slide Image Placeholder 1"/>
+          <p:cNvSpPr>
+            <a:spLocks noGrp="1" noRot="1" noChangeAspect="1"/>
+          </p:cNvSpPr>
+          <p:nvPr>
+            <p:ph type="sldImg"/>
+          </p:nvPr>
+        </p:nvSpPr>
+        <p:spPr/>
+      </p:sp>
+      <p:sp>
+        <p:nvSpPr>
+          <p:cNvPr id="3" name="Notes Placeholder 2"/>
+          <p:cNvSpPr>
+            <a:spLocks noGrp="1"/>
+          </p:cNvSpPr>
+          <p:nvPr>
+            <p:ph type="body" idx="1"/>
+          </p:nvPr>
+        </p:nvSpPr>
+        <p:spPr/>
+        <p:txBody>
+          <a:bodyPr/>
+          <a:lstStyle/>
+          <a:p>
+            <a:r>
+              <a:rPr lang="en-US" dirty="0"/>
+              <a:t>As well as showing average time to defeat the encounter, we can provide information of the approximate group composition of groups that have defeated the encounter.</a:t>
+            </a:r>
+          </a:p>
+          <a:p>
+            <a:endParaRPr lang="en-US" dirty="0"/>
+          </a:p>
+          <a:p>
+            <a:r>
+              <a:rPr lang="en-US" dirty="0"/>
+              <a:t>Using this aggregated data, I can develop a predictive model that can be used to individual groups to predict their chance of success.</a:t>
+            </a:r>
+          </a:p>
+        </p:txBody>
+      </p:sp>
+      <p:sp>
+        <p:nvSpPr>
+          <p:cNvPr id="4" name="Slide Number Placeholder 3"/>
+          <p:cNvSpPr>
+            <a:spLocks noGrp="1"/>
+          </p:cNvSpPr>
+          <p:nvPr>
+            <p:ph type="sldNum" sz="quarter" idx="5"/>
+          </p:nvPr>
+        </p:nvSpPr>
+        <p:spPr/>
+        <p:txBody>
+          <a:bodyPr/>
+          <a:lstStyle/>
+          <a:p>
+            <a:fld id="{FCF85715-091D-4CC5-B0BD-9CC5D11D4EDF}" type="slidenum">
+              <a:rPr lang="en-US" smtClean="0"/>
+              <a:t>6</a:t>
+            </a:fld>
+            <a:endParaRPr lang="en-US"/>
+          </a:p>
+        </p:txBody>
+      </p:sp>
+    </p:spTree>
+    <p:extLst>
+      <p:ext uri="{BB962C8B-B14F-4D97-AF65-F5344CB8AC3E}">
+        <p14:creationId xmlns:p14="http://schemas.microsoft.com/office/powerpoint/2010/main" val="808985982"/>
+      </p:ext>
+    </p:extLst>
+  </p:cSld>
+  <p:clrMapOvr>
+    <a:masterClrMapping/>
+  </p:clrMapOvr>
+</p:notes>
+</file>
+
+<file path=ppt/notesSlides/notesSlide7.xml><?xml version="1.0" encoding="utf-8"?>
+<p:notes xmlns:a="http://schemas.openxmlformats.org/drawingml/2006/main" xmlns:r="http://schemas.openxmlformats.org/officeDocument/2006/relationships" xmlns:p="http://schemas.openxmlformats.org/presentationml/2006/main">
+  <p:cSld>
+    <p:spTree>
+      <p:nvGrpSpPr>
+        <p:cNvPr id="1" name=""/>
+        <p:cNvGrpSpPr/>
+        <p:nvPr/>
+      </p:nvGrpSpPr>
+      <p:grpSpPr>
+        <a:xfrm>
+          <a:off x="0" y="0"/>
+          <a:ext cx="0" cy="0"/>
+          <a:chOff x="0" y="0"/>
+          <a:chExt cx="0" cy="0"/>
+        </a:xfrm>
+      </p:grpSpPr>
+      <p:sp>
+        <p:nvSpPr>
+          <p:cNvPr id="2" name="Slide Image Placeholder 1"/>
+          <p:cNvSpPr>
+            <a:spLocks noGrp="1" noRot="1" noChangeAspect="1"/>
+          </p:cNvSpPr>
+          <p:nvPr>
+            <p:ph type="sldImg"/>
+          </p:nvPr>
+        </p:nvSpPr>
+        <p:spPr/>
+      </p:sp>
+      <p:sp>
+        <p:nvSpPr>
+          <p:cNvPr id="3" name="Notes Placeholder 2"/>
+          <p:cNvSpPr>
+            <a:spLocks noGrp="1"/>
+          </p:cNvSpPr>
+          <p:nvPr>
+            <p:ph type="body" idx="1"/>
+          </p:nvPr>
+        </p:nvSpPr>
+        <p:spPr/>
+        <p:txBody>
+          <a:bodyPr/>
+          <a:lstStyle/>
+          <a:p>
+            <a:r>
+              <a:rPr lang="en-US" dirty="0"/>
+              <a:t>To summarize, </a:t>
+            </a:r>
+          </a:p>
+          <a:p>
+            <a:endParaRPr lang="en-US" dirty="0"/>
+          </a:p>
+          <a:p>
+            <a:r>
+              <a:rPr lang="en-US" dirty="0"/>
+              <a:t>I want to move from this outdated method of viewing group progression</a:t>
+            </a:r>
+          </a:p>
+          <a:p>
+            <a:r>
+              <a:rPr lang="en-US" dirty="0"/>
+              <a:t>To a much more digestible method that shows group progression over time along with aggregate statistics.</a:t>
+            </a:r>
+          </a:p>
+          <a:p>
+            <a:endParaRPr lang="en-US" dirty="0"/>
+          </a:p>
+          <a:p>
+            <a:r>
+              <a:rPr lang="en-US" dirty="0"/>
+              <a:t>This will allow the millions of individual players to understand their group progression to a much better degree along with provide them a tool to predict their groups success.</a:t>
+            </a:r>
+          </a:p>
+        </p:txBody>
+      </p:sp>
+      <p:sp>
+        <p:nvSpPr>
+          <p:cNvPr id="4" name="Slide Number Placeholder 3"/>
+          <p:cNvSpPr>
+            <a:spLocks noGrp="1"/>
+          </p:cNvSpPr>
+          <p:nvPr>
+            <p:ph type="sldNum" sz="quarter" idx="5"/>
+          </p:nvPr>
+        </p:nvSpPr>
+        <p:spPr/>
+        <p:txBody>
+          <a:bodyPr/>
+          <a:lstStyle/>
+          <a:p>
+            <a:fld id="{FCF85715-091D-4CC5-B0BD-9CC5D11D4EDF}" type="slidenum">
+              <a:rPr lang="en-US" smtClean="0"/>
+              <a:t>7</a:t>
+            </a:fld>
+            <a:endParaRPr lang="en-US"/>
+          </a:p>
+        </p:txBody>
+      </p:sp>
+    </p:spTree>
+    <p:extLst>
+      <p:ext uri="{BB962C8B-B14F-4D97-AF65-F5344CB8AC3E}">
+        <p14:creationId xmlns:p14="http://schemas.microsoft.com/office/powerpoint/2010/main" val="4027186436"/>
       </p:ext>
     </p:extLst>
   </p:cSld>
@@ -1008,7 +1342,7 @@
           <a:p>
             <a:fld id="{E71A4870-E222-4CD6-881F-7AD8134D3EF7}" type="datetimeFigureOut">
               <a:rPr lang="en-US" smtClean="0"/>
-              <a:t>10/8/2021</a:t>
+              <a:t>10/14/2021</a:t>
             </a:fld>
             <a:endParaRPr lang="en-US"/>
           </a:p>
@@ -1178,7 +1512,7 @@
           <a:p>
             <a:fld id="{E71A4870-E222-4CD6-881F-7AD8134D3EF7}" type="datetimeFigureOut">
               <a:rPr lang="en-US" smtClean="0"/>
-              <a:t>10/8/2021</a:t>
+              <a:t>10/14/2021</a:t>
             </a:fld>
             <a:endParaRPr lang="en-US"/>
           </a:p>
@@ -1358,7 +1692,7 @@
           <a:p>
             <a:fld id="{E71A4870-E222-4CD6-881F-7AD8134D3EF7}" type="datetimeFigureOut">
               <a:rPr lang="en-US" smtClean="0"/>
-              <a:t>10/8/2021</a:t>
+              <a:t>10/14/2021</a:t>
             </a:fld>
             <a:endParaRPr lang="en-US"/>
           </a:p>
@@ -1528,7 +1862,7 @@
           <a:p>
             <a:fld id="{E71A4870-E222-4CD6-881F-7AD8134D3EF7}" type="datetimeFigureOut">
               <a:rPr lang="en-US" smtClean="0"/>
-              <a:t>10/8/2021</a:t>
+              <a:t>10/14/2021</a:t>
             </a:fld>
             <a:endParaRPr lang="en-US"/>
           </a:p>
@@ -1774,7 +2108,7 @@
           <a:p>
             <a:fld id="{E71A4870-E222-4CD6-881F-7AD8134D3EF7}" type="datetimeFigureOut">
               <a:rPr lang="en-US" smtClean="0"/>
-              <a:t>10/8/2021</a:t>
+              <a:t>10/14/2021</a:t>
             </a:fld>
             <a:endParaRPr lang="en-US"/>
           </a:p>
@@ -2006,7 +2340,7 @@
           <a:p>
             <a:fld id="{E71A4870-E222-4CD6-881F-7AD8134D3EF7}" type="datetimeFigureOut">
               <a:rPr lang="en-US" smtClean="0"/>
-              <a:t>10/8/2021</a:t>
+              <a:t>10/14/2021</a:t>
             </a:fld>
             <a:endParaRPr lang="en-US"/>
           </a:p>
@@ -2373,7 +2707,7 @@
           <a:p>
             <a:fld id="{E71A4870-E222-4CD6-881F-7AD8134D3EF7}" type="datetimeFigureOut">
               <a:rPr lang="en-US" smtClean="0"/>
-              <a:t>10/8/2021</a:t>
+              <a:t>10/14/2021</a:t>
             </a:fld>
             <a:endParaRPr lang="en-US"/>
           </a:p>
@@ -2491,7 +2825,7 @@
           <a:p>
             <a:fld id="{E71A4870-E222-4CD6-881F-7AD8134D3EF7}" type="datetimeFigureOut">
               <a:rPr lang="en-US" smtClean="0"/>
-              <a:t>10/8/2021</a:t>
+              <a:t>10/14/2021</a:t>
             </a:fld>
             <a:endParaRPr lang="en-US"/>
           </a:p>
@@ -2586,7 +2920,7 @@
           <a:p>
             <a:fld id="{E71A4870-E222-4CD6-881F-7AD8134D3EF7}" type="datetimeFigureOut">
               <a:rPr lang="en-US" smtClean="0"/>
-              <a:t>10/8/2021</a:t>
+              <a:t>10/14/2021</a:t>
             </a:fld>
             <a:endParaRPr lang="en-US"/>
           </a:p>
@@ -2863,7 +3197,7 @@
           <a:p>
             <a:fld id="{E71A4870-E222-4CD6-881F-7AD8134D3EF7}" type="datetimeFigureOut">
               <a:rPr lang="en-US" smtClean="0"/>
-              <a:t>10/8/2021</a:t>
+              <a:t>10/14/2021</a:t>
             </a:fld>
             <a:endParaRPr lang="en-US"/>
           </a:p>
@@ -3120,7 +3454,7 @@
           <a:p>
             <a:fld id="{E71A4870-E222-4CD6-881F-7AD8134D3EF7}" type="datetimeFigureOut">
               <a:rPr lang="en-US" smtClean="0"/>
-              <a:t>10/8/2021</a:t>
+              <a:t>10/14/2021</a:t>
             </a:fld>
             <a:endParaRPr lang="en-US"/>
           </a:p>
@@ -3333,7 +3667,7 @@
           <a:p>
             <a:fld id="{E71A4870-E222-4CD6-881F-7AD8134D3EF7}" type="datetimeFigureOut">
               <a:rPr lang="en-US" smtClean="0"/>
-              <a:t>10/8/2021</a:t>
+              <a:t>10/14/2021</a:t>
             </a:fld>
             <a:endParaRPr lang="en-US"/>
           </a:p>
@@ -4047,6 +4381,18 @@
   <p:clrMapOvr>
     <a:masterClrMapping/>
   </p:clrMapOvr>
+  <mc:AlternateContent xmlns:mc="http://schemas.openxmlformats.org/markup-compatibility/2006">
+    <mc:Choice xmlns:p14="http://schemas.microsoft.com/office/powerpoint/2010/main" Requires="p14">
+      <p:transition p14:dur="300">
+        <p:fade/>
+      </p:transition>
+    </mc:Choice>
+    <mc:Fallback>
+      <p:transition>
+        <p:fade/>
+      </p:transition>
+    </mc:Fallback>
+  </mc:AlternateContent>
 </p:sld>
 </file>
 
@@ -4069,39 +4415,6 @@
       </p:grpSpPr>
       <p:sp>
         <p:nvSpPr>
-          <p:cNvPr id="2" name="Title 1">
-            <a:extLst>
-              <a:ext uri="{FF2B5EF4-FFF2-40B4-BE49-F238E27FC236}">
-                <a16:creationId xmlns:a16="http://schemas.microsoft.com/office/drawing/2014/main" id="{5D0D25D4-55C3-4634-814A-7FD9B514A212}"/>
-              </a:ext>
-            </a:extLst>
-          </p:cNvPr>
-          <p:cNvSpPr>
-            <a:spLocks noGrp="1"/>
-          </p:cNvSpPr>
-          <p:nvPr>
-            <p:ph type="title"/>
-          </p:nvPr>
-        </p:nvSpPr>
-        <p:spPr/>
-        <p:txBody>
-          <a:bodyPr/>
-          <a:lstStyle/>
-          <a:p>
-            <a:r>
-              <a:rPr lang="en-US" dirty="0">
-                <a:solidFill>
-                  <a:srgbClr val="FFCC00"/>
-                </a:solidFill>
-                <a:latin typeface="+mn-lt"/>
-              </a:rPr>
-              <a:t>The problem</a:t>
-            </a:r>
-          </a:p>
-        </p:txBody>
-      </p:sp>
-      <p:sp>
-        <p:nvSpPr>
           <p:cNvPr id="3" name="Content Placeholder 2">
             <a:extLst>
               <a:ext uri="{FF2B5EF4-FFF2-40B4-BE49-F238E27FC236}">
@@ -4134,7 +4447,7 @@
           <a:p>
             <a:r>
               <a:rPr lang="en-US" dirty="0"/>
-              <a:t>Within the game, groups of people pull encounters with the intent of defeating them.</a:t>
+              <a:t>Within the game, groups of people ‘pull’ encounters with the intent of defeating them.</a:t>
             </a:r>
           </a:p>
           <a:p>
@@ -4348,12 +4661,72 @@
           </a:p>
         </p:txBody>
       </p:sp>
+      <p:sp>
+        <p:nvSpPr>
+          <p:cNvPr id="9" name="Title 1">
+            <a:extLst>
+              <a:ext uri="{FF2B5EF4-FFF2-40B4-BE49-F238E27FC236}">
+                <a16:creationId xmlns:a16="http://schemas.microsoft.com/office/drawing/2014/main" id="{621497C0-3DF0-4006-8338-4EBBD617E3B8}"/>
+              </a:ext>
+            </a:extLst>
+          </p:cNvPr>
+          <p:cNvSpPr txBox="1">
+            <a:spLocks/>
+          </p:cNvSpPr>
+          <p:nvPr/>
+        </p:nvSpPr>
+        <p:spPr>
+          <a:xfrm>
+            <a:off x="468365" y="244766"/>
+            <a:ext cx="9766768" cy="1860659"/>
+          </a:xfrm>
+          <a:prstGeom prst="rect">
+            <a:avLst/>
+          </a:prstGeom>
+        </p:spPr>
+        <p:txBody>
+          <a:bodyPr vert="horz" lIns="91440" tIns="45720" rIns="91440" bIns="45720" rtlCol="0" anchor="t">
+            <a:normAutofit/>
+          </a:bodyPr>
+          <a:lstStyle>
+            <a:lvl1pPr algn="ctr" defTabSz="914400" rtl="0" eaLnBrk="1" latinLnBrk="0" hangingPunct="1">
+              <a:lnSpc>
+                <a:spcPct val="90000"/>
+              </a:lnSpc>
+              <a:spcBef>
+                <a:spcPct val="0"/>
+              </a:spcBef>
+              <a:buNone/>
+              <a:defRPr sz="6000" kern="1200">
+                <a:solidFill>
+                  <a:schemeClr val="tx1"/>
+                </a:solidFill>
+                <a:latin typeface="+mj-lt"/>
+                <a:ea typeface="+mj-ea"/>
+                <a:cs typeface="+mj-cs"/>
+              </a:defRPr>
+            </a:lvl1pPr>
+          </a:lstStyle>
+          <a:p>
+            <a:pPr algn="l"/>
+            <a:r>
+              <a:rPr lang="en-US" sz="4500" dirty="0">
+                <a:solidFill>
+                  <a:srgbClr val="FFCC00"/>
+                </a:solidFill>
+                <a:latin typeface="+mn-lt"/>
+              </a:rPr>
+              <a:t>The problem</a:t>
+            </a:r>
+          </a:p>
+        </p:txBody>
+      </p:sp>
       <p:pic>
         <p:nvPicPr>
-          <p:cNvPr id="5" name="Picture 4" descr="A screenshot of a computer&#10;&#10;Description automatically generated with medium confidence">
+          <p:cNvPr id="12" name="Picture 11" descr="A screenshot of a computer&#10;&#10;Description automatically generated with medium confidence">
             <a:extLst>
               <a:ext uri="{FF2B5EF4-FFF2-40B4-BE49-F238E27FC236}">
-                <a16:creationId xmlns:a16="http://schemas.microsoft.com/office/drawing/2014/main" id="{38ED7E48-B608-4479-9A86-67D23911F854}"/>
+                <a16:creationId xmlns:a16="http://schemas.microsoft.com/office/drawing/2014/main" id="{555F3647-BF3D-4C74-A8F4-660DDA463B7D}"/>
               </a:ext>
             </a:extLst>
           </p:cNvPr>
@@ -4376,8 +4749,8 @@
         </p:blipFill>
         <p:spPr>
           <a:xfrm>
-            <a:off x="6336242" y="2005593"/>
-            <a:ext cx="5676900" cy="2846813"/>
+            <a:off x="6555481" y="1825624"/>
+            <a:ext cx="5484029" cy="3343275"/>
           </a:xfrm>
           <a:prstGeom prst="rect">
             <a:avLst/>
@@ -4394,6 +4767,214 @@
   <p:clrMapOvr>
     <a:masterClrMapping/>
   </p:clrMapOvr>
+  <mc:AlternateContent xmlns:mc="http://schemas.openxmlformats.org/markup-compatibility/2006">
+    <mc:Choice xmlns:p14="http://schemas.microsoft.com/office/powerpoint/2010/main" Requires="p14">
+      <p:transition p14:dur="300">
+        <p:fade/>
+      </p:transition>
+    </mc:Choice>
+    <mc:Fallback>
+      <p:transition>
+        <p:fade/>
+      </p:transition>
+    </mc:Fallback>
+  </mc:AlternateContent>
+  <p:timing>
+    <p:tnLst>
+      <p:par>
+        <p:cTn id="1" dur="indefinite" restart="never" nodeType="tmRoot">
+          <p:childTnLst>
+            <p:seq concurrent="1" nextAc="seek">
+              <p:cTn id="2" dur="indefinite" nodeType="mainSeq">
+                <p:childTnLst>
+                  <p:par>
+                    <p:cTn id="3" fill="hold">
+                      <p:stCondLst>
+                        <p:cond delay="indefinite"/>
+                      </p:stCondLst>
+                      <p:childTnLst>
+                        <p:par>
+                          <p:cTn id="4" fill="hold">
+                            <p:stCondLst>
+                              <p:cond delay="0"/>
+                            </p:stCondLst>
+                            <p:childTnLst>
+                              <p:par>
+                                <p:cTn id="5" presetID="10" presetClass="entr" presetSubtype="0" fill="hold" nodeType="clickEffect">
+                                  <p:stCondLst>
+                                    <p:cond delay="0"/>
+                                  </p:stCondLst>
+                                  <p:childTnLst>
+                                    <p:set>
+                                      <p:cBhvr>
+                                        <p:cTn id="6" dur="1" fill="hold">
+                                          <p:stCondLst>
+                                            <p:cond delay="0"/>
+                                          </p:stCondLst>
+                                        </p:cTn>
+                                        <p:tgtEl>
+                                          <p:spTgt spid="3">
+                                            <p:txEl>
+                                              <p:pRg st="1" end="1"/>
+                                            </p:txEl>
+                                          </p:spTgt>
+                                        </p:tgtEl>
+                                        <p:attrNameLst>
+                                          <p:attrName>style.visibility</p:attrName>
+                                        </p:attrNameLst>
+                                      </p:cBhvr>
+                                      <p:to>
+                                        <p:strVal val="visible"/>
+                                      </p:to>
+                                    </p:set>
+                                    <p:animEffect transition="in" filter="fade">
+                                      <p:cBhvr>
+                                        <p:cTn id="7" dur="500"/>
+                                        <p:tgtEl>
+                                          <p:spTgt spid="3">
+                                            <p:txEl>
+                                              <p:pRg st="1" end="1"/>
+                                            </p:txEl>
+                                          </p:spTgt>
+                                        </p:tgtEl>
+                                      </p:cBhvr>
+                                    </p:animEffect>
+                                  </p:childTnLst>
+                                </p:cTn>
+                              </p:par>
+                            </p:childTnLst>
+                          </p:cTn>
+                        </p:par>
+                      </p:childTnLst>
+                    </p:cTn>
+                  </p:par>
+                  <p:par>
+                    <p:cTn id="8" fill="hold">
+                      <p:stCondLst>
+                        <p:cond delay="indefinite"/>
+                      </p:stCondLst>
+                      <p:childTnLst>
+                        <p:par>
+                          <p:cTn id="9" fill="hold">
+                            <p:stCondLst>
+                              <p:cond delay="0"/>
+                            </p:stCondLst>
+                            <p:childTnLst>
+                              <p:par>
+                                <p:cTn id="10" presetID="10" presetClass="entr" presetSubtype="0" fill="hold" nodeType="clickEffect">
+                                  <p:stCondLst>
+                                    <p:cond delay="0"/>
+                                  </p:stCondLst>
+                                  <p:childTnLst>
+                                    <p:set>
+                                      <p:cBhvr>
+                                        <p:cTn id="11" dur="1" fill="hold">
+                                          <p:stCondLst>
+                                            <p:cond delay="0"/>
+                                          </p:stCondLst>
+                                        </p:cTn>
+                                        <p:tgtEl>
+                                          <p:spTgt spid="3">
+                                            <p:txEl>
+                                              <p:pRg st="2" end="2"/>
+                                            </p:txEl>
+                                          </p:spTgt>
+                                        </p:tgtEl>
+                                        <p:attrNameLst>
+                                          <p:attrName>style.visibility</p:attrName>
+                                        </p:attrNameLst>
+                                      </p:cBhvr>
+                                      <p:to>
+                                        <p:strVal val="visible"/>
+                                      </p:to>
+                                    </p:set>
+                                    <p:animEffect transition="in" filter="fade">
+                                      <p:cBhvr>
+                                        <p:cTn id="12" dur="500"/>
+                                        <p:tgtEl>
+                                          <p:spTgt spid="3">
+                                            <p:txEl>
+                                              <p:pRg st="2" end="2"/>
+                                            </p:txEl>
+                                          </p:spTgt>
+                                        </p:tgtEl>
+                                      </p:cBhvr>
+                                    </p:animEffect>
+                                  </p:childTnLst>
+                                </p:cTn>
+                              </p:par>
+                            </p:childTnLst>
+                          </p:cTn>
+                        </p:par>
+                        <p:par>
+                          <p:cTn id="13" fill="hold">
+                            <p:stCondLst>
+                              <p:cond delay="500"/>
+                            </p:stCondLst>
+                            <p:childTnLst>
+                              <p:par>
+                                <p:cTn id="14" presetID="10" presetClass="entr" presetSubtype="0" fill="hold" nodeType="afterEffect">
+                                  <p:stCondLst>
+                                    <p:cond delay="0"/>
+                                  </p:stCondLst>
+                                  <p:childTnLst>
+                                    <p:set>
+                                      <p:cBhvr>
+                                        <p:cTn id="15" dur="1" fill="hold">
+                                          <p:stCondLst>
+                                            <p:cond delay="0"/>
+                                          </p:stCondLst>
+                                        </p:cTn>
+                                        <p:tgtEl>
+                                          <p:spTgt spid="12"/>
+                                        </p:tgtEl>
+                                        <p:attrNameLst>
+                                          <p:attrName>style.visibility</p:attrName>
+                                        </p:attrNameLst>
+                                      </p:cBhvr>
+                                      <p:to>
+                                        <p:strVal val="visible"/>
+                                      </p:to>
+                                    </p:set>
+                                    <p:animEffect transition="in" filter="fade">
+                                      <p:cBhvr>
+                                        <p:cTn id="16" dur="500"/>
+                                        <p:tgtEl>
+                                          <p:spTgt spid="12"/>
+                                        </p:tgtEl>
+                                      </p:cBhvr>
+                                    </p:animEffect>
+                                  </p:childTnLst>
+                                </p:cTn>
+                              </p:par>
+                            </p:childTnLst>
+                          </p:cTn>
+                        </p:par>
+                      </p:childTnLst>
+                    </p:cTn>
+                  </p:par>
+                </p:childTnLst>
+              </p:cTn>
+              <p:prevCondLst>
+                <p:cond evt="onPrev" delay="0">
+                  <p:tgtEl>
+                    <p:sldTgt/>
+                  </p:tgtEl>
+                </p:cond>
+              </p:prevCondLst>
+              <p:nextCondLst>
+                <p:cond evt="onNext" delay="0">
+                  <p:tgtEl>
+                    <p:sldTgt/>
+                  </p:tgtEl>
+                </p:cond>
+              </p:nextCondLst>
+            </p:seq>
+          </p:childTnLst>
+        </p:cTn>
+      </p:par>
+    </p:tnLst>
+  </p:timing>
 </p:sld>
 </file>
 
@@ -4416,39 +4997,6 @@
       </p:grpSpPr>
       <p:sp>
         <p:nvSpPr>
-          <p:cNvPr id="2" name="Title 1">
-            <a:extLst>
-              <a:ext uri="{FF2B5EF4-FFF2-40B4-BE49-F238E27FC236}">
-                <a16:creationId xmlns:a16="http://schemas.microsoft.com/office/drawing/2014/main" id="{5D0D25D4-55C3-4634-814A-7FD9B514A212}"/>
-              </a:ext>
-            </a:extLst>
-          </p:cNvPr>
-          <p:cNvSpPr>
-            <a:spLocks noGrp="1"/>
-          </p:cNvSpPr>
-          <p:nvPr>
-            <p:ph type="title"/>
-          </p:nvPr>
-        </p:nvSpPr>
-        <p:spPr/>
-        <p:txBody>
-          <a:bodyPr/>
-          <a:lstStyle/>
-          <a:p>
-            <a:r>
-              <a:rPr lang="en-US" dirty="0">
-                <a:solidFill>
-                  <a:srgbClr val="FFCC00"/>
-                </a:solidFill>
-                <a:latin typeface="+mn-lt"/>
-              </a:rPr>
-              <a:t>Providing insights into group progression in world of warcraft.</a:t>
-            </a:r>
-          </a:p>
-        </p:txBody>
-      </p:sp>
-      <p:sp>
-        <p:nvSpPr>
           <p:cNvPr id="3" name="Content Placeholder 2">
             <a:extLst>
               <a:ext uri="{FF2B5EF4-FFF2-40B4-BE49-F238E27FC236}">
@@ -4465,17 +5013,19 @@
         </p:nvSpPr>
         <p:spPr>
           <a:xfrm>
-            <a:off x="838200" y="1825625"/>
-            <a:ext cx="4095750" cy="4351338"/>
+            <a:off x="838200" y="1825624"/>
+            <a:ext cx="4089400" cy="4787609"/>
           </a:xfrm>
         </p:spPr>
         <p:txBody>
-          <a:bodyPr/>
+          <a:bodyPr>
+            <a:normAutofit/>
+          </a:bodyPr>
           <a:lstStyle/>
           <a:p>
             <a:r>
               <a:rPr lang="en-US" dirty="0"/>
-              <a:t>An online video game where groups attempt to defeat encounters.</a:t>
+              <a:t>I propose building a tool to show groups progress and a model to predict success.</a:t>
             </a:r>
           </a:p>
           <a:p>
@@ -4484,47 +5034,17 @@
           <a:p>
             <a:r>
               <a:rPr lang="en-US" dirty="0"/>
-              <a:t>I propose building a tool to represent groups progress and a model to predict success based on recent events.</a:t>
-            </a:r>
-          </a:p>
-        </p:txBody>
-      </p:sp>
-      <p:pic>
-        <p:nvPicPr>
-          <p:cNvPr id="8" name="Picture 7" descr="Graphical user interface&#10;&#10;Description automatically generated">
-            <a:extLst>
-              <a:ext uri="{FF2B5EF4-FFF2-40B4-BE49-F238E27FC236}">
-                <a16:creationId xmlns:a16="http://schemas.microsoft.com/office/drawing/2014/main" id="{A5D1095A-DC21-49A1-B520-3A051CF3385E}"/>
-              </a:ext>
-            </a:extLst>
-          </p:cNvPr>
-          <p:cNvPicPr>
-            <a:picLocks noChangeAspect="1"/>
-          </p:cNvPicPr>
-          <p:nvPr/>
-        </p:nvPicPr>
-        <p:blipFill>
-          <a:blip r:embed="rId2">
-            <a:extLst>
-              <a:ext uri="{28A0092B-C50C-407E-A947-70E740481C1C}">
-                <a14:useLocalDpi xmlns:a14="http://schemas.microsoft.com/office/drawing/2010/main" val="0"/>
-              </a:ext>
-            </a:extLst>
-          </a:blip>
-          <a:stretch>
-            <a:fillRect/>
-          </a:stretch>
-        </p:blipFill>
-        <p:spPr>
-          <a:xfrm>
-            <a:off x="5181252" y="1117308"/>
-            <a:ext cx="6635889" cy="4890436"/>
-          </a:xfrm>
-          <a:prstGeom prst="rect">
-            <a:avLst/>
-          </a:prstGeom>
-        </p:spPr>
-      </p:pic>
+              <a:t>Understanding of progression, comparison to others, chance of success</a:t>
+            </a:r>
+          </a:p>
+          <a:p>
+            <a:endParaRPr lang="en-US" dirty="0"/>
+          </a:p>
+          <a:p>
+            <a:endParaRPr lang="en-US" dirty="0"/>
+          </a:p>
+        </p:txBody>
+      </p:sp>
       <p:sp>
         <p:nvSpPr>
           <p:cNvPr id="6" name="Content Placeholder 2">
@@ -4728,42 +5248,12 @@
           </a:p>
         </p:txBody>
       </p:sp>
-    </p:spTree>
-    <p:extLst>
-      <p:ext uri="{BB962C8B-B14F-4D97-AF65-F5344CB8AC3E}">
-        <p14:creationId xmlns:p14="http://schemas.microsoft.com/office/powerpoint/2010/main" val="236845595"/>
-      </p:ext>
-    </p:extLst>
-  </p:cSld>
-  <p:clrMapOvr>
-    <a:masterClrMapping/>
-  </p:clrMapOvr>
-</p:sld>
-</file>
-
-<file path=ppt/slides/slide4.xml><?xml version="1.0" encoding="utf-8"?>
-<p:sld xmlns:a="http://schemas.openxmlformats.org/drawingml/2006/main" xmlns:r="http://schemas.openxmlformats.org/officeDocument/2006/relationships" xmlns:p="http://schemas.openxmlformats.org/presentationml/2006/main">
-  <p:cSld>
-    <p:spTree>
-      <p:nvGrpSpPr>
-        <p:cNvPr id="1" name=""/>
-        <p:cNvGrpSpPr/>
-        <p:nvPr/>
-      </p:nvGrpSpPr>
-      <p:grpSpPr>
-        <a:xfrm>
-          <a:off x="0" y="0"/>
-          <a:ext cx="0" cy="0"/>
-          <a:chOff x="0" y="0"/>
-          <a:chExt cx="0" cy="0"/>
-        </a:xfrm>
-      </p:grpSpPr>
-      <p:sp>
-        <p:nvSpPr>
-          <p:cNvPr id="6" name="Title 1">
+      <p:sp>
+        <p:nvSpPr>
+          <p:cNvPr id="9" name="Title 1">
             <a:extLst>
               <a:ext uri="{FF2B5EF4-FFF2-40B4-BE49-F238E27FC236}">
-                <a16:creationId xmlns:a16="http://schemas.microsoft.com/office/drawing/2014/main" id="{640DE1D3-36F2-4648-AF90-7621DE8D5A7A}"/>
+                <a16:creationId xmlns:a16="http://schemas.microsoft.com/office/drawing/2014/main" id="{D60E9456-68EC-4D08-A3F0-4C53FE42D51B}"/>
               </a:ext>
             </a:extLst>
           </p:cNvPr>
@@ -4775,15 +5265,15 @@
         <p:spPr>
           <a:xfrm>
             <a:off x="468365" y="244766"/>
-            <a:ext cx="6025877" cy="872542"/>
+            <a:ext cx="9766768" cy="1860659"/>
           </a:xfrm>
           <a:prstGeom prst="rect">
             <a:avLst/>
           </a:prstGeom>
         </p:spPr>
         <p:txBody>
-          <a:bodyPr vert="horz" lIns="91440" tIns="45720" rIns="91440" bIns="45720" rtlCol="0" anchor="b">
-            <a:normAutofit fontScale="85000" lnSpcReduction="10000"/>
+          <a:bodyPr vert="horz" lIns="91440" tIns="45720" rIns="91440" bIns="45720" rtlCol="0" anchor="t">
+            <a:normAutofit/>
           </a:bodyPr>
           <a:lstStyle>
             <a:lvl1pPr algn="ctr" defTabSz="914400" rtl="0" eaLnBrk="1" latinLnBrk="0" hangingPunct="1">
@@ -4807,450 +5297,23 @@
           <a:p>
             <a:pPr algn="l"/>
             <a:r>
-              <a:rPr lang="en-US" dirty="0">
+              <a:rPr lang="en-US" sz="4000" dirty="0">
                 <a:solidFill>
                   <a:srgbClr val="FFCC00"/>
                 </a:solidFill>
                 <a:latin typeface="+mn-lt"/>
               </a:rPr>
-              <a:t>Individual group data</a:t>
-            </a:r>
-          </a:p>
-        </p:txBody>
-      </p:sp>
-      <p:sp>
-        <p:nvSpPr>
-          <p:cNvPr id="7" name="Content Placeholder 2">
+              <a:t>Providing insights into group progression in world of warcraft.</a:t>
+            </a:r>
+          </a:p>
+        </p:txBody>
+      </p:sp>
+      <p:pic>
+        <p:nvPicPr>
+          <p:cNvPr id="10" name="Picture 9" descr="A screenshot of a computer&#10;&#10;Description automatically generated with medium confidence">
             <a:extLst>
               <a:ext uri="{FF2B5EF4-FFF2-40B4-BE49-F238E27FC236}">
-                <a16:creationId xmlns:a16="http://schemas.microsoft.com/office/drawing/2014/main" id="{D713D7AB-A025-4DB6-B232-FF4B7E9D2EDF}"/>
-              </a:ext>
-            </a:extLst>
-          </p:cNvPr>
-          <p:cNvSpPr txBox="1">
-            <a:spLocks/>
-          </p:cNvSpPr>
-          <p:nvPr/>
-        </p:nvSpPr>
-        <p:spPr>
-          <a:xfrm>
-            <a:off x="838200" y="1825625"/>
-            <a:ext cx="6443628" cy="4351338"/>
-          </a:xfrm>
-          <a:prstGeom prst="rect">
-            <a:avLst/>
-          </a:prstGeom>
-        </p:spPr>
-        <p:txBody>
-          <a:bodyPr vert="horz" lIns="91440" tIns="45720" rIns="91440" bIns="45720" rtlCol="0">
-            <a:normAutofit/>
-          </a:bodyPr>
-          <a:lstStyle>
-            <a:lvl1pPr marL="0" indent="0" algn="ctr" defTabSz="914400" rtl="0" eaLnBrk="1" latinLnBrk="0" hangingPunct="1">
-              <a:lnSpc>
-                <a:spcPct val="90000"/>
-              </a:lnSpc>
-              <a:spcBef>
-                <a:spcPts val="1000"/>
-              </a:spcBef>
-              <a:buFont typeface="Arial" panose="020B0604020202020204" pitchFamily="34" charset="0"/>
-              <a:buNone/>
-              <a:defRPr sz="2400" kern="1200">
-                <a:solidFill>
-                  <a:schemeClr val="tx1"/>
-                </a:solidFill>
-                <a:latin typeface="+mn-lt"/>
-                <a:ea typeface="+mn-ea"/>
-                <a:cs typeface="+mn-cs"/>
-              </a:defRPr>
-            </a:lvl1pPr>
-            <a:lvl2pPr marL="457200" indent="0" algn="ctr" defTabSz="914400" rtl="0" eaLnBrk="1" latinLnBrk="0" hangingPunct="1">
-              <a:lnSpc>
-                <a:spcPct val="90000"/>
-              </a:lnSpc>
-              <a:spcBef>
-                <a:spcPts val="500"/>
-              </a:spcBef>
-              <a:buFont typeface="Arial" panose="020B0604020202020204" pitchFamily="34" charset="0"/>
-              <a:buNone/>
-              <a:defRPr sz="2000" kern="1200">
-                <a:solidFill>
-                  <a:schemeClr val="tx1"/>
-                </a:solidFill>
-                <a:latin typeface="+mn-lt"/>
-                <a:ea typeface="+mn-ea"/>
-                <a:cs typeface="+mn-cs"/>
-              </a:defRPr>
-            </a:lvl2pPr>
-            <a:lvl3pPr marL="914400" indent="0" algn="ctr" defTabSz="914400" rtl="0" eaLnBrk="1" latinLnBrk="0" hangingPunct="1">
-              <a:lnSpc>
-                <a:spcPct val="90000"/>
-              </a:lnSpc>
-              <a:spcBef>
-                <a:spcPts val="500"/>
-              </a:spcBef>
-              <a:buFont typeface="Arial" panose="020B0604020202020204" pitchFamily="34" charset="0"/>
-              <a:buNone/>
-              <a:defRPr sz="1800" kern="1200">
-                <a:solidFill>
-                  <a:schemeClr val="tx1"/>
-                </a:solidFill>
-                <a:latin typeface="+mn-lt"/>
-                <a:ea typeface="+mn-ea"/>
-                <a:cs typeface="+mn-cs"/>
-              </a:defRPr>
-            </a:lvl3pPr>
-            <a:lvl4pPr marL="1371600" indent="0" algn="ctr" defTabSz="914400" rtl="0" eaLnBrk="1" latinLnBrk="0" hangingPunct="1">
-              <a:lnSpc>
-                <a:spcPct val="90000"/>
-              </a:lnSpc>
-              <a:spcBef>
-                <a:spcPts val="500"/>
-              </a:spcBef>
-              <a:buFont typeface="Arial" panose="020B0604020202020204" pitchFamily="34" charset="0"/>
-              <a:buNone/>
-              <a:defRPr sz="1600" kern="1200">
-                <a:solidFill>
-                  <a:schemeClr val="tx1"/>
-                </a:solidFill>
-                <a:latin typeface="+mn-lt"/>
-                <a:ea typeface="+mn-ea"/>
-                <a:cs typeface="+mn-cs"/>
-              </a:defRPr>
-            </a:lvl4pPr>
-            <a:lvl5pPr marL="1828800" indent="0" algn="ctr" defTabSz="914400" rtl="0" eaLnBrk="1" latinLnBrk="0" hangingPunct="1">
-              <a:lnSpc>
-                <a:spcPct val="90000"/>
-              </a:lnSpc>
-              <a:spcBef>
-                <a:spcPts val="500"/>
-              </a:spcBef>
-              <a:buFont typeface="Arial" panose="020B0604020202020204" pitchFamily="34" charset="0"/>
-              <a:buNone/>
-              <a:defRPr sz="1600" kern="1200">
-                <a:solidFill>
-                  <a:schemeClr val="tx1"/>
-                </a:solidFill>
-                <a:latin typeface="+mn-lt"/>
-                <a:ea typeface="+mn-ea"/>
-                <a:cs typeface="+mn-cs"/>
-              </a:defRPr>
-            </a:lvl5pPr>
-            <a:lvl6pPr marL="2286000" indent="0" algn="ctr" defTabSz="914400" rtl="0" eaLnBrk="1" latinLnBrk="0" hangingPunct="1">
-              <a:lnSpc>
-                <a:spcPct val="90000"/>
-              </a:lnSpc>
-              <a:spcBef>
-                <a:spcPts val="500"/>
-              </a:spcBef>
-              <a:buFont typeface="Arial" panose="020B0604020202020204" pitchFamily="34" charset="0"/>
-              <a:buNone/>
-              <a:defRPr sz="1600" kern="1200">
-                <a:solidFill>
-                  <a:schemeClr val="tx1"/>
-                </a:solidFill>
-                <a:latin typeface="+mn-lt"/>
-                <a:ea typeface="+mn-ea"/>
-                <a:cs typeface="+mn-cs"/>
-              </a:defRPr>
-            </a:lvl6pPr>
-            <a:lvl7pPr marL="2743200" indent="0" algn="ctr" defTabSz="914400" rtl="0" eaLnBrk="1" latinLnBrk="0" hangingPunct="1">
-              <a:lnSpc>
-                <a:spcPct val="90000"/>
-              </a:lnSpc>
-              <a:spcBef>
-                <a:spcPts val="500"/>
-              </a:spcBef>
-              <a:buFont typeface="Arial" panose="020B0604020202020204" pitchFamily="34" charset="0"/>
-              <a:buNone/>
-              <a:defRPr sz="1600" kern="1200">
-                <a:solidFill>
-                  <a:schemeClr val="tx1"/>
-                </a:solidFill>
-                <a:latin typeface="+mn-lt"/>
-                <a:ea typeface="+mn-ea"/>
-                <a:cs typeface="+mn-cs"/>
-              </a:defRPr>
-            </a:lvl7pPr>
-            <a:lvl8pPr marL="3200400" indent="0" algn="ctr" defTabSz="914400" rtl="0" eaLnBrk="1" latinLnBrk="0" hangingPunct="1">
-              <a:lnSpc>
-                <a:spcPct val="90000"/>
-              </a:lnSpc>
-              <a:spcBef>
-                <a:spcPts val="500"/>
-              </a:spcBef>
-              <a:buFont typeface="Arial" panose="020B0604020202020204" pitchFamily="34" charset="0"/>
-              <a:buNone/>
-              <a:defRPr sz="1600" kern="1200">
-                <a:solidFill>
-                  <a:schemeClr val="tx1"/>
-                </a:solidFill>
-                <a:latin typeface="+mn-lt"/>
-                <a:ea typeface="+mn-ea"/>
-                <a:cs typeface="+mn-cs"/>
-              </a:defRPr>
-            </a:lvl8pPr>
-            <a:lvl9pPr marL="3657600" indent="0" algn="ctr" defTabSz="914400" rtl="0" eaLnBrk="1" latinLnBrk="0" hangingPunct="1">
-              <a:lnSpc>
-                <a:spcPct val="90000"/>
-              </a:lnSpc>
-              <a:spcBef>
-                <a:spcPts val="500"/>
-              </a:spcBef>
-              <a:buFont typeface="Arial" panose="020B0604020202020204" pitchFamily="34" charset="0"/>
-              <a:buNone/>
-              <a:defRPr sz="1600" kern="1200">
-                <a:solidFill>
-                  <a:schemeClr val="tx1"/>
-                </a:solidFill>
-                <a:latin typeface="+mn-lt"/>
-                <a:ea typeface="+mn-ea"/>
-                <a:cs typeface="+mn-cs"/>
-              </a:defRPr>
-            </a:lvl9pPr>
-          </a:lstStyle>
-          <a:p>
-            <a:endParaRPr lang="en-US" dirty="0"/>
-          </a:p>
-        </p:txBody>
-      </p:sp>
-      <p:sp>
-        <p:nvSpPr>
-          <p:cNvPr id="11" name="Content Placeholder 2">
-            <a:extLst>
-              <a:ext uri="{FF2B5EF4-FFF2-40B4-BE49-F238E27FC236}">
-                <a16:creationId xmlns:a16="http://schemas.microsoft.com/office/drawing/2014/main" id="{CAE7C721-240E-4E35-B61A-D4CB70AD2F45}"/>
-              </a:ext>
-            </a:extLst>
-          </p:cNvPr>
-          <p:cNvSpPr txBox="1">
-            <a:spLocks/>
-          </p:cNvSpPr>
-          <p:nvPr/>
-        </p:nvSpPr>
-        <p:spPr>
-          <a:xfrm>
-            <a:off x="838200" y="1717720"/>
-            <a:ext cx="3628121" cy="4282611"/>
-          </a:xfrm>
-          <a:prstGeom prst="rect">
-            <a:avLst/>
-          </a:prstGeom>
-        </p:spPr>
-        <p:txBody>
-          <a:bodyPr vert="horz" lIns="91440" tIns="45720" rIns="91440" bIns="45720" rtlCol="0">
-            <a:normAutofit/>
-          </a:bodyPr>
-          <a:lstStyle>
-            <a:lvl1pPr marL="0" indent="0" algn="ctr" defTabSz="914400" rtl="0" eaLnBrk="1" latinLnBrk="0" hangingPunct="1">
-              <a:lnSpc>
-                <a:spcPct val="90000"/>
-              </a:lnSpc>
-              <a:spcBef>
-                <a:spcPts val="1000"/>
-              </a:spcBef>
-              <a:buFont typeface="Arial" panose="020B0604020202020204" pitchFamily="34" charset="0"/>
-              <a:buNone/>
-              <a:defRPr sz="2400" kern="1200">
-                <a:solidFill>
-                  <a:schemeClr val="tx1"/>
-                </a:solidFill>
-                <a:latin typeface="+mn-lt"/>
-                <a:ea typeface="+mn-ea"/>
-                <a:cs typeface="+mn-cs"/>
-              </a:defRPr>
-            </a:lvl1pPr>
-            <a:lvl2pPr marL="457200" indent="0" algn="ctr" defTabSz="914400" rtl="0" eaLnBrk="1" latinLnBrk="0" hangingPunct="1">
-              <a:lnSpc>
-                <a:spcPct val="90000"/>
-              </a:lnSpc>
-              <a:spcBef>
-                <a:spcPts val="500"/>
-              </a:spcBef>
-              <a:buFont typeface="Arial" panose="020B0604020202020204" pitchFamily="34" charset="0"/>
-              <a:buNone/>
-              <a:defRPr sz="2000" kern="1200">
-                <a:solidFill>
-                  <a:schemeClr val="tx1"/>
-                </a:solidFill>
-                <a:latin typeface="+mn-lt"/>
-                <a:ea typeface="+mn-ea"/>
-                <a:cs typeface="+mn-cs"/>
-              </a:defRPr>
-            </a:lvl2pPr>
-            <a:lvl3pPr marL="914400" indent="0" algn="ctr" defTabSz="914400" rtl="0" eaLnBrk="1" latinLnBrk="0" hangingPunct="1">
-              <a:lnSpc>
-                <a:spcPct val="90000"/>
-              </a:lnSpc>
-              <a:spcBef>
-                <a:spcPts val="500"/>
-              </a:spcBef>
-              <a:buFont typeface="Arial" panose="020B0604020202020204" pitchFamily="34" charset="0"/>
-              <a:buNone/>
-              <a:defRPr sz="1800" kern="1200">
-                <a:solidFill>
-                  <a:schemeClr val="tx1"/>
-                </a:solidFill>
-                <a:latin typeface="+mn-lt"/>
-                <a:ea typeface="+mn-ea"/>
-                <a:cs typeface="+mn-cs"/>
-              </a:defRPr>
-            </a:lvl3pPr>
-            <a:lvl4pPr marL="1371600" indent="0" algn="ctr" defTabSz="914400" rtl="0" eaLnBrk="1" latinLnBrk="0" hangingPunct="1">
-              <a:lnSpc>
-                <a:spcPct val="90000"/>
-              </a:lnSpc>
-              <a:spcBef>
-                <a:spcPts val="500"/>
-              </a:spcBef>
-              <a:buFont typeface="Arial" panose="020B0604020202020204" pitchFamily="34" charset="0"/>
-              <a:buNone/>
-              <a:defRPr sz="1600" kern="1200">
-                <a:solidFill>
-                  <a:schemeClr val="tx1"/>
-                </a:solidFill>
-                <a:latin typeface="+mn-lt"/>
-                <a:ea typeface="+mn-ea"/>
-                <a:cs typeface="+mn-cs"/>
-              </a:defRPr>
-            </a:lvl4pPr>
-            <a:lvl5pPr marL="1828800" indent="0" algn="ctr" defTabSz="914400" rtl="0" eaLnBrk="1" latinLnBrk="0" hangingPunct="1">
-              <a:lnSpc>
-                <a:spcPct val="90000"/>
-              </a:lnSpc>
-              <a:spcBef>
-                <a:spcPts val="500"/>
-              </a:spcBef>
-              <a:buFont typeface="Arial" panose="020B0604020202020204" pitchFamily="34" charset="0"/>
-              <a:buNone/>
-              <a:defRPr sz="1600" kern="1200">
-                <a:solidFill>
-                  <a:schemeClr val="tx1"/>
-                </a:solidFill>
-                <a:latin typeface="+mn-lt"/>
-                <a:ea typeface="+mn-ea"/>
-                <a:cs typeface="+mn-cs"/>
-              </a:defRPr>
-            </a:lvl5pPr>
-            <a:lvl6pPr marL="2286000" indent="0" algn="ctr" defTabSz="914400" rtl="0" eaLnBrk="1" latinLnBrk="0" hangingPunct="1">
-              <a:lnSpc>
-                <a:spcPct val="90000"/>
-              </a:lnSpc>
-              <a:spcBef>
-                <a:spcPts val="500"/>
-              </a:spcBef>
-              <a:buFont typeface="Arial" panose="020B0604020202020204" pitchFamily="34" charset="0"/>
-              <a:buNone/>
-              <a:defRPr sz="1600" kern="1200">
-                <a:solidFill>
-                  <a:schemeClr val="tx1"/>
-                </a:solidFill>
-                <a:latin typeface="+mn-lt"/>
-                <a:ea typeface="+mn-ea"/>
-                <a:cs typeface="+mn-cs"/>
-              </a:defRPr>
-            </a:lvl6pPr>
-            <a:lvl7pPr marL="2743200" indent="0" algn="ctr" defTabSz="914400" rtl="0" eaLnBrk="1" latinLnBrk="0" hangingPunct="1">
-              <a:lnSpc>
-                <a:spcPct val="90000"/>
-              </a:lnSpc>
-              <a:spcBef>
-                <a:spcPts val="500"/>
-              </a:spcBef>
-              <a:buFont typeface="Arial" panose="020B0604020202020204" pitchFamily="34" charset="0"/>
-              <a:buNone/>
-              <a:defRPr sz="1600" kern="1200">
-                <a:solidFill>
-                  <a:schemeClr val="tx1"/>
-                </a:solidFill>
-                <a:latin typeface="+mn-lt"/>
-                <a:ea typeface="+mn-ea"/>
-                <a:cs typeface="+mn-cs"/>
-              </a:defRPr>
-            </a:lvl7pPr>
-            <a:lvl8pPr marL="3200400" indent="0" algn="ctr" defTabSz="914400" rtl="0" eaLnBrk="1" latinLnBrk="0" hangingPunct="1">
-              <a:lnSpc>
-                <a:spcPct val="90000"/>
-              </a:lnSpc>
-              <a:spcBef>
-                <a:spcPts val="500"/>
-              </a:spcBef>
-              <a:buFont typeface="Arial" panose="020B0604020202020204" pitchFamily="34" charset="0"/>
-              <a:buNone/>
-              <a:defRPr sz="1600" kern="1200">
-                <a:solidFill>
-                  <a:schemeClr val="tx1"/>
-                </a:solidFill>
-                <a:latin typeface="+mn-lt"/>
-                <a:ea typeface="+mn-ea"/>
-                <a:cs typeface="+mn-cs"/>
-              </a:defRPr>
-            </a:lvl8pPr>
-            <a:lvl9pPr marL="3657600" indent="0" algn="ctr" defTabSz="914400" rtl="0" eaLnBrk="1" latinLnBrk="0" hangingPunct="1">
-              <a:lnSpc>
-                <a:spcPct val="90000"/>
-              </a:lnSpc>
-              <a:spcBef>
-                <a:spcPts val="500"/>
-              </a:spcBef>
-              <a:buFont typeface="Arial" panose="020B0604020202020204" pitchFamily="34" charset="0"/>
-              <a:buNone/>
-              <a:defRPr sz="1600" kern="1200">
-                <a:solidFill>
-                  <a:schemeClr val="tx1"/>
-                </a:solidFill>
-                <a:latin typeface="+mn-lt"/>
-                <a:ea typeface="+mn-ea"/>
-                <a:cs typeface="+mn-cs"/>
-              </a:defRPr>
-            </a:lvl9pPr>
-          </a:lstStyle>
-          <a:p>
-            <a:pPr marL="342900" indent="-342900" algn="l">
-              <a:buFont typeface="Arial" panose="020B0604020202020204" pitchFamily="34" charset="0"/>
-              <a:buChar char="•"/>
-            </a:pPr>
-            <a:r>
-              <a:rPr lang="en-US" dirty="0"/>
-              <a:t>Data can be obtained through either web scraping or a website API.</a:t>
-            </a:r>
-          </a:p>
-          <a:p>
-            <a:pPr marL="342900" indent="-342900" algn="l">
-              <a:buFont typeface="Arial" panose="020B0604020202020204" pitchFamily="34" charset="0"/>
-              <a:buChar char="•"/>
-            </a:pPr>
-            <a:endParaRPr lang="en-US" dirty="0"/>
-          </a:p>
-          <a:p>
-            <a:pPr marL="342900" indent="-342900" algn="l">
-              <a:buFont typeface="Arial" panose="020B0604020202020204" pitchFamily="34" charset="0"/>
-              <a:buChar char="•"/>
-            </a:pPr>
-            <a:r>
-              <a:rPr lang="en-US" dirty="0"/>
-              <a:t>We can present each groups progression in easily understandable manner.</a:t>
-            </a:r>
-          </a:p>
-          <a:p>
-            <a:pPr algn="l"/>
-            <a:endParaRPr lang="en-US" dirty="0"/>
-          </a:p>
-          <a:p>
-            <a:pPr marL="342900" indent="-342900" algn="l">
-              <a:buFont typeface="Arial" panose="020B0604020202020204" pitchFamily="34" charset="0"/>
-              <a:buChar char="•"/>
-            </a:pPr>
-            <a:endParaRPr lang="en-US" dirty="0"/>
-          </a:p>
-        </p:txBody>
-      </p:sp>
-      <p:pic>
-        <p:nvPicPr>
-          <p:cNvPr id="3" name="Picture 2" descr="A screenshot of a computer&#10;&#10;Description automatically generated with medium confidence">
-            <a:extLst>
-              <a:ext uri="{FF2B5EF4-FFF2-40B4-BE49-F238E27FC236}">
-                <a16:creationId xmlns:a16="http://schemas.microsoft.com/office/drawing/2014/main" id="{93B84EBF-2A9A-48E7-A30B-68814992ECF1}"/>
+                <a16:creationId xmlns:a16="http://schemas.microsoft.com/office/drawing/2014/main" id="{EDC938DE-AB3F-4DE0-AABD-1056DCDC2290}"/>
               </a:ext>
             </a:extLst>
           </p:cNvPr>
@@ -5273,232 +5336,185 @@
         </p:blipFill>
         <p:spPr>
           <a:xfrm>
-            <a:off x="5535022" y="1390650"/>
-            <a:ext cx="5626926" cy="4076700"/>
+            <a:off x="5067299" y="1634368"/>
+            <a:ext cx="6771931" cy="3810260"/>
           </a:xfrm>
           <a:prstGeom prst="rect">
             <a:avLst/>
           </a:prstGeom>
         </p:spPr>
       </p:pic>
-      <p:sp>
-        <p:nvSpPr>
-          <p:cNvPr id="9" name="Content Placeholder 2">
-            <a:extLst>
-              <a:ext uri="{FF2B5EF4-FFF2-40B4-BE49-F238E27FC236}">
-                <a16:creationId xmlns:a16="http://schemas.microsoft.com/office/drawing/2014/main" id="{074C932A-56EE-4B35-B49C-C13D9E4E2C86}"/>
-              </a:ext>
-            </a:extLst>
-          </p:cNvPr>
-          <p:cNvSpPr txBox="1">
-            <a:spLocks/>
-          </p:cNvSpPr>
-          <p:nvPr/>
-        </p:nvSpPr>
-        <p:spPr>
-          <a:xfrm>
-            <a:off x="143426" y="6213805"/>
-            <a:ext cx="2754086" cy="558140"/>
-          </a:xfrm>
-          <a:prstGeom prst="rect">
-            <a:avLst/>
-          </a:prstGeom>
-        </p:spPr>
-        <p:txBody>
-          <a:bodyPr vert="horz" lIns="91440" tIns="45720" rIns="91440" bIns="45720" rtlCol="0">
-            <a:normAutofit/>
-          </a:bodyPr>
-          <a:lstStyle>
-            <a:lvl1pPr marL="228600" indent="-228600" algn="l" defTabSz="914400" rtl="0" eaLnBrk="1" latinLnBrk="0" hangingPunct="1">
-              <a:lnSpc>
-                <a:spcPct val="90000"/>
-              </a:lnSpc>
-              <a:spcBef>
-                <a:spcPts val="1000"/>
-              </a:spcBef>
-              <a:buFont typeface="Arial" panose="020B0604020202020204" pitchFamily="34" charset="0"/>
-              <a:buChar char="•"/>
-              <a:defRPr sz="2800" kern="1200">
-                <a:solidFill>
-                  <a:schemeClr val="tx1"/>
-                </a:solidFill>
-                <a:latin typeface="+mn-lt"/>
-                <a:ea typeface="+mn-ea"/>
-                <a:cs typeface="+mn-cs"/>
-              </a:defRPr>
-            </a:lvl1pPr>
-            <a:lvl2pPr marL="685800" indent="-228600" algn="l" defTabSz="914400" rtl="0" eaLnBrk="1" latinLnBrk="0" hangingPunct="1">
-              <a:lnSpc>
-                <a:spcPct val="90000"/>
-              </a:lnSpc>
-              <a:spcBef>
-                <a:spcPts val="500"/>
-              </a:spcBef>
-              <a:buFont typeface="Arial" panose="020B0604020202020204" pitchFamily="34" charset="0"/>
-              <a:buChar char="•"/>
-              <a:defRPr sz="2400" kern="1200">
-                <a:solidFill>
-                  <a:schemeClr val="tx1"/>
-                </a:solidFill>
-                <a:latin typeface="+mn-lt"/>
-                <a:ea typeface="+mn-ea"/>
-                <a:cs typeface="+mn-cs"/>
-              </a:defRPr>
-            </a:lvl2pPr>
-            <a:lvl3pPr marL="1143000" indent="-228600" algn="l" defTabSz="914400" rtl="0" eaLnBrk="1" latinLnBrk="0" hangingPunct="1">
-              <a:lnSpc>
-                <a:spcPct val="90000"/>
-              </a:lnSpc>
-              <a:spcBef>
-                <a:spcPts val="500"/>
-              </a:spcBef>
-              <a:buFont typeface="Arial" panose="020B0604020202020204" pitchFamily="34" charset="0"/>
-              <a:buChar char="•"/>
-              <a:defRPr sz="2000" kern="1200">
-                <a:solidFill>
-                  <a:schemeClr val="tx1"/>
-                </a:solidFill>
-                <a:latin typeface="+mn-lt"/>
-                <a:ea typeface="+mn-ea"/>
-                <a:cs typeface="+mn-cs"/>
-              </a:defRPr>
-            </a:lvl3pPr>
-            <a:lvl4pPr marL="1600200" indent="-228600" algn="l" defTabSz="914400" rtl="0" eaLnBrk="1" latinLnBrk="0" hangingPunct="1">
-              <a:lnSpc>
-                <a:spcPct val="90000"/>
-              </a:lnSpc>
-              <a:spcBef>
-                <a:spcPts val="500"/>
-              </a:spcBef>
-              <a:buFont typeface="Arial" panose="020B0604020202020204" pitchFamily="34" charset="0"/>
-              <a:buChar char="•"/>
-              <a:defRPr sz="1800" kern="1200">
-                <a:solidFill>
-                  <a:schemeClr val="tx1"/>
-                </a:solidFill>
-                <a:latin typeface="+mn-lt"/>
-                <a:ea typeface="+mn-ea"/>
-                <a:cs typeface="+mn-cs"/>
-              </a:defRPr>
-            </a:lvl4pPr>
-            <a:lvl5pPr marL="2057400" indent="-228600" algn="l" defTabSz="914400" rtl="0" eaLnBrk="1" latinLnBrk="0" hangingPunct="1">
-              <a:lnSpc>
-                <a:spcPct val="90000"/>
-              </a:lnSpc>
-              <a:spcBef>
-                <a:spcPts val="500"/>
-              </a:spcBef>
-              <a:buFont typeface="Arial" panose="020B0604020202020204" pitchFamily="34" charset="0"/>
-              <a:buChar char="•"/>
-              <a:defRPr sz="1800" kern="1200">
-                <a:solidFill>
-                  <a:schemeClr val="tx1"/>
-                </a:solidFill>
-                <a:latin typeface="+mn-lt"/>
-                <a:ea typeface="+mn-ea"/>
-                <a:cs typeface="+mn-cs"/>
-              </a:defRPr>
-            </a:lvl5pPr>
-            <a:lvl6pPr marL="2514600" indent="-228600" algn="l" defTabSz="914400" rtl="0" eaLnBrk="1" latinLnBrk="0" hangingPunct="1">
-              <a:lnSpc>
-                <a:spcPct val="90000"/>
-              </a:lnSpc>
-              <a:spcBef>
-                <a:spcPts val="500"/>
-              </a:spcBef>
-              <a:buFont typeface="Arial" panose="020B0604020202020204" pitchFamily="34" charset="0"/>
-              <a:buChar char="•"/>
-              <a:defRPr sz="1800" kern="1200">
-                <a:solidFill>
-                  <a:schemeClr val="tx1"/>
-                </a:solidFill>
-                <a:latin typeface="+mn-lt"/>
-                <a:ea typeface="+mn-ea"/>
-                <a:cs typeface="+mn-cs"/>
-              </a:defRPr>
-            </a:lvl6pPr>
-            <a:lvl7pPr marL="2971800" indent="-228600" algn="l" defTabSz="914400" rtl="0" eaLnBrk="1" latinLnBrk="0" hangingPunct="1">
-              <a:lnSpc>
-                <a:spcPct val="90000"/>
-              </a:lnSpc>
-              <a:spcBef>
-                <a:spcPts val="500"/>
-              </a:spcBef>
-              <a:buFont typeface="Arial" panose="020B0604020202020204" pitchFamily="34" charset="0"/>
-              <a:buChar char="•"/>
-              <a:defRPr sz="1800" kern="1200">
-                <a:solidFill>
-                  <a:schemeClr val="tx1"/>
-                </a:solidFill>
-                <a:latin typeface="+mn-lt"/>
-                <a:ea typeface="+mn-ea"/>
-                <a:cs typeface="+mn-cs"/>
-              </a:defRPr>
-            </a:lvl7pPr>
-            <a:lvl8pPr marL="3429000" indent="-228600" algn="l" defTabSz="914400" rtl="0" eaLnBrk="1" latinLnBrk="0" hangingPunct="1">
-              <a:lnSpc>
-                <a:spcPct val="90000"/>
-              </a:lnSpc>
-              <a:spcBef>
-                <a:spcPts val="500"/>
-              </a:spcBef>
-              <a:buFont typeface="Arial" panose="020B0604020202020204" pitchFamily="34" charset="0"/>
-              <a:buChar char="•"/>
-              <a:defRPr sz="1800" kern="1200">
-                <a:solidFill>
-                  <a:schemeClr val="tx1"/>
-                </a:solidFill>
-                <a:latin typeface="+mn-lt"/>
-                <a:ea typeface="+mn-ea"/>
-                <a:cs typeface="+mn-cs"/>
-              </a:defRPr>
-            </a:lvl8pPr>
-            <a:lvl9pPr marL="3886200" indent="-228600" algn="l" defTabSz="914400" rtl="0" eaLnBrk="1" latinLnBrk="0" hangingPunct="1">
-              <a:lnSpc>
-                <a:spcPct val="90000"/>
-              </a:lnSpc>
-              <a:spcBef>
-                <a:spcPts val="500"/>
-              </a:spcBef>
-              <a:buFont typeface="Arial" panose="020B0604020202020204" pitchFamily="34" charset="0"/>
-              <a:buChar char="•"/>
-              <a:defRPr sz="1800" kern="1200">
-                <a:solidFill>
-                  <a:schemeClr val="tx1"/>
-                </a:solidFill>
-                <a:latin typeface="+mn-lt"/>
-                <a:ea typeface="+mn-ea"/>
-                <a:cs typeface="+mn-cs"/>
-              </a:defRPr>
-            </a:lvl9pPr>
-          </a:lstStyle>
-          <a:p>
-            <a:pPr marL="0" indent="0">
-              <a:buFont typeface="Arial" panose="020B0604020202020204" pitchFamily="34" charset="0"/>
-              <a:buNone/>
-            </a:pPr>
-            <a:r>
-              <a:rPr lang="en-US" dirty="0"/>
-              <a:t>Garrick Bruening</a:t>
-            </a:r>
-          </a:p>
-        </p:txBody>
-      </p:sp>
     </p:spTree>
     <p:extLst>
       <p:ext uri="{BB962C8B-B14F-4D97-AF65-F5344CB8AC3E}">
-        <p14:creationId xmlns:p14="http://schemas.microsoft.com/office/powerpoint/2010/main" val="3395039574"/>
+        <p14:creationId xmlns:p14="http://schemas.microsoft.com/office/powerpoint/2010/main" val="236845595"/>
       </p:ext>
     </p:extLst>
   </p:cSld>
   <p:clrMapOvr>
     <a:masterClrMapping/>
   </p:clrMapOvr>
+  <mc:AlternateContent xmlns:mc="http://schemas.openxmlformats.org/markup-compatibility/2006">
+    <mc:Choice xmlns:p14="http://schemas.microsoft.com/office/powerpoint/2010/main" Requires="p14">
+      <p:transition p14:dur="300">
+        <p:fade/>
+      </p:transition>
+    </mc:Choice>
+    <mc:Fallback>
+      <p:transition>
+        <p:fade/>
+      </p:transition>
+    </mc:Fallback>
+  </mc:AlternateContent>
+  <p:timing>
+    <p:tnLst>
+      <p:par>
+        <p:cTn id="1" dur="indefinite" restart="never" nodeType="tmRoot">
+          <p:childTnLst>
+            <p:seq concurrent="1" nextAc="seek">
+              <p:cTn id="2" dur="indefinite" nodeType="mainSeq">
+                <p:childTnLst>
+                  <p:par>
+                    <p:cTn id="3" fill="hold">
+                      <p:stCondLst>
+                        <p:cond delay="indefinite"/>
+                      </p:stCondLst>
+                      <p:childTnLst>
+                        <p:par>
+                          <p:cTn id="4" fill="hold">
+                            <p:stCondLst>
+                              <p:cond delay="0"/>
+                            </p:stCondLst>
+                            <p:childTnLst>
+                              <p:par>
+                                <p:cTn id="5" presetID="10" presetClass="entr" presetSubtype="0" fill="hold" nodeType="clickEffect">
+                                  <p:stCondLst>
+                                    <p:cond delay="0"/>
+                                  </p:stCondLst>
+                                  <p:childTnLst>
+                                    <p:set>
+                                      <p:cBhvr>
+                                        <p:cTn id="6" dur="1" fill="hold">
+                                          <p:stCondLst>
+                                            <p:cond delay="0"/>
+                                          </p:stCondLst>
+                                        </p:cTn>
+                                        <p:tgtEl>
+                                          <p:spTgt spid="3">
+                                            <p:txEl>
+                                              <p:pRg st="2" end="2"/>
+                                            </p:txEl>
+                                          </p:spTgt>
+                                        </p:tgtEl>
+                                        <p:attrNameLst>
+                                          <p:attrName>style.visibility</p:attrName>
+                                        </p:attrNameLst>
+                                      </p:cBhvr>
+                                      <p:to>
+                                        <p:strVal val="visible"/>
+                                      </p:to>
+                                    </p:set>
+                                    <p:animEffect transition="in" filter="fade">
+                                      <p:cBhvr>
+                                        <p:cTn id="7" dur="500"/>
+                                        <p:tgtEl>
+                                          <p:spTgt spid="3">
+                                            <p:txEl>
+                                              <p:pRg st="2" end="2"/>
+                                            </p:txEl>
+                                          </p:spTgt>
+                                        </p:tgtEl>
+                                      </p:cBhvr>
+                                    </p:animEffect>
+                                  </p:childTnLst>
+                                </p:cTn>
+                              </p:par>
+                            </p:childTnLst>
+                          </p:cTn>
+                        </p:par>
+                      </p:childTnLst>
+                    </p:cTn>
+                  </p:par>
+                  <p:par>
+                    <p:cTn id="8" fill="hold">
+                      <p:stCondLst>
+                        <p:cond delay="indefinite"/>
+                      </p:stCondLst>
+                      <p:childTnLst>
+                        <p:par>
+                          <p:cTn id="9" fill="hold">
+                            <p:stCondLst>
+                              <p:cond delay="0"/>
+                            </p:stCondLst>
+                            <p:childTnLst>
+                              <p:par>
+                                <p:cTn id="10" presetID="10" presetClass="entr" presetSubtype="0" fill="hold" nodeType="clickEffect">
+                                  <p:stCondLst>
+                                    <p:cond delay="0"/>
+                                  </p:stCondLst>
+                                  <p:childTnLst>
+                                    <p:set>
+                                      <p:cBhvr>
+                                        <p:cTn id="11" dur="1" fill="hold">
+                                          <p:stCondLst>
+                                            <p:cond delay="0"/>
+                                          </p:stCondLst>
+                                        </p:cTn>
+                                        <p:tgtEl>
+                                          <p:spTgt spid="10"/>
+                                        </p:tgtEl>
+                                        <p:attrNameLst>
+                                          <p:attrName>style.visibility</p:attrName>
+                                        </p:attrNameLst>
+                                      </p:cBhvr>
+                                      <p:to>
+                                        <p:strVal val="visible"/>
+                                      </p:to>
+                                    </p:set>
+                                    <p:animEffect transition="in" filter="fade">
+                                      <p:cBhvr>
+                                        <p:cTn id="12" dur="500"/>
+                                        <p:tgtEl>
+                                          <p:spTgt spid="10"/>
+                                        </p:tgtEl>
+                                      </p:cBhvr>
+                                    </p:animEffect>
+                                  </p:childTnLst>
+                                </p:cTn>
+                              </p:par>
+                            </p:childTnLst>
+                          </p:cTn>
+                        </p:par>
+                      </p:childTnLst>
+                    </p:cTn>
+                  </p:par>
+                </p:childTnLst>
+              </p:cTn>
+              <p:prevCondLst>
+                <p:cond evt="onPrev" delay="0">
+                  <p:tgtEl>
+                    <p:sldTgt/>
+                  </p:tgtEl>
+                </p:cond>
+              </p:prevCondLst>
+              <p:nextCondLst>
+                <p:cond evt="onNext" delay="0">
+                  <p:tgtEl>
+                    <p:sldTgt/>
+                  </p:tgtEl>
+                </p:cond>
+              </p:nextCondLst>
+            </p:seq>
+          </p:childTnLst>
+        </p:cTn>
+      </p:par>
+    </p:tnLst>
+  </p:timing>
 </p:sld>
 </file>
 
-<file path=ppt/slides/slide5.xml><?xml version="1.0" encoding="utf-8"?>
-<p:sld xmlns:a="http://schemas.openxmlformats.org/drawingml/2006/main" xmlns:r="http://schemas.openxmlformats.org/officeDocument/2006/relationships" xmlns:p="http://schemas.openxmlformats.org/presentationml/2006/main">
+<file path=ppt/slides/slide4.xml><?xml version="1.0" encoding="utf-8"?>
+<p:sld xmlns:a="http://schemas.openxmlformats.org/drawingml/2006/main" xmlns:r="http://schemas.openxmlformats.org/officeDocument/2006/relationships" xmlns:p="http://schemas.openxmlformats.org/presentationml/2006/main" show="0">
   <p:cSld>
     <p:spTree>
       <p:nvGrpSpPr>
@@ -5516,10 +5532,10 @@
       </p:grpSpPr>
       <p:sp>
         <p:nvSpPr>
-          <p:cNvPr id="6" name="Title 1">
+          <p:cNvPr id="7" name="Content Placeholder 2">
             <a:extLst>
               <a:ext uri="{FF2B5EF4-FFF2-40B4-BE49-F238E27FC236}">
-                <a16:creationId xmlns:a16="http://schemas.microsoft.com/office/drawing/2014/main" id="{07D9BA98-FBA7-400E-B659-CE08722F4086}"/>
+                <a16:creationId xmlns:a16="http://schemas.microsoft.com/office/drawing/2014/main" id="{D713D7AB-A025-4DB6-B232-FF4B7E9D2EDF}"/>
               </a:ext>
             </a:extLst>
           </p:cNvPr>
@@ -5530,56 +5546,192 @@
         </p:nvSpPr>
         <p:spPr>
           <a:xfrm>
-            <a:off x="468365" y="216191"/>
-            <a:ext cx="6025877" cy="872542"/>
+            <a:off x="838200" y="1825625"/>
+            <a:ext cx="6443628" cy="4351338"/>
           </a:xfrm>
           <a:prstGeom prst="rect">
             <a:avLst/>
           </a:prstGeom>
         </p:spPr>
         <p:txBody>
-          <a:bodyPr vert="horz" lIns="91440" tIns="45720" rIns="91440" bIns="45720" rtlCol="0" anchor="b">
-            <a:normAutofit fontScale="77500" lnSpcReduction="20000"/>
+          <a:bodyPr vert="horz" lIns="91440" tIns="45720" rIns="91440" bIns="45720" rtlCol="0">
+            <a:normAutofit/>
           </a:bodyPr>
           <a:lstStyle>
-            <a:lvl1pPr algn="ctr" defTabSz="914400" rtl="0" eaLnBrk="1" latinLnBrk="0" hangingPunct="1">
-              <a:lnSpc>
-                <a:spcPct val="90000"/>
-              </a:lnSpc>
-              <a:spcBef>
-                <a:spcPct val="0"/>
-              </a:spcBef>
-              <a:buNone/>
-              <a:defRPr sz="6000" kern="1200">
-                <a:solidFill>
-                  <a:schemeClr val="tx1"/>
-                </a:solidFill>
-                <a:latin typeface="+mj-lt"/>
-                <a:ea typeface="+mj-ea"/>
-                <a:cs typeface="+mj-cs"/>
+            <a:lvl1pPr marL="0" indent="0" algn="ctr" defTabSz="914400" rtl="0" eaLnBrk="1" latinLnBrk="0" hangingPunct="1">
+              <a:lnSpc>
+                <a:spcPct val="90000"/>
+              </a:lnSpc>
+              <a:spcBef>
+                <a:spcPts val="1000"/>
+              </a:spcBef>
+              <a:buFont typeface="Arial" panose="020B0604020202020204" pitchFamily="34" charset="0"/>
+              <a:buNone/>
+              <a:defRPr sz="2400" kern="1200">
+                <a:solidFill>
+                  <a:schemeClr val="tx1"/>
+                </a:solidFill>
+                <a:latin typeface="+mn-lt"/>
+                <a:ea typeface="+mn-ea"/>
+                <a:cs typeface="+mn-cs"/>
               </a:defRPr>
             </a:lvl1pPr>
+            <a:lvl2pPr marL="457200" indent="0" algn="ctr" defTabSz="914400" rtl="0" eaLnBrk="1" latinLnBrk="0" hangingPunct="1">
+              <a:lnSpc>
+                <a:spcPct val="90000"/>
+              </a:lnSpc>
+              <a:spcBef>
+                <a:spcPts val="500"/>
+              </a:spcBef>
+              <a:buFont typeface="Arial" panose="020B0604020202020204" pitchFamily="34" charset="0"/>
+              <a:buNone/>
+              <a:defRPr sz="2000" kern="1200">
+                <a:solidFill>
+                  <a:schemeClr val="tx1"/>
+                </a:solidFill>
+                <a:latin typeface="+mn-lt"/>
+                <a:ea typeface="+mn-ea"/>
+                <a:cs typeface="+mn-cs"/>
+              </a:defRPr>
+            </a:lvl2pPr>
+            <a:lvl3pPr marL="914400" indent="0" algn="ctr" defTabSz="914400" rtl="0" eaLnBrk="1" latinLnBrk="0" hangingPunct="1">
+              <a:lnSpc>
+                <a:spcPct val="90000"/>
+              </a:lnSpc>
+              <a:spcBef>
+                <a:spcPts val="500"/>
+              </a:spcBef>
+              <a:buFont typeface="Arial" panose="020B0604020202020204" pitchFamily="34" charset="0"/>
+              <a:buNone/>
+              <a:defRPr sz="1800" kern="1200">
+                <a:solidFill>
+                  <a:schemeClr val="tx1"/>
+                </a:solidFill>
+                <a:latin typeface="+mn-lt"/>
+                <a:ea typeface="+mn-ea"/>
+                <a:cs typeface="+mn-cs"/>
+              </a:defRPr>
+            </a:lvl3pPr>
+            <a:lvl4pPr marL="1371600" indent="0" algn="ctr" defTabSz="914400" rtl="0" eaLnBrk="1" latinLnBrk="0" hangingPunct="1">
+              <a:lnSpc>
+                <a:spcPct val="90000"/>
+              </a:lnSpc>
+              <a:spcBef>
+                <a:spcPts val="500"/>
+              </a:spcBef>
+              <a:buFont typeface="Arial" panose="020B0604020202020204" pitchFamily="34" charset="0"/>
+              <a:buNone/>
+              <a:defRPr sz="1600" kern="1200">
+                <a:solidFill>
+                  <a:schemeClr val="tx1"/>
+                </a:solidFill>
+                <a:latin typeface="+mn-lt"/>
+                <a:ea typeface="+mn-ea"/>
+                <a:cs typeface="+mn-cs"/>
+              </a:defRPr>
+            </a:lvl4pPr>
+            <a:lvl5pPr marL="1828800" indent="0" algn="ctr" defTabSz="914400" rtl="0" eaLnBrk="1" latinLnBrk="0" hangingPunct="1">
+              <a:lnSpc>
+                <a:spcPct val="90000"/>
+              </a:lnSpc>
+              <a:spcBef>
+                <a:spcPts val="500"/>
+              </a:spcBef>
+              <a:buFont typeface="Arial" panose="020B0604020202020204" pitchFamily="34" charset="0"/>
+              <a:buNone/>
+              <a:defRPr sz="1600" kern="1200">
+                <a:solidFill>
+                  <a:schemeClr val="tx1"/>
+                </a:solidFill>
+                <a:latin typeface="+mn-lt"/>
+                <a:ea typeface="+mn-ea"/>
+                <a:cs typeface="+mn-cs"/>
+              </a:defRPr>
+            </a:lvl5pPr>
+            <a:lvl6pPr marL="2286000" indent="0" algn="ctr" defTabSz="914400" rtl="0" eaLnBrk="1" latinLnBrk="0" hangingPunct="1">
+              <a:lnSpc>
+                <a:spcPct val="90000"/>
+              </a:lnSpc>
+              <a:spcBef>
+                <a:spcPts val="500"/>
+              </a:spcBef>
+              <a:buFont typeface="Arial" panose="020B0604020202020204" pitchFamily="34" charset="0"/>
+              <a:buNone/>
+              <a:defRPr sz="1600" kern="1200">
+                <a:solidFill>
+                  <a:schemeClr val="tx1"/>
+                </a:solidFill>
+                <a:latin typeface="+mn-lt"/>
+                <a:ea typeface="+mn-ea"/>
+                <a:cs typeface="+mn-cs"/>
+              </a:defRPr>
+            </a:lvl6pPr>
+            <a:lvl7pPr marL="2743200" indent="0" algn="ctr" defTabSz="914400" rtl="0" eaLnBrk="1" latinLnBrk="0" hangingPunct="1">
+              <a:lnSpc>
+                <a:spcPct val="90000"/>
+              </a:lnSpc>
+              <a:spcBef>
+                <a:spcPts val="500"/>
+              </a:spcBef>
+              <a:buFont typeface="Arial" panose="020B0604020202020204" pitchFamily="34" charset="0"/>
+              <a:buNone/>
+              <a:defRPr sz="1600" kern="1200">
+                <a:solidFill>
+                  <a:schemeClr val="tx1"/>
+                </a:solidFill>
+                <a:latin typeface="+mn-lt"/>
+                <a:ea typeface="+mn-ea"/>
+                <a:cs typeface="+mn-cs"/>
+              </a:defRPr>
+            </a:lvl7pPr>
+            <a:lvl8pPr marL="3200400" indent="0" algn="ctr" defTabSz="914400" rtl="0" eaLnBrk="1" latinLnBrk="0" hangingPunct="1">
+              <a:lnSpc>
+                <a:spcPct val="90000"/>
+              </a:lnSpc>
+              <a:spcBef>
+                <a:spcPts val="500"/>
+              </a:spcBef>
+              <a:buFont typeface="Arial" panose="020B0604020202020204" pitchFamily="34" charset="0"/>
+              <a:buNone/>
+              <a:defRPr sz="1600" kern="1200">
+                <a:solidFill>
+                  <a:schemeClr val="tx1"/>
+                </a:solidFill>
+                <a:latin typeface="+mn-lt"/>
+                <a:ea typeface="+mn-ea"/>
+                <a:cs typeface="+mn-cs"/>
+              </a:defRPr>
+            </a:lvl8pPr>
+            <a:lvl9pPr marL="3657600" indent="0" algn="ctr" defTabSz="914400" rtl="0" eaLnBrk="1" latinLnBrk="0" hangingPunct="1">
+              <a:lnSpc>
+                <a:spcPct val="90000"/>
+              </a:lnSpc>
+              <a:spcBef>
+                <a:spcPts val="500"/>
+              </a:spcBef>
+              <a:buFont typeface="Arial" panose="020B0604020202020204" pitchFamily="34" charset="0"/>
+              <a:buNone/>
+              <a:defRPr sz="1600" kern="1200">
+                <a:solidFill>
+                  <a:schemeClr val="tx1"/>
+                </a:solidFill>
+                <a:latin typeface="+mn-lt"/>
+                <a:ea typeface="+mn-ea"/>
+                <a:cs typeface="+mn-cs"/>
+              </a:defRPr>
+            </a:lvl9pPr>
           </a:lstStyle>
           <a:p>
-            <a:pPr algn="l"/>
-            <a:r>
-              <a:rPr lang="en-US" dirty="0">
-                <a:solidFill>
-                  <a:srgbClr val="FFCC00"/>
-                </a:solidFill>
-                <a:latin typeface="+mn-lt"/>
-              </a:rPr>
-              <a:t>Aggregated Group data</a:t>
-            </a:r>
-          </a:p>
-        </p:txBody>
-      </p:sp>
-      <p:sp>
-        <p:nvSpPr>
-          <p:cNvPr id="7" name="Content Placeholder 2">
+            <a:endParaRPr lang="en-US" dirty="0"/>
+          </a:p>
+        </p:txBody>
+      </p:sp>
+      <p:sp>
+        <p:nvSpPr>
+          <p:cNvPr id="11" name="Content Placeholder 2">
             <a:extLst>
               <a:ext uri="{FF2B5EF4-FFF2-40B4-BE49-F238E27FC236}">
-                <a16:creationId xmlns:a16="http://schemas.microsoft.com/office/drawing/2014/main" id="{C12F1A20-35FC-44A7-8F84-3A695133EDA2}"/>
+                <a16:creationId xmlns:a16="http://schemas.microsoft.com/office/drawing/2014/main" id="{CAE7C721-240E-4E35-B61A-D4CB70AD2F45}"/>
               </a:ext>
             </a:extLst>
           </p:cNvPr>
@@ -5772,7 +5924,7 @@
             </a:pPr>
             <a:r>
               <a:rPr lang="en-US" dirty="0"/>
-              <a:t>Can also display the average progression of other groups.</a:t>
+              <a:t>We can present each groups progression in easily understandable manner.</a:t>
             </a:r>
           </a:p>
           <a:p>
@@ -5789,8 +5941,12 @@
             </a:pPr>
             <a:r>
               <a:rPr lang="en-US" dirty="0"/>
-              <a:t>Can also be shown with individual progress for comparison purposes.</a:t>
-            </a:r>
+              <a:t>Showing progression over time instead of only for a given day.</a:t>
+            </a:r>
+          </a:p>
+          <a:p>
+            <a:pPr algn="l"/>
+            <a:endParaRPr lang="en-US" dirty="0"/>
           </a:p>
           <a:p>
             <a:pPr marL="342900" indent="-342900" algn="l">
@@ -5799,42 +5955,217 @@
             </a:pPr>
             <a:endParaRPr lang="en-US" dirty="0"/>
           </a:p>
-          <a:p>
-            <a:pPr marL="342900" indent="-342900" algn="l">
+        </p:txBody>
+      </p:sp>
+      <p:sp>
+        <p:nvSpPr>
+          <p:cNvPr id="9" name="Content Placeholder 2">
+            <a:extLst>
+              <a:ext uri="{FF2B5EF4-FFF2-40B4-BE49-F238E27FC236}">
+                <a16:creationId xmlns:a16="http://schemas.microsoft.com/office/drawing/2014/main" id="{074C932A-56EE-4B35-B49C-C13D9E4E2C86}"/>
+              </a:ext>
+            </a:extLst>
+          </p:cNvPr>
+          <p:cNvSpPr txBox="1">
+            <a:spLocks/>
+          </p:cNvSpPr>
+          <p:nvPr/>
+        </p:nvSpPr>
+        <p:spPr>
+          <a:xfrm>
+            <a:off x="143426" y="6213805"/>
+            <a:ext cx="2754086" cy="558140"/>
+          </a:xfrm>
+          <a:prstGeom prst="rect">
+            <a:avLst/>
+          </a:prstGeom>
+        </p:spPr>
+        <p:txBody>
+          <a:bodyPr vert="horz" lIns="91440" tIns="45720" rIns="91440" bIns="45720" rtlCol="0">
+            <a:normAutofit/>
+          </a:bodyPr>
+          <a:lstStyle>
+            <a:lvl1pPr marL="228600" indent="-228600" algn="l" defTabSz="914400" rtl="0" eaLnBrk="1" latinLnBrk="0" hangingPunct="1">
+              <a:lnSpc>
+                <a:spcPct val="90000"/>
+              </a:lnSpc>
+              <a:spcBef>
+                <a:spcPts val="1000"/>
+              </a:spcBef>
               <a:buFont typeface="Arial" panose="020B0604020202020204" pitchFamily="34" charset="0"/>
               <a:buChar char="•"/>
+              <a:defRPr sz="2800" kern="1200">
+                <a:solidFill>
+                  <a:schemeClr val="tx1"/>
+                </a:solidFill>
+                <a:latin typeface="+mn-lt"/>
+                <a:ea typeface="+mn-ea"/>
+                <a:cs typeface="+mn-cs"/>
+              </a:defRPr>
+            </a:lvl1pPr>
+            <a:lvl2pPr marL="685800" indent="-228600" algn="l" defTabSz="914400" rtl="0" eaLnBrk="1" latinLnBrk="0" hangingPunct="1">
+              <a:lnSpc>
+                <a:spcPct val="90000"/>
+              </a:lnSpc>
+              <a:spcBef>
+                <a:spcPts val="500"/>
+              </a:spcBef>
+              <a:buFont typeface="Arial" panose="020B0604020202020204" pitchFamily="34" charset="0"/>
+              <a:buChar char="•"/>
+              <a:defRPr sz="2400" kern="1200">
+                <a:solidFill>
+                  <a:schemeClr val="tx1"/>
+                </a:solidFill>
+                <a:latin typeface="+mn-lt"/>
+                <a:ea typeface="+mn-ea"/>
+                <a:cs typeface="+mn-cs"/>
+              </a:defRPr>
+            </a:lvl2pPr>
+            <a:lvl3pPr marL="1143000" indent="-228600" algn="l" defTabSz="914400" rtl="0" eaLnBrk="1" latinLnBrk="0" hangingPunct="1">
+              <a:lnSpc>
+                <a:spcPct val="90000"/>
+              </a:lnSpc>
+              <a:spcBef>
+                <a:spcPts val="500"/>
+              </a:spcBef>
+              <a:buFont typeface="Arial" panose="020B0604020202020204" pitchFamily="34" charset="0"/>
+              <a:buChar char="•"/>
+              <a:defRPr sz="2000" kern="1200">
+                <a:solidFill>
+                  <a:schemeClr val="tx1"/>
+                </a:solidFill>
+                <a:latin typeface="+mn-lt"/>
+                <a:ea typeface="+mn-ea"/>
+                <a:cs typeface="+mn-cs"/>
+              </a:defRPr>
+            </a:lvl3pPr>
+            <a:lvl4pPr marL="1600200" indent="-228600" algn="l" defTabSz="914400" rtl="0" eaLnBrk="1" latinLnBrk="0" hangingPunct="1">
+              <a:lnSpc>
+                <a:spcPct val="90000"/>
+              </a:lnSpc>
+              <a:spcBef>
+                <a:spcPts val="500"/>
+              </a:spcBef>
+              <a:buFont typeface="Arial" panose="020B0604020202020204" pitchFamily="34" charset="0"/>
+              <a:buChar char="•"/>
+              <a:defRPr sz="1800" kern="1200">
+                <a:solidFill>
+                  <a:schemeClr val="tx1"/>
+                </a:solidFill>
+                <a:latin typeface="+mn-lt"/>
+                <a:ea typeface="+mn-ea"/>
+                <a:cs typeface="+mn-cs"/>
+              </a:defRPr>
+            </a:lvl4pPr>
+            <a:lvl5pPr marL="2057400" indent="-228600" algn="l" defTabSz="914400" rtl="0" eaLnBrk="1" latinLnBrk="0" hangingPunct="1">
+              <a:lnSpc>
+                <a:spcPct val="90000"/>
+              </a:lnSpc>
+              <a:spcBef>
+                <a:spcPts val="500"/>
+              </a:spcBef>
+              <a:buFont typeface="Arial" panose="020B0604020202020204" pitchFamily="34" charset="0"/>
+              <a:buChar char="•"/>
+              <a:defRPr sz="1800" kern="1200">
+                <a:solidFill>
+                  <a:schemeClr val="tx1"/>
+                </a:solidFill>
+                <a:latin typeface="+mn-lt"/>
+                <a:ea typeface="+mn-ea"/>
+                <a:cs typeface="+mn-cs"/>
+              </a:defRPr>
+            </a:lvl5pPr>
+            <a:lvl6pPr marL="2514600" indent="-228600" algn="l" defTabSz="914400" rtl="0" eaLnBrk="1" latinLnBrk="0" hangingPunct="1">
+              <a:lnSpc>
+                <a:spcPct val="90000"/>
+              </a:lnSpc>
+              <a:spcBef>
+                <a:spcPts val="500"/>
+              </a:spcBef>
+              <a:buFont typeface="Arial" panose="020B0604020202020204" pitchFamily="34" charset="0"/>
+              <a:buChar char="•"/>
+              <a:defRPr sz="1800" kern="1200">
+                <a:solidFill>
+                  <a:schemeClr val="tx1"/>
+                </a:solidFill>
+                <a:latin typeface="+mn-lt"/>
+                <a:ea typeface="+mn-ea"/>
+                <a:cs typeface="+mn-cs"/>
+              </a:defRPr>
+            </a:lvl6pPr>
+            <a:lvl7pPr marL="2971800" indent="-228600" algn="l" defTabSz="914400" rtl="0" eaLnBrk="1" latinLnBrk="0" hangingPunct="1">
+              <a:lnSpc>
+                <a:spcPct val="90000"/>
+              </a:lnSpc>
+              <a:spcBef>
+                <a:spcPts val="500"/>
+              </a:spcBef>
+              <a:buFont typeface="Arial" panose="020B0604020202020204" pitchFamily="34" charset="0"/>
+              <a:buChar char="•"/>
+              <a:defRPr sz="1800" kern="1200">
+                <a:solidFill>
+                  <a:schemeClr val="tx1"/>
+                </a:solidFill>
+                <a:latin typeface="+mn-lt"/>
+                <a:ea typeface="+mn-ea"/>
+                <a:cs typeface="+mn-cs"/>
+              </a:defRPr>
+            </a:lvl7pPr>
+            <a:lvl8pPr marL="3429000" indent="-228600" algn="l" defTabSz="914400" rtl="0" eaLnBrk="1" latinLnBrk="0" hangingPunct="1">
+              <a:lnSpc>
+                <a:spcPct val="90000"/>
+              </a:lnSpc>
+              <a:spcBef>
+                <a:spcPts val="500"/>
+              </a:spcBef>
+              <a:buFont typeface="Arial" panose="020B0604020202020204" pitchFamily="34" charset="0"/>
+              <a:buChar char="•"/>
+              <a:defRPr sz="1800" kern="1200">
+                <a:solidFill>
+                  <a:schemeClr val="tx1"/>
+                </a:solidFill>
+                <a:latin typeface="+mn-lt"/>
+                <a:ea typeface="+mn-ea"/>
+                <a:cs typeface="+mn-cs"/>
+              </a:defRPr>
+            </a:lvl8pPr>
+            <a:lvl9pPr marL="3886200" indent="-228600" algn="l" defTabSz="914400" rtl="0" eaLnBrk="1" latinLnBrk="0" hangingPunct="1">
+              <a:lnSpc>
+                <a:spcPct val="90000"/>
+              </a:lnSpc>
+              <a:spcBef>
+                <a:spcPts val="500"/>
+              </a:spcBef>
+              <a:buFont typeface="Arial" panose="020B0604020202020204" pitchFamily="34" charset="0"/>
+              <a:buChar char="•"/>
+              <a:defRPr sz="1800" kern="1200">
+                <a:solidFill>
+                  <a:schemeClr val="tx1"/>
+                </a:solidFill>
+                <a:latin typeface="+mn-lt"/>
+                <a:ea typeface="+mn-ea"/>
+                <a:cs typeface="+mn-cs"/>
+              </a:defRPr>
+            </a:lvl9pPr>
+          </a:lstStyle>
+          <a:p>
+            <a:pPr marL="0" indent="0">
+              <a:buFont typeface="Arial" panose="020B0604020202020204" pitchFamily="34" charset="0"/>
+              <a:buNone/>
             </a:pPr>
             <a:r>
               <a:rPr lang="en-US" dirty="0"/>
-              <a:t>This can be used to develop a model of possible success.</a:t>
-            </a:r>
-          </a:p>
-          <a:p>
-            <a:pPr marL="342900" indent="-342900" algn="l">
-              <a:buFont typeface="Arial" panose="020B0604020202020204" pitchFamily="34" charset="0"/>
-              <a:buChar char="•"/>
-            </a:pPr>
-            <a:endParaRPr lang="en-US" dirty="0"/>
-          </a:p>
-          <a:p>
-            <a:pPr algn="l"/>
-            <a:endParaRPr lang="en-US" dirty="0"/>
-          </a:p>
-          <a:p>
-            <a:pPr marL="342900" indent="-342900" algn="l">
-              <a:buFont typeface="Arial" panose="020B0604020202020204" pitchFamily="34" charset="0"/>
-              <a:buChar char="•"/>
-            </a:pPr>
-            <a:endParaRPr lang="en-US" dirty="0"/>
+              <a:t>Garrick Bruening</a:t>
+            </a:r>
           </a:p>
         </p:txBody>
       </p:sp>
       <p:pic>
         <p:nvPicPr>
-          <p:cNvPr id="18" name="Picture 17" descr="A screenshot of a computer&#10;&#10;Description automatically generated with medium confidence">
+          <p:cNvPr id="4" name="Picture 3" descr="A screenshot of a computer&#10;&#10;Description automatically generated with medium confidence">
             <a:extLst>
               <a:ext uri="{FF2B5EF4-FFF2-40B4-BE49-F238E27FC236}">
-                <a16:creationId xmlns:a16="http://schemas.microsoft.com/office/drawing/2014/main" id="{AC35C490-8479-4944-B97B-8B3E2874EE84}"/>
+                <a16:creationId xmlns:a16="http://schemas.microsoft.com/office/drawing/2014/main" id="{429B2013-E205-45EF-BCF4-F412B3ADD1C8}"/>
               </a:ext>
             </a:extLst>
           </p:cNvPr>
@@ -5857,20 +6188,478 @@
         </p:blipFill>
         <p:spPr>
           <a:xfrm>
-            <a:off x="6743699" y="1361935"/>
-            <a:ext cx="3808036" cy="1825203"/>
+            <a:off x="4913523" y="1634368"/>
+            <a:ext cx="6925708" cy="3810260"/>
           </a:xfrm>
           <a:prstGeom prst="rect">
             <a:avLst/>
           </a:prstGeom>
         </p:spPr>
       </p:pic>
+      <p:sp>
+        <p:nvSpPr>
+          <p:cNvPr id="13" name="Title 1">
+            <a:extLst>
+              <a:ext uri="{FF2B5EF4-FFF2-40B4-BE49-F238E27FC236}">
+                <a16:creationId xmlns:a16="http://schemas.microsoft.com/office/drawing/2014/main" id="{9A9ACBCB-268A-49A9-B441-1CFC8F0CA49D}"/>
+              </a:ext>
+            </a:extLst>
+          </p:cNvPr>
+          <p:cNvSpPr txBox="1">
+            <a:spLocks/>
+          </p:cNvSpPr>
+          <p:nvPr/>
+        </p:nvSpPr>
+        <p:spPr>
+          <a:xfrm>
+            <a:off x="468365" y="244766"/>
+            <a:ext cx="9766768" cy="1860659"/>
+          </a:xfrm>
+          <a:prstGeom prst="rect">
+            <a:avLst/>
+          </a:prstGeom>
+        </p:spPr>
+        <p:txBody>
+          <a:bodyPr vert="horz" lIns="91440" tIns="45720" rIns="91440" bIns="45720" rtlCol="0" anchor="t">
+            <a:normAutofit/>
+          </a:bodyPr>
+          <a:lstStyle>
+            <a:lvl1pPr algn="ctr" defTabSz="914400" rtl="0" eaLnBrk="1" latinLnBrk="0" hangingPunct="1">
+              <a:lnSpc>
+                <a:spcPct val="90000"/>
+              </a:lnSpc>
+              <a:spcBef>
+                <a:spcPct val="0"/>
+              </a:spcBef>
+              <a:buNone/>
+              <a:defRPr sz="6000" kern="1200">
+                <a:solidFill>
+                  <a:schemeClr val="tx1"/>
+                </a:solidFill>
+                <a:latin typeface="+mj-lt"/>
+                <a:ea typeface="+mj-ea"/>
+                <a:cs typeface="+mj-cs"/>
+              </a:defRPr>
+            </a:lvl1pPr>
+          </a:lstStyle>
+          <a:p>
+            <a:pPr algn="l"/>
+            <a:r>
+              <a:rPr lang="en-US" sz="4000" dirty="0">
+                <a:solidFill>
+                  <a:srgbClr val="FFCC00"/>
+                </a:solidFill>
+                <a:latin typeface="+mn-lt"/>
+              </a:rPr>
+              <a:t>Individual group data</a:t>
+            </a:r>
+          </a:p>
+          <a:p>
+            <a:pPr algn="l"/>
+            <a:endParaRPr lang="en-US" sz="4000" dirty="0">
+              <a:solidFill>
+                <a:srgbClr val="FFCC00"/>
+              </a:solidFill>
+              <a:latin typeface="+mn-lt"/>
+            </a:endParaRPr>
+          </a:p>
+        </p:txBody>
+      </p:sp>
+    </p:spTree>
+    <p:extLst>
+      <p:ext uri="{BB962C8B-B14F-4D97-AF65-F5344CB8AC3E}">
+        <p14:creationId xmlns:p14="http://schemas.microsoft.com/office/powerpoint/2010/main" val="3395039574"/>
+      </p:ext>
+    </p:extLst>
+  </p:cSld>
+  <p:clrMapOvr>
+    <a:masterClrMapping/>
+  </p:clrMapOvr>
+  <mc:AlternateContent xmlns:mc="http://schemas.openxmlformats.org/markup-compatibility/2006">
+    <mc:Choice xmlns:p14="http://schemas.microsoft.com/office/powerpoint/2010/main" Requires="p14">
+      <p:transition p14:dur="300">
+        <p:fade/>
+      </p:transition>
+    </mc:Choice>
+    <mc:Fallback>
+      <p:transition>
+        <p:fade/>
+      </p:transition>
+    </mc:Fallback>
+  </mc:AlternateContent>
+  <p:timing>
+    <p:tnLst>
+      <p:par>
+        <p:cTn id="1" dur="indefinite" restart="never" nodeType="tmRoot">
+          <p:childTnLst>
+            <p:seq concurrent="1" nextAc="seek">
+              <p:cTn id="2" dur="indefinite" nodeType="mainSeq">
+                <p:childTnLst>
+                  <p:par>
+                    <p:cTn id="3" fill="hold">
+                      <p:stCondLst>
+                        <p:cond delay="indefinite"/>
+                      </p:stCondLst>
+                      <p:childTnLst>
+                        <p:par>
+                          <p:cTn id="4" fill="hold">
+                            <p:stCondLst>
+                              <p:cond delay="0"/>
+                            </p:stCondLst>
+                            <p:childTnLst>
+                              <p:par>
+                                <p:cTn id="5" presetID="10" presetClass="entr" presetSubtype="0" fill="hold" nodeType="clickEffect">
+                                  <p:stCondLst>
+                                    <p:cond delay="0"/>
+                                  </p:stCondLst>
+                                  <p:childTnLst>
+                                    <p:set>
+                                      <p:cBhvr>
+                                        <p:cTn id="6" dur="1" fill="hold">
+                                          <p:stCondLst>
+                                            <p:cond delay="0"/>
+                                          </p:stCondLst>
+                                        </p:cTn>
+                                        <p:tgtEl>
+                                          <p:spTgt spid="4"/>
+                                        </p:tgtEl>
+                                        <p:attrNameLst>
+                                          <p:attrName>style.visibility</p:attrName>
+                                        </p:attrNameLst>
+                                      </p:cBhvr>
+                                      <p:to>
+                                        <p:strVal val="visible"/>
+                                      </p:to>
+                                    </p:set>
+                                    <p:animEffect transition="in" filter="fade">
+                                      <p:cBhvr>
+                                        <p:cTn id="7" dur="500"/>
+                                        <p:tgtEl>
+                                          <p:spTgt spid="4"/>
+                                        </p:tgtEl>
+                                      </p:cBhvr>
+                                    </p:animEffect>
+                                  </p:childTnLst>
+                                </p:cTn>
+                              </p:par>
+                            </p:childTnLst>
+                          </p:cTn>
+                        </p:par>
+                      </p:childTnLst>
+                    </p:cTn>
+                  </p:par>
+                  <p:par>
+                    <p:cTn id="8" fill="hold">
+                      <p:stCondLst>
+                        <p:cond delay="indefinite"/>
+                      </p:stCondLst>
+                      <p:childTnLst>
+                        <p:par>
+                          <p:cTn id="9" fill="hold">
+                            <p:stCondLst>
+                              <p:cond delay="0"/>
+                            </p:stCondLst>
+                            <p:childTnLst>
+                              <p:par>
+                                <p:cTn id="10" presetID="10" presetClass="entr" presetSubtype="0" fill="hold" nodeType="clickEffect">
+                                  <p:stCondLst>
+                                    <p:cond delay="0"/>
+                                  </p:stCondLst>
+                                  <p:childTnLst>
+                                    <p:set>
+                                      <p:cBhvr>
+                                        <p:cTn id="11" dur="1" fill="hold">
+                                          <p:stCondLst>
+                                            <p:cond delay="0"/>
+                                          </p:stCondLst>
+                                        </p:cTn>
+                                        <p:tgtEl>
+                                          <p:spTgt spid="11">
+                                            <p:txEl>
+                                              <p:pRg st="2" end="2"/>
+                                            </p:txEl>
+                                          </p:spTgt>
+                                        </p:tgtEl>
+                                        <p:attrNameLst>
+                                          <p:attrName>style.visibility</p:attrName>
+                                        </p:attrNameLst>
+                                      </p:cBhvr>
+                                      <p:to>
+                                        <p:strVal val="visible"/>
+                                      </p:to>
+                                    </p:set>
+                                    <p:animEffect transition="in" filter="fade">
+                                      <p:cBhvr>
+                                        <p:cTn id="12" dur="500"/>
+                                        <p:tgtEl>
+                                          <p:spTgt spid="11">
+                                            <p:txEl>
+                                              <p:pRg st="2" end="2"/>
+                                            </p:txEl>
+                                          </p:spTgt>
+                                        </p:tgtEl>
+                                      </p:cBhvr>
+                                    </p:animEffect>
+                                  </p:childTnLst>
+                                </p:cTn>
+                              </p:par>
+                            </p:childTnLst>
+                          </p:cTn>
+                        </p:par>
+                      </p:childTnLst>
+                    </p:cTn>
+                  </p:par>
+                </p:childTnLst>
+              </p:cTn>
+              <p:prevCondLst>
+                <p:cond evt="onPrev" delay="0">
+                  <p:tgtEl>
+                    <p:sldTgt/>
+                  </p:tgtEl>
+                </p:cond>
+              </p:prevCondLst>
+              <p:nextCondLst>
+                <p:cond evt="onNext" delay="0">
+                  <p:tgtEl>
+                    <p:sldTgt/>
+                  </p:tgtEl>
+                </p:cond>
+              </p:nextCondLst>
+            </p:seq>
+          </p:childTnLst>
+        </p:cTn>
+      </p:par>
+    </p:tnLst>
+  </p:timing>
+</p:sld>
+</file>
+
+<file path=ppt/slides/slide5.xml><?xml version="1.0" encoding="utf-8"?>
+<p:sld xmlns:a="http://schemas.openxmlformats.org/drawingml/2006/main" xmlns:r="http://schemas.openxmlformats.org/officeDocument/2006/relationships" xmlns:p="http://schemas.openxmlformats.org/presentationml/2006/main">
+  <p:cSld>
+    <p:spTree>
+      <p:nvGrpSpPr>
+        <p:cNvPr id="1" name=""/>
+        <p:cNvGrpSpPr/>
+        <p:nvPr/>
+      </p:nvGrpSpPr>
+      <p:grpSpPr>
+        <a:xfrm>
+          <a:off x="0" y="0"/>
+          <a:ext cx="0" cy="0"/>
+          <a:chOff x="0" y="0"/>
+          <a:chExt cx="0" cy="0"/>
+        </a:xfrm>
+      </p:grpSpPr>
+      <p:sp>
+        <p:nvSpPr>
+          <p:cNvPr id="9" name="Content Placeholder 2">
+            <a:extLst>
+              <a:ext uri="{FF2B5EF4-FFF2-40B4-BE49-F238E27FC236}">
+                <a16:creationId xmlns:a16="http://schemas.microsoft.com/office/drawing/2014/main" id="{2B139307-6FA3-4FE9-9482-720E91A03D1F}"/>
+              </a:ext>
+            </a:extLst>
+          </p:cNvPr>
+          <p:cNvSpPr txBox="1">
+            <a:spLocks/>
+          </p:cNvSpPr>
+          <p:nvPr/>
+        </p:nvSpPr>
+        <p:spPr>
+          <a:xfrm>
+            <a:off x="143426" y="6213805"/>
+            <a:ext cx="2754086" cy="558140"/>
+          </a:xfrm>
+          <a:prstGeom prst="rect">
+            <a:avLst/>
+          </a:prstGeom>
+        </p:spPr>
+        <p:txBody>
+          <a:bodyPr vert="horz" lIns="91440" tIns="45720" rIns="91440" bIns="45720" rtlCol="0">
+            <a:normAutofit/>
+          </a:bodyPr>
+          <a:lstStyle>
+            <a:lvl1pPr marL="228600" indent="-228600" algn="l" defTabSz="914400" rtl="0" eaLnBrk="1" latinLnBrk="0" hangingPunct="1">
+              <a:lnSpc>
+                <a:spcPct val="90000"/>
+              </a:lnSpc>
+              <a:spcBef>
+                <a:spcPts val="1000"/>
+              </a:spcBef>
+              <a:buFont typeface="Arial" panose="020B0604020202020204" pitchFamily="34" charset="0"/>
+              <a:buChar char="•"/>
+              <a:defRPr sz="2800" kern="1200">
+                <a:solidFill>
+                  <a:schemeClr val="tx1"/>
+                </a:solidFill>
+                <a:latin typeface="+mn-lt"/>
+                <a:ea typeface="+mn-ea"/>
+                <a:cs typeface="+mn-cs"/>
+              </a:defRPr>
+            </a:lvl1pPr>
+            <a:lvl2pPr marL="685800" indent="-228600" algn="l" defTabSz="914400" rtl="0" eaLnBrk="1" latinLnBrk="0" hangingPunct="1">
+              <a:lnSpc>
+                <a:spcPct val="90000"/>
+              </a:lnSpc>
+              <a:spcBef>
+                <a:spcPts val="500"/>
+              </a:spcBef>
+              <a:buFont typeface="Arial" panose="020B0604020202020204" pitchFamily="34" charset="0"/>
+              <a:buChar char="•"/>
+              <a:defRPr sz="2400" kern="1200">
+                <a:solidFill>
+                  <a:schemeClr val="tx1"/>
+                </a:solidFill>
+                <a:latin typeface="+mn-lt"/>
+                <a:ea typeface="+mn-ea"/>
+                <a:cs typeface="+mn-cs"/>
+              </a:defRPr>
+            </a:lvl2pPr>
+            <a:lvl3pPr marL="1143000" indent="-228600" algn="l" defTabSz="914400" rtl="0" eaLnBrk="1" latinLnBrk="0" hangingPunct="1">
+              <a:lnSpc>
+                <a:spcPct val="90000"/>
+              </a:lnSpc>
+              <a:spcBef>
+                <a:spcPts val="500"/>
+              </a:spcBef>
+              <a:buFont typeface="Arial" panose="020B0604020202020204" pitchFamily="34" charset="0"/>
+              <a:buChar char="•"/>
+              <a:defRPr sz="2000" kern="1200">
+                <a:solidFill>
+                  <a:schemeClr val="tx1"/>
+                </a:solidFill>
+                <a:latin typeface="+mn-lt"/>
+                <a:ea typeface="+mn-ea"/>
+                <a:cs typeface="+mn-cs"/>
+              </a:defRPr>
+            </a:lvl3pPr>
+            <a:lvl4pPr marL="1600200" indent="-228600" algn="l" defTabSz="914400" rtl="0" eaLnBrk="1" latinLnBrk="0" hangingPunct="1">
+              <a:lnSpc>
+                <a:spcPct val="90000"/>
+              </a:lnSpc>
+              <a:spcBef>
+                <a:spcPts val="500"/>
+              </a:spcBef>
+              <a:buFont typeface="Arial" panose="020B0604020202020204" pitchFamily="34" charset="0"/>
+              <a:buChar char="•"/>
+              <a:defRPr sz="1800" kern="1200">
+                <a:solidFill>
+                  <a:schemeClr val="tx1"/>
+                </a:solidFill>
+                <a:latin typeface="+mn-lt"/>
+                <a:ea typeface="+mn-ea"/>
+                <a:cs typeface="+mn-cs"/>
+              </a:defRPr>
+            </a:lvl4pPr>
+            <a:lvl5pPr marL="2057400" indent="-228600" algn="l" defTabSz="914400" rtl="0" eaLnBrk="1" latinLnBrk="0" hangingPunct="1">
+              <a:lnSpc>
+                <a:spcPct val="90000"/>
+              </a:lnSpc>
+              <a:spcBef>
+                <a:spcPts val="500"/>
+              </a:spcBef>
+              <a:buFont typeface="Arial" panose="020B0604020202020204" pitchFamily="34" charset="0"/>
+              <a:buChar char="•"/>
+              <a:defRPr sz="1800" kern="1200">
+                <a:solidFill>
+                  <a:schemeClr val="tx1"/>
+                </a:solidFill>
+                <a:latin typeface="+mn-lt"/>
+                <a:ea typeface="+mn-ea"/>
+                <a:cs typeface="+mn-cs"/>
+              </a:defRPr>
+            </a:lvl5pPr>
+            <a:lvl6pPr marL="2514600" indent="-228600" algn="l" defTabSz="914400" rtl="0" eaLnBrk="1" latinLnBrk="0" hangingPunct="1">
+              <a:lnSpc>
+                <a:spcPct val="90000"/>
+              </a:lnSpc>
+              <a:spcBef>
+                <a:spcPts val="500"/>
+              </a:spcBef>
+              <a:buFont typeface="Arial" panose="020B0604020202020204" pitchFamily="34" charset="0"/>
+              <a:buChar char="•"/>
+              <a:defRPr sz="1800" kern="1200">
+                <a:solidFill>
+                  <a:schemeClr val="tx1"/>
+                </a:solidFill>
+                <a:latin typeface="+mn-lt"/>
+                <a:ea typeface="+mn-ea"/>
+                <a:cs typeface="+mn-cs"/>
+              </a:defRPr>
+            </a:lvl6pPr>
+            <a:lvl7pPr marL="2971800" indent="-228600" algn="l" defTabSz="914400" rtl="0" eaLnBrk="1" latinLnBrk="0" hangingPunct="1">
+              <a:lnSpc>
+                <a:spcPct val="90000"/>
+              </a:lnSpc>
+              <a:spcBef>
+                <a:spcPts val="500"/>
+              </a:spcBef>
+              <a:buFont typeface="Arial" panose="020B0604020202020204" pitchFamily="34" charset="0"/>
+              <a:buChar char="•"/>
+              <a:defRPr sz="1800" kern="1200">
+                <a:solidFill>
+                  <a:schemeClr val="tx1"/>
+                </a:solidFill>
+                <a:latin typeface="+mn-lt"/>
+                <a:ea typeface="+mn-ea"/>
+                <a:cs typeface="+mn-cs"/>
+              </a:defRPr>
+            </a:lvl7pPr>
+            <a:lvl8pPr marL="3429000" indent="-228600" algn="l" defTabSz="914400" rtl="0" eaLnBrk="1" latinLnBrk="0" hangingPunct="1">
+              <a:lnSpc>
+                <a:spcPct val="90000"/>
+              </a:lnSpc>
+              <a:spcBef>
+                <a:spcPts val="500"/>
+              </a:spcBef>
+              <a:buFont typeface="Arial" panose="020B0604020202020204" pitchFamily="34" charset="0"/>
+              <a:buChar char="•"/>
+              <a:defRPr sz="1800" kern="1200">
+                <a:solidFill>
+                  <a:schemeClr val="tx1"/>
+                </a:solidFill>
+                <a:latin typeface="+mn-lt"/>
+                <a:ea typeface="+mn-ea"/>
+                <a:cs typeface="+mn-cs"/>
+              </a:defRPr>
+            </a:lvl8pPr>
+            <a:lvl9pPr marL="3886200" indent="-228600" algn="l" defTabSz="914400" rtl="0" eaLnBrk="1" latinLnBrk="0" hangingPunct="1">
+              <a:lnSpc>
+                <a:spcPct val="90000"/>
+              </a:lnSpc>
+              <a:spcBef>
+                <a:spcPts val="500"/>
+              </a:spcBef>
+              <a:buFont typeface="Arial" panose="020B0604020202020204" pitchFamily="34" charset="0"/>
+              <a:buChar char="•"/>
+              <a:defRPr sz="1800" kern="1200">
+                <a:solidFill>
+                  <a:schemeClr val="tx1"/>
+                </a:solidFill>
+                <a:latin typeface="+mn-lt"/>
+                <a:ea typeface="+mn-ea"/>
+                <a:cs typeface="+mn-cs"/>
+              </a:defRPr>
+            </a:lvl9pPr>
+          </a:lstStyle>
+          <a:p>
+            <a:pPr marL="0" indent="0">
+              <a:buFont typeface="Arial" panose="020B0604020202020204" pitchFamily="34" charset="0"/>
+              <a:buNone/>
+            </a:pPr>
+            <a:r>
+              <a:rPr lang="en-US" dirty="0"/>
+              <a:t>Garrick Bruening</a:t>
+            </a:r>
+          </a:p>
+        </p:txBody>
+      </p:sp>
       <p:pic>
         <p:nvPicPr>
-          <p:cNvPr id="20" name="Picture 19" descr="A screenshot of a computer&#10;&#10;Description automatically generated with medium confidence">
+          <p:cNvPr id="5" name="Picture 4" descr="A screenshot of a computer&#10;&#10;Description automatically generated with medium confidence">
             <a:extLst>
               <a:ext uri="{FF2B5EF4-FFF2-40B4-BE49-F238E27FC236}">
-                <a16:creationId xmlns:a16="http://schemas.microsoft.com/office/drawing/2014/main" id="{2C764DA9-E55D-41C9-8DAF-88B197893F68}"/>
+                <a16:creationId xmlns:a16="http://schemas.microsoft.com/office/drawing/2014/main" id="{C2B48371-6D1F-4BB7-A34C-F2E7B9F8A892}"/>
               </a:ext>
             </a:extLst>
           </p:cNvPr>
@@ -5880,7 +6669,7 @@
           <p:nvPr/>
         </p:nvPicPr>
         <p:blipFill>
-          <a:blip r:embed="rId4">
+          <a:blip r:embed="rId3">
             <a:extLst>
               <a:ext uri="{28A0092B-C50C-407E-A947-70E740481C1C}">
                 <a14:useLocalDpi xmlns:a14="http://schemas.microsoft.com/office/drawing/2010/main" val="0"/>
@@ -5893,8 +6682,8 @@
         </p:blipFill>
         <p:spPr>
           <a:xfrm>
-            <a:off x="6743699" y="3635497"/>
-            <a:ext cx="3808035" cy="2422919"/>
+            <a:off x="5210979" y="1494485"/>
+            <a:ext cx="6590752" cy="4365469"/>
           </a:xfrm>
           <a:prstGeom prst="rect">
             <a:avLst/>
@@ -5903,80 +6692,10 @@
       </p:pic>
       <p:sp>
         <p:nvSpPr>
-          <p:cNvPr id="22" name="TextBox 21">
+          <p:cNvPr id="13" name="Content Placeholder 2">
             <a:extLst>
               <a:ext uri="{FF2B5EF4-FFF2-40B4-BE49-F238E27FC236}">
-                <a16:creationId xmlns:a16="http://schemas.microsoft.com/office/drawing/2014/main" id="{DDC93BE0-52C7-4455-836D-9F6DF5A19566}"/>
-              </a:ext>
-            </a:extLst>
-          </p:cNvPr>
-          <p:cNvSpPr txBox="1"/>
-          <p:nvPr/>
-        </p:nvSpPr>
-        <p:spPr>
-          <a:xfrm>
-            <a:off x="6638925" y="1058865"/>
-            <a:ext cx="6096000" cy="369332"/>
-          </a:xfrm>
-          <a:prstGeom prst="rect">
-            <a:avLst/>
-          </a:prstGeom>
-          <a:noFill/>
-        </p:spPr>
-        <p:txBody>
-          <a:bodyPr wrap="square">
-            <a:spAutoFit/>
-          </a:bodyPr>
-          <a:lstStyle/>
-          <a:p>
-            <a:r>
-              <a:rPr lang="en-US" dirty="0"/>
-              <a:t>Histogram of pull counts.</a:t>
-            </a:r>
-          </a:p>
-        </p:txBody>
-      </p:sp>
-      <p:sp>
-        <p:nvSpPr>
-          <p:cNvPr id="23" name="TextBox 22">
-            <a:extLst>
-              <a:ext uri="{FF2B5EF4-FFF2-40B4-BE49-F238E27FC236}">
-                <a16:creationId xmlns:a16="http://schemas.microsoft.com/office/drawing/2014/main" id="{0707B8EA-F935-40AD-80E4-E21A38C39213}"/>
-              </a:ext>
-            </a:extLst>
-          </p:cNvPr>
-          <p:cNvSpPr txBox="1"/>
-          <p:nvPr/>
-        </p:nvSpPr>
-        <p:spPr>
-          <a:xfrm>
-            <a:off x="6638925" y="3342966"/>
-            <a:ext cx="6096000" cy="369332"/>
-          </a:xfrm>
-          <a:prstGeom prst="rect">
-            <a:avLst/>
-          </a:prstGeom>
-          <a:noFill/>
-        </p:spPr>
-        <p:txBody>
-          <a:bodyPr wrap="square">
-            <a:spAutoFit/>
-          </a:bodyPr>
-          <a:lstStyle/>
-          <a:p>
-            <a:r>
-              <a:rPr lang="en-US" dirty="0"/>
-              <a:t>Histogram of progression time.</a:t>
-            </a:r>
-          </a:p>
-        </p:txBody>
-      </p:sp>
-      <p:sp>
-        <p:nvSpPr>
-          <p:cNvPr id="9" name="Content Placeholder 2">
-            <a:extLst>
-              <a:ext uri="{FF2B5EF4-FFF2-40B4-BE49-F238E27FC236}">
-                <a16:creationId xmlns:a16="http://schemas.microsoft.com/office/drawing/2014/main" id="{2B139307-6FA3-4FE9-9482-720E91A03D1F}"/>
+                <a16:creationId xmlns:a16="http://schemas.microsoft.com/office/drawing/2014/main" id="{6CE3760B-A63E-44A4-9283-3C6FE25ABDA0}"/>
               </a:ext>
             </a:extLst>
           </p:cNvPr>
@@ -5987,8 +6706,8 @@
         </p:nvSpPr>
         <p:spPr>
           <a:xfrm>
-            <a:off x="143426" y="6213805"/>
-            <a:ext cx="2754086" cy="558140"/>
+            <a:off x="838200" y="1276678"/>
+            <a:ext cx="3628121" cy="4749181"/>
           </a:xfrm>
           <a:prstGeom prst="rect">
             <a:avLst/>
@@ -5999,7 +6718,7 @@
             <a:normAutofit/>
           </a:bodyPr>
           <a:lstStyle>
-            <a:lvl1pPr marL="228600" indent="-228600" algn="l" defTabSz="914400" rtl="0" eaLnBrk="1" latinLnBrk="0" hangingPunct="1">
+            <a:lvl1pPr marL="0" indent="0" algn="ctr" defTabSz="914400" rtl="0" eaLnBrk="1" latinLnBrk="0" hangingPunct="1">
               <a:lnSpc>
                 <a:spcPct val="90000"/>
               </a:lnSpc>
@@ -6007,8 +6726,8 @@
                 <a:spcPts val="1000"/>
               </a:spcBef>
               <a:buFont typeface="Arial" panose="020B0604020202020204" pitchFamily="34" charset="0"/>
-              <a:buChar char="•"/>
-              <a:defRPr sz="2800" kern="1200">
+              <a:buNone/>
+              <a:defRPr sz="2400" kern="1200">
                 <a:solidFill>
                   <a:schemeClr val="tx1"/>
                 </a:solidFill>
@@ -6017,16 +6736,16 @@
                 <a:cs typeface="+mn-cs"/>
               </a:defRPr>
             </a:lvl1pPr>
-            <a:lvl2pPr marL="685800" indent="-228600" algn="l" defTabSz="914400" rtl="0" eaLnBrk="1" latinLnBrk="0" hangingPunct="1">
-              <a:lnSpc>
-                <a:spcPct val="90000"/>
-              </a:lnSpc>
-              <a:spcBef>
-                <a:spcPts val="500"/>
-              </a:spcBef>
-              <a:buFont typeface="Arial" panose="020B0604020202020204" pitchFamily="34" charset="0"/>
-              <a:buChar char="•"/>
-              <a:defRPr sz="2400" kern="1200">
+            <a:lvl2pPr marL="457200" indent="0" algn="ctr" defTabSz="914400" rtl="0" eaLnBrk="1" latinLnBrk="0" hangingPunct="1">
+              <a:lnSpc>
+                <a:spcPct val="90000"/>
+              </a:lnSpc>
+              <a:spcBef>
+                <a:spcPts val="500"/>
+              </a:spcBef>
+              <a:buFont typeface="Arial" panose="020B0604020202020204" pitchFamily="34" charset="0"/>
+              <a:buNone/>
+              <a:defRPr sz="2000" kern="1200">
                 <a:solidFill>
                   <a:schemeClr val="tx1"/>
                 </a:solidFill>
@@ -6035,16 +6754,16 @@
                 <a:cs typeface="+mn-cs"/>
               </a:defRPr>
             </a:lvl2pPr>
-            <a:lvl3pPr marL="1143000" indent="-228600" algn="l" defTabSz="914400" rtl="0" eaLnBrk="1" latinLnBrk="0" hangingPunct="1">
-              <a:lnSpc>
-                <a:spcPct val="90000"/>
-              </a:lnSpc>
-              <a:spcBef>
-                <a:spcPts val="500"/>
-              </a:spcBef>
-              <a:buFont typeface="Arial" panose="020B0604020202020204" pitchFamily="34" charset="0"/>
-              <a:buChar char="•"/>
-              <a:defRPr sz="2000" kern="1200">
+            <a:lvl3pPr marL="914400" indent="0" algn="ctr" defTabSz="914400" rtl="0" eaLnBrk="1" latinLnBrk="0" hangingPunct="1">
+              <a:lnSpc>
+                <a:spcPct val="90000"/>
+              </a:lnSpc>
+              <a:spcBef>
+                <a:spcPts val="500"/>
+              </a:spcBef>
+              <a:buFont typeface="Arial" panose="020B0604020202020204" pitchFamily="34" charset="0"/>
+              <a:buNone/>
+              <a:defRPr sz="1800" kern="1200">
                 <a:solidFill>
                   <a:schemeClr val="tx1"/>
                 </a:solidFill>
@@ -6053,16 +6772,16 @@
                 <a:cs typeface="+mn-cs"/>
               </a:defRPr>
             </a:lvl3pPr>
-            <a:lvl4pPr marL="1600200" indent="-228600" algn="l" defTabSz="914400" rtl="0" eaLnBrk="1" latinLnBrk="0" hangingPunct="1">
-              <a:lnSpc>
-                <a:spcPct val="90000"/>
-              </a:lnSpc>
-              <a:spcBef>
-                <a:spcPts val="500"/>
-              </a:spcBef>
-              <a:buFont typeface="Arial" panose="020B0604020202020204" pitchFamily="34" charset="0"/>
-              <a:buChar char="•"/>
-              <a:defRPr sz="1800" kern="1200">
+            <a:lvl4pPr marL="1371600" indent="0" algn="ctr" defTabSz="914400" rtl="0" eaLnBrk="1" latinLnBrk="0" hangingPunct="1">
+              <a:lnSpc>
+                <a:spcPct val="90000"/>
+              </a:lnSpc>
+              <a:spcBef>
+                <a:spcPts val="500"/>
+              </a:spcBef>
+              <a:buFont typeface="Arial" panose="020B0604020202020204" pitchFamily="34" charset="0"/>
+              <a:buNone/>
+              <a:defRPr sz="1600" kern="1200">
                 <a:solidFill>
                   <a:schemeClr val="tx1"/>
                 </a:solidFill>
@@ -6071,16 +6790,16 @@
                 <a:cs typeface="+mn-cs"/>
               </a:defRPr>
             </a:lvl4pPr>
-            <a:lvl5pPr marL="2057400" indent="-228600" algn="l" defTabSz="914400" rtl="0" eaLnBrk="1" latinLnBrk="0" hangingPunct="1">
-              <a:lnSpc>
-                <a:spcPct val="90000"/>
-              </a:lnSpc>
-              <a:spcBef>
-                <a:spcPts val="500"/>
-              </a:spcBef>
-              <a:buFont typeface="Arial" panose="020B0604020202020204" pitchFamily="34" charset="0"/>
-              <a:buChar char="•"/>
-              <a:defRPr sz="1800" kern="1200">
+            <a:lvl5pPr marL="1828800" indent="0" algn="ctr" defTabSz="914400" rtl="0" eaLnBrk="1" latinLnBrk="0" hangingPunct="1">
+              <a:lnSpc>
+                <a:spcPct val="90000"/>
+              </a:lnSpc>
+              <a:spcBef>
+                <a:spcPts val="500"/>
+              </a:spcBef>
+              <a:buFont typeface="Arial" panose="020B0604020202020204" pitchFamily="34" charset="0"/>
+              <a:buNone/>
+              <a:defRPr sz="1600" kern="1200">
                 <a:solidFill>
                   <a:schemeClr val="tx1"/>
                 </a:solidFill>
@@ -6089,16 +6808,16 @@
                 <a:cs typeface="+mn-cs"/>
               </a:defRPr>
             </a:lvl5pPr>
-            <a:lvl6pPr marL="2514600" indent="-228600" algn="l" defTabSz="914400" rtl="0" eaLnBrk="1" latinLnBrk="0" hangingPunct="1">
-              <a:lnSpc>
-                <a:spcPct val="90000"/>
-              </a:lnSpc>
-              <a:spcBef>
-                <a:spcPts val="500"/>
-              </a:spcBef>
-              <a:buFont typeface="Arial" panose="020B0604020202020204" pitchFamily="34" charset="0"/>
-              <a:buChar char="•"/>
-              <a:defRPr sz="1800" kern="1200">
+            <a:lvl6pPr marL="2286000" indent="0" algn="ctr" defTabSz="914400" rtl="0" eaLnBrk="1" latinLnBrk="0" hangingPunct="1">
+              <a:lnSpc>
+                <a:spcPct val="90000"/>
+              </a:lnSpc>
+              <a:spcBef>
+                <a:spcPts val="500"/>
+              </a:spcBef>
+              <a:buFont typeface="Arial" panose="020B0604020202020204" pitchFamily="34" charset="0"/>
+              <a:buNone/>
+              <a:defRPr sz="1600" kern="1200">
                 <a:solidFill>
                   <a:schemeClr val="tx1"/>
                 </a:solidFill>
@@ -6107,16 +6826,16 @@
                 <a:cs typeface="+mn-cs"/>
               </a:defRPr>
             </a:lvl6pPr>
-            <a:lvl7pPr marL="2971800" indent="-228600" algn="l" defTabSz="914400" rtl="0" eaLnBrk="1" latinLnBrk="0" hangingPunct="1">
-              <a:lnSpc>
-                <a:spcPct val="90000"/>
-              </a:lnSpc>
-              <a:spcBef>
-                <a:spcPts val="500"/>
-              </a:spcBef>
-              <a:buFont typeface="Arial" panose="020B0604020202020204" pitchFamily="34" charset="0"/>
-              <a:buChar char="•"/>
-              <a:defRPr sz="1800" kern="1200">
+            <a:lvl7pPr marL="2743200" indent="0" algn="ctr" defTabSz="914400" rtl="0" eaLnBrk="1" latinLnBrk="0" hangingPunct="1">
+              <a:lnSpc>
+                <a:spcPct val="90000"/>
+              </a:lnSpc>
+              <a:spcBef>
+                <a:spcPts val="500"/>
+              </a:spcBef>
+              <a:buFont typeface="Arial" panose="020B0604020202020204" pitchFamily="34" charset="0"/>
+              <a:buNone/>
+              <a:defRPr sz="1600" kern="1200">
                 <a:solidFill>
                   <a:schemeClr val="tx1"/>
                 </a:solidFill>
@@ -6125,16 +6844,16 @@
                 <a:cs typeface="+mn-cs"/>
               </a:defRPr>
             </a:lvl7pPr>
-            <a:lvl8pPr marL="3429000" indent="-228600" algn="l" defTabSz="914400" rtl="0" eaLnBrk="1" latinLnBrk="0" hangingPunct="1">
-              <a:lnSpc>
-                <a:spcPct val="90000"/>
-              </a:lnSpc>
-              <a:spcBef>
-                <a:spcPts val="500"/>
-              </a:spcBef>
-              <a:buFont typeface="Arial" panose="020B0604020202020204" pitchFamily="34" charset="0"/>
-              <a:buChar char="•"/>
-              <a:defRPr sz="1800" kern="1200">
+            <a:lvl8pPr marL="3200400" indent="0" algn="ctr" defTabSz="914400" rtl="0" eaLnBrk="1" latinLnBrk="0" hangingPunct="1">
+              <a:lnSpc>
+                <a:spcPct val="90000"/>
+              </a:lnSpc>
+              <a:spcBef>
+                <a:spcPts val="500"/>
+              </a:spcBef>
+              <a:buFont typeface="Arial" panose="020B0604020202020204" pitchFamily="34" charset="0"/>
+              <a:buNone/>
+              <a:defRPr sz="1600" kern="1200">
                 <a:solidFill>
                   <a:schemeClr val="tx1"/>
                 </a:solidFill>
@@ -6143,16 +6862,16 @@
                 <a:cs typeface="+mn-cs"/>
               </a:defRPr>
             </a:lvl8pPr>
-            <a:lvl9pPr marL="3886200" indent="-228600" algn="l" defTabSz="914400" rtl="0" eaLnBrk="1" latinLnBrk="0" hangingPunct="1">
-              <a:lnSpc>
-                <a:spcPct val="90000"/>
-              </a:lnSpc>
-              <a:spcBef>
-                <a:spcPts val="500"/>
-              </a:spcBef>
-              <a:buFont typeface="Arial" panose="020B0604020202020204" pitchFamily="34" charset="0"/>
-              <a:buChar char="•"/>
-              <a:defRPr sz="1800" kern="1200">
+            <a:lvl9pPr marL="3657600" indent="0" algn="ctr" defTabSz="914400" rtl="0" eaLnBrk="1" latinLnBrk="0" hangingPunct="1">
+              <a:lnSpc>
+                <a:spcPct val="90000"/>
+              </a:lnSpc>
+              <a:spcBef>
+                <a:spcPts val="500"/>
+              </a:spcBef>
+              <a:buFont typeface="Arial" panose="020B0604020202020204" pitchFamily="34" charset="0"/>
+              <a:buNone/>
+              <a:defRPr sz="1600" kern="1200">
                 <a:solidFill>
                   <a:schemeClr val="tx1"/>
                 </a:solidFill>
@@ -6163,13 +6882,80 @@
             </a:lvl9pPr>
           </a:lstStyle>
           <a:p>
-            <a:pPr marL="0" indent="0">
-              <a:buFont typeface="Arial" panose="020B0604020202020204" pitchFamily="34" charset="0"/>
-              <a:buNone/>
+            <a:pPr marL="342900" indent="-342900" algn="l">
+              <a:buFont typeface="Arial" panose="020B0604020202020204" pitchFamily="34" charset="0"/>
+              <a:buChar char="•"/>
             </a:pPr>
             <a:r>
               <a:rPr lang="en-US" dirty="0"/>
-              <a:t>Garrick Bruening</a:t>
+              <a:t>Can also display aggregate statistics on when groups have defeated an encounter.</a:t>
+            </a:r>
+          </a:p>
+          <a:p>
+            <a:pPr marL="342900" indent="-342900" algn="l">
+              <a:buFont typeface="Arial" panose="020B0604020202020204" pitchFamily="34" charset="0"/>
+              <a:buChar char="•"/>
+            </a:pPr>
+            <a:endParaRPr lang="en-US" dirty="0"/>
+          </a:p>
+        </p:txBody>
+      </p:sp>
+      <p:sp>
+        <p:nvSpPr>
+          <p:cNvPr id="8" name="Title 1">
+            <a:extLst>
+              <a:ext uri="{FF2B5EF4-FFF2-40B4-BE49-F238E27FC236}">
+                <a16:creationId xmlns:a16="http://schemas.microsoft.com/office/drawing/2014/main" id="{5B17765E-8E6E-4AA2-9461-C4BA4D96D5B8}"/>
+              </a:ext>
+            </a:extLst>
+          </p:cNvPr>
+          <p:cNvSpPr txBox="1">
+            <a:spLocks/>
+          </p:cNvSpPr>
+          <p:nvPr/>
+        </p:nvSpPr>
+        <p:spPr>
+          <a:xfrm>
+            <a:off x="468365" y="244766"/>
+            <a:ext cx="9766768" cy="1860659"/>
+          </a:xfrm>
+          <a:prstGeom prst="rect">
+            <a:avLst/>
+          </a:prstGeom>
+        </p:spPr>
+        <p:txBody>
+          <a:bodyPr vert="horz" lIns="91440" tIns="45720" rIns="91440" bIns="45720" rtlCol="0" anchor="t">
+            <a:normAutofit/>
+          </a:bodyPr>
+          <a:lstStyle>
+            <a:lvl1pPr algn="ctr" defTabSz="914400" rtl="0" eaLnBrk="1" latinLnBrk="0" hangingPunct="1">
+              <a:lnSpc>
+                <a:spcPct val="90000"/>
+              </a:lnSpc>
+              <a:spcBef>
+                <a:spcPct val="0"/>
+              </a:spcBef>
+              <a:buNone/>
+              <a:defRPr sz="6000" kern="1200">
+                <a:solidFill>
+                  <a:schemeClr val="tx1"/>
+                </a:solidFill>
+                <a:latin typeface="+mj-lt"/>
+                <a:ea typeface="+mj-ea"/>
+                <a:cs typeface="+mj-cs"/>
+              </a:defRPr>
+            </a:lvl1pPr>
+          </a:lstStyle>
+          <a:p>
+            <a:pPr algn="l"/>
+            <a:r>
+              <a:rPr lang="en-US" sz="4000" dirty="0">
+                <a:solidFill>
+                  <a:srgbClr val="FFCC00"/>
+                </a:solidFill>
+                <a:latin typeface="+mn-lt"/>
+              </a:rPr>
+              <a:t>Aggregated Group data</a:t>
             </a:r>
           </a:p>
         </p:txBody>
@@ -6184,6 +6970,101 @@
   <p:clrMapOvr>
     <a:masterClrMapping/>
   </p:clrMapOvr>
+  <mc:AlternateContent xmlns:mc="http://schemas.openxmlformats.org/markup-compatibility/2006">
+    <mc:Choice xmlns:p14="http://schemas.microsoft.com/office/powerpoint/2010/main" Requires="p14">
+      <p:transition p14:dur="300">
+        <p:fade/>
+      </p:transition>
+    </mc:Choice>
+    <mc:Fallback>
+      <p:transition>
+        <p:fade/>
+      </p:transition>
+    </mc:Fallback>
+  </mc:AlternateContent>
+  <p:timing>
+    <p:tnLst>
+      <p:par>
+        <p:cTn id="1" dur="indefinite" restart="never" nodeType="tmRoot">
+          <p:childTnLst>
+            <p:seq concurrent="1" nextAc="seek">
+              <p:cTn id="2" dur="indefinite" nodeType="mainSeq">
+                <p:childTnLst>
+                  <p:par>
+                    <p:cTn id="3" fill="hold">
+                      <p:stCondLst>
+                        <p:cond delay="indefinite"/>
+                      </p:stCondLst>
+                      <p:childTnLst>
+                        <p:par>
+                          <p:cTn id="4" fill="hold">
+                            <p:stCondLst>
+                              <p:cond delay="0"/>
+                            </p:stCondLst>
+                            <p:childTnLst>
+                              <p:par>
+                                <p:cTn id="5" presetID="10" presetClass="entr" presetSubtype="0" fill="hold" nodeType="clickEffect">
+                                  <p:stCondLst>
+                                    <p:cond delay="0"/>
+                                  </p:stCondLst>
+                                  <p:childTnLst>
+                                    <p:set>
+                                      <p:cBhvr>
+                                        <p:cTn id="6" dur="1" fill="hold">
+                                          <p:stCondLst>
+                                            <p:cond delay="0"/>
+                                          </p:stCondLst>
+                                        </p:cTn>
+                                        <p:tgtEl>
+                                          <p:spTgt spid="5"/>
+                                        </p:tgtEl>
+                                        <p:attrNameLst>
+                                          <p:attrName>style.visibility</p:attrName>
+                                        </p:attrNameLst>
+                                      </p:cBhvr>
+                                      <p:to>
+                                        <p:strVal val="visible"/>
+                                      </p:to>
+                                    </p:set>
+                                    <p:animEffect transition="in" filter="fade">
+                                      <p:cBhvr>
+                                        <p:cTn id="7" dur="500"/>
+                                        <p:tgtEl>
+                                          <p:spTgt spid="5"/>
+                                        </p:tgtEl>
+                                      </p:cBhvr>
+                                    </p:animEffect>
+                                  </p:childTnLst>
+                                </p:cTn>
+                              </p:par>
+                            </p:childTnLst>
+                          </p:cTn>
+                        </p:par>
+                      </p:childTnLst>
+                    </p:cTn>
+                  </p:par>
+                </p:childTnLst>
+              </p:cTn>
+              <p:prevCondLst>
+                <p:cond evt="onPrev" delay="0">
+                  <p:tgtEl>
+                    <p:sldTgt/>
+                  </p:tgtEl>
+                </p:cond>
+              </p:prevCondLst>
+              <p:nextCondLst>
+                <p:cond evt="onNext" delay="0">
+                  <p:tgtEl>
+                    <p:sldTgt/>
+                  </p:tgtEl>
+                </p:cond>
+              </p:nextCondLst>
+            </p:seq>
+          </p:childTnLst>
+        </p:cTn>
+      </p:par>
+    </p:tnLst>
+  </p:timing>
 </p:sld>
 </file>
 
@@ -6206,6 +7087,683 @@
       </p:grpSpPr>
       <p:sp>
         <p:nvSpPr>
+          <p:cNvPr id="7" name="Content Placeholder 2">
+            <a:extLst>
+              <a:ext uri="{FF2B5EF4-FFF2-40B4-BE49-F238E27FC236}">
+                <a16:creationId xmlns:a16="http://schemas.microsoft.com/office/drawing/2014/main" id="{C12F1A20-35FC-44A7-8F84-3A695133EDA2}"/>
+              </a:ext>
+            </a:extLst>
+          </p:cNvPr>
+          <p:cNvSpPr txBox="1">
+            <a:spLocks/>
+          </p:cNvSpPr>
+          <p:nvPr/>
+        </p:nvSpPr>
+        <p:spPr>
+          <a:xfrm>
+            <a:off x="838200" y="1276678"/>
+            <a:ext cx="3628121" cy="4749181"/>
+          </a:xfrm>
+          <a:prstGeom prst="rect">
+            <a:avLst/>
+          </a:prstGeom>
+        </p:spPr>
+        <p:txBody>
+          <a:bodyPr vert="horz" lIns="91440" tIns="45720" rIns="91440" bIns="45720" rtlCol="0">
+            <a:normAutofit/>
+          </a:bodyPr>
+          <a:lstStyle>
+            <a:lvl1pPr marL="0" indent="0" algn="ctr" defTabSz="914400" rtl="0" eaLnBrk="1" latinLnBrk="0" hangingPunct="1">
+              <a:lnSpc>
+                <a:spcPct val="90000"/>
+              </a:lnSpc>
+              <a:spcBef>
+                <a:spcPts val="1000"/>
+              </a:spcBef>
+              <a:buFont typeface="Arial" panose="020B0604020202020204" pitchFamily="34" charset="0"/>
+              <a:buNone/>
+              <a:defRPr sz="2400" kern="1200">
+                <a:solidFill>
+                  <a:schemeClr val="tx1"/>
+                </a:solidFill>
+                <a:latin typeface="+mn-lt"/>
+                <a:ea typeface="+mn-ea"/>
+                <a:cs typeface="+mn-cs"/>
+              </a:defRPr>
+            </a:lvl1pPr>
+            <a:lvl2pPr marL="457200" indent="0" algn="ctr" defTabSz="914400" rtl="0" eaLnBrk="1" latinLnBrk="0" hangingPunct="1">
+              <a:lnSpc>
+                <a:spcPct val="90000"/>
+              </a:lnSpc>
+              <a:spcBef>
+                <a:spcPts val="500"/>
+              </a:spcBef>
+              <a:buFont typeface="Arial" panose="020B0604020202020204" pitchFamily="34" charset="0"/>
+              <a:buNone/>
+              <a:defRPr sz="2000" kern="1200">
+                <a:solidFill>
+                  <a:schemeClr val="tx1"/>
+                </a:solidFill>
+                <a:latin typeface="+mn-lt"/>
+                <a:ea typeface="+mn-ea"/>
+                <a:cs typeface="+mn-cs"/>
+              </a:defRPr>
+            </a:lvl2pPr>
+            <a:lvl3pPr marL="914400" indent="0" algn="ctr" defTabSz="914400" rtl="0" eaLnBrk="1" latinLnBrk="0" hangingPunct="1">
+              <a:lnSpc>
+                <a:spcPct val="90000"/>
+              </a:lnSpc>
+              <a:spcBef>
+                <a:spcPts val="500"/>
+              </a:spcBef>
+              <a:buFont typeface="Arial" panose="020B0604020202020204" pitchFamily="34" charset="0"/>
+              <a:buNone/>
+              <a:defRPr sz="1800" kern="1200">
+                <a:solidFill>
+                  <a:schemeClr val="tx1"/>
+                </a:solidFill>
+                <a:latin typeface="+mn-lt"/>
+                <a:ea typeface="+mn-ea"/>
+                <a:cs typeface="+mn-cs"/>
+              </a:defRPr>
+            </a:lvl3pPr>
+            <a:lvl4pPr marL="1371600" indent="0" algn="ctr" defTabSz="914400" rtl="0" eaLnBrk="1" latinLnBrk="0" hangingPunct="1">
+              <a:lnSpc>
+                <a:spcPct val="90000"/>
+              </a:lnSpc>
+              <a:spcBef>
+                <a:spcPts val="500"/>
+              </a:spcBef>
+              <a:buFont typeface="Arial" panose="020B0604020202020204" pitchFamily="34" charset="0"/>
+              <a:buNone/>
+              <a:defRPr sz="1600" kern="1200">
+                <a:solidFill>
+                  <a:schemeClr val="tx1"/>
+                </a:solidFill>
+                <a:latin typeface="+mn-lt"/>
+                <a:ea typeface="+mn-ea"/>
+                <a:cs typeface="+mn-cs"/>
+              </a:defRPr>
+            </a:lvl4pPr>
+            <a:lvl5pPr marL="1828800" indent="0" algn="ctr" defTabSz="914400" rtl="0" eaLnBrk="1" latinLnBrk="0" hangingPunct="1">
+              <a:lnSpc>
+                <a:spcPct val="90000"/>
+              </a:lnSpc>
+              <a:spcBef>
+                <a:spcPts val="500"/>
+              </a:spcBef>
+              <a:buFont typeface="Arial" panose="020B0604020202020204" pitchFamily="34" charset="0"/>
+              <a:buNone/>
+              <a:defRPr sz="1600" kern="1200">
+                <a:solidFill>
+                  <a:schemeClr val="tx1"/>
+                </a:solidFill>
+                <a:latin typeface="+mn-lt"/>
+                <a:ea typeface="+mn-ea"/>
+                <a:cs typeface="+mn-cs"/>
+              </a:defRPr>
+            </a:lvl5pPr>
+            <a:lvl6pPr marL="2286000" indent="0" algn="ctr" defTabSz="914400" rtl="0" eaLnBrk="1" latinLnBrk="0" hangingPunct="1">
+              <a:lnSpc>
+                <a:spcPct val="90000"/>
+              </a:lnSpc>
+              <a:spcBef>
+                <a:spcPts val="500"/>
+              </a:spcBef>
+              <a:buFont typeface="Arial" panose="020B0604020202020204" pitchFamily="34" charset="0"/>
+              <a:buNone/>
+              <a:defRPr sz="1600" kern="1200">
+                <a:solidFill>
+                  <a:schemeClr val="tx1"/>
+                </a:solidFill>
+                <a:latin typeface="+mn-lt"/>
+                <a:ea typeface="+mn-ea"/>
+                <a:cs typeface="+mn-cs"/>
+              </a:defRPr>
+            </a:lvl6pPr>
+            <a:lvl7pPr marL="2743200" indent="0" algn="ctr" defTabSz="914400" rtl="0" eaLnBrk="1" latinLnBrk="0" hangingPunct="1">
+              <a:lnSpc>
+                <a:spcPct val="90000"/>
+              </a:lnSpc>
+              <a:spcBef>
+                <a:spcPts val="500"/>
+              </a:spcBef>
+              <a:buFont typeface="Arial" panose="020B0604020202020204" pitchFamily="34" charset="0"/>
+              <a:buNone/>
+              <a:defRPr sz="1600" kern="1200">
+                <a:solidFill>
+                  <a:schemeClr val="tx1"/>
+                </a:solidFill>
+                <a:latin typeface="+mn-lt"/>
+                <a:ea typeface="+mn-ea"/>
+                <a:cs typeface="+mn-cs"/>
+              </a:defRPr>
+            </a:lvl7pPr>
+            <a:lvl8pPr marL="3200400" indent="0" algn="ctr" defTabSz="914400" rtl="0" eaLnBrk="1" latinLnBrk="0" hangingPunct="1">
+              <a:lnSpc>
+                <a:spcPct val="90000"/>
+              </a:lnSpc>
+              <a:spcBef>
+                <a:spcPts val="500"/>
+              </a:spcBef>
+              <a:buFont typeface="Arial" panose="020B0604020202020204" pitchFamily="34" charset="0"/>
+              <a:buNone/>
+              <a:defRPr sz="1600" kern="1200">
+                <a:solidFill>
+                  <a:schemeClr val="tx1"/>
+                </a:solidFill>
+                <a:latin typeface="+mn-lt"/>
+                <a:ea typeface="+mn-ea"/>
+                <a:cs typeface="+mn-cs"/>
+              </a:defRPr>
+            </a:lvl8pPr>
+            <a:lvl9pPr marL="3657600" indent="0" algn="ctr" defTabSz="914400" rtl="0" eaLnBrk="1" latinLnBrk="0" hangingPunct="1">
+              <a:lnSpc>
+                <a:spcPct val="90000"/>
+              </a:lnSpc>
+              <a:spcBef>
+                <a:spcPts val="500"/>
+              </a:spcBef>
+              <a:buFont typeface="Arial" panose="020B0604020202020204" pitchFamily="34" charset="0"/>
+              <a:buNone/>
+              <a:defRPr sz="1600" kern="1200">
+                <a:solidFill>
+                  <a:schemeClr val="tx1"/>
+                </a:solidFill>
+                <a:latin typeface="+mn-lt"/>
+                <a:ea typeface="+mn-ea"/>
+                <a:cs typeface="+mn-cs"/>
+              </a:defRPr>
+            </a:lvl9pPr>
+          </a:lstStyle>
+          <a:p>
+            <a:pPr marL="342900" indent="-342900" algn="l">
+              <a:buFont typeface="Arial" panose="020B0604020202020204" pitchFamily="34" charset="0"/>
+              <a:buChar char="•"/>
+            </a:pPr>
+            <a:r>
+              <a:rPr lang="en-US" dirty="0"/>
+              <a:t>Can also display aggregate statistics on when groups have defeated an encounter.</a:t>
+            </a:r>
+          </a:p>
+          <a:p>
+            <a:pPr algn="l"/>
+            <a:endParaRPr lang="en-US" dirty="0"/>
+          </a:p>
+          <a:p>
+            <a:pPr marL="342900" indent="-342900" algn="l">
+              <a:buFont typeface="Arial" panose="020B0604020202020204" pitchFamily="34" charset="0"/>
+              <a:buChar char="•"/>
+            </a:pPr>
+            <a:r>
+              <a:rPr lang="en-US" dirty="0"/>
+              <a:t>Include information about group composition.</a:t>
+            </a:r>
+          </a:p>
+          <a:p>
+            <a:pPr marL="342900" indent="-342900" algn="l">
+              <a:buFont typeface="Arial" panose="020B0604020202020204" pitchFamily="34" charset="0"/>
+              <a:buChar char="•"/>
+            </a:pPr>
+            <a:endParaRPr lang="en-US" dirty="0"/>
+          </a:p>
+          <a:p>
+            <a:pPr marL="342900" indent="-342900" algn="l">
+              <a:buFont typeface="Arial" panose="020B0604020202020204" pitchFamily="34" charset="0"/>
+              <a:buChar char="•"/>
+            </a:pPr>
+            <a:r>
+              <a:rPr lang="en-US" dirty="0"/>
+              <a:t>Use this data to develop ML model to predict success.</a:t>
+            </a:r>
+          </a:p>
+          <a:p>
+            <a:pPr algn="l"/>
+            <a:endParaRPr lang="en-US" dirty="0"/>
+          </a:p>
+          <a:p>
+            <a:pPr marL="342900" indent="-342900" algn="l">
+              <a:buFont typeface="Arial" panose="020B0604020202020204" pitchFamily="34" charset="0"/>
+              <a:buChar char="•"/>
+            </a:pPr>
+            <a:endParaRPr lang="en-US" dirty="0"/>
+          </a:p>
+        </p:txBody>
+      </p:sp>
+      <p:sp>
+        <p:nvSpPr>
+          <p:cNvPr id="9" name="Content Placeholder 2">
+            <a:extLst>
+              <a:ext uri="{FF2B5EF4-FFF2-40B4-BE49-F238E27FC236}">
+                <a16:creationId xmlns:a16="http://schemas.microsoft.com/office/drawing/2014/main" id="{2B139307-6FA3-4FE9-9482-720E91A03D1F}"/>
+              </a:ext>
+            </a:extLst>
+          </p:cNvPr>
+          <p:cNvSpPr txBox="1">
+            <a:spLocks/>
+          </p:cNvSpPr>
+          <p:nvPr/>
+        </p:nvSpPr>
+        <p:spPr>
+          <a:xfrm>
+            <a:off x="143426" y="6213805"/>
+            <a:ext cx="2754086" cy="558140"/>
+          </a:xfrm>
+          <a:prstGeom prst="rect">
+            <a:avLst/>
+          </a:prstGeom>
+        </p:spPr>
+        <p:txBody>
+          <a:bodyPr vert="horz" lIns="91440" tIns="45720" rIns="91440" bIns="45720" rtlCol="0">
+            <a:normAutofit/>
+          </a:bodyPr>
+          <a:lstStyle>
+            <a:lvl1pPr marL="228600" indent="-228600" algn="l" defTabSz="914400" rtl="0" eaLnBrk="1" latinLnBrk="0" hangingPunct="1">
+              <a:lnSpc>
+                <a:spcPct val="90000"/>
+              </a:lnSpc>
+              <a:spcBef>
+                <a:spcPts val="1000"/>
+              </a:spcBef>
+              <a:buFont typeface="Arial" panose="020B0604020202020204" pitchFamily="34" charset="0"/>
+              <a:buChar char="•"/>
+              <a:defRPr sz="2800" kern="1200">
+                <a:solidFill>
+                  <a:schemeClr val="tx1"/>
+                </a:solidFill>
+                <a:latin typeface="+mn-lt"/>
+                <a:ea typeface="+mn-ea"/>
+                <a:cs typeface="+mn-cs"/>
+              </a:defRPr>
+            </a:lvl1pPr>
+            <a:lvl2pPr marL="685800" indent="-228600" algn="l" defTabSz="914400" rtl="0" eaLnBrk="1" latinLnBrk="0" hangingPunct="1">
+              <a:lnSpc>
+                <a:spcPct val="90000"/>
+              </a:lnSpc>
+              <a:spcBef>
+                <a:spcPts val="500"/>
+              </a:spcBef>
+              <a:buFont typeface="Arial" panose="020B0604020202020204" pitchFamily="34" charset="0"/>
+              <a:buChar char="•"/>
+              <a:defRPr sz="2400" kern="1200">
+                <a:solidFill>
+                  <a:schemeClr val="tx1"/>
+                </a:solidFill>
+                <a:latin typeface="+mn-lt"/>
+                <a:ea typeface="+mn-ea"/>
+                <a:cs typeface="+mn-cs"/>
+              </a:defRPr>
+            </a:lvl2pPr>
+            <a:lvl3pPr marL="1143000" indent="-228600" algn="l" defTabSz="914400" rtl="0" eaLnBrk="1" latinLnBrk="0" hangingPunct="1">
+              <a:lnSpc>
+                <a:spcPct val="90000"/>
+              </a:lnSpc>
+              <a:spcBef>
+                <a:spcPts val="500"/>
+              </a:spcBef>
+              <a:buFont typeface="Arial" panose="020B0604020202020204" pitchFamily="34" charset="0"/>
+              <a:buChar char="•"/>
+              <a:defRPr sz="2000" kern="1200">
+                <a:solidFill>
+                  <a:schemeClr val="tx1"/>
+                </a:solidFill>
+                <a:latin typeface="+mn-lt"/>
+                <a:ea typeface="+mn-ea"/>
+                <a:cs typeface="+mn-cs"/>
+              </a:defRPr>
+            </a:lvl3pPr>
+            <a:lvl4pPr marL="1600200" indent="-228600" algn="l" defTabSz="914400" rtl="0" eaLnBrk="1" latinLnBrk="0" hangingPunct="1">
+              <a:lnSpc>
+                <a:spcPct val="90000"/>
+              </a:lnSpc>
+              <a:spcBef>
+                <a:spcPts val="500"/>
+              </a:spcBef>
+              <a:buFont typeface="Arial" panose="020B0604020202020204" pitchFamily="34" charset="0"/>
+              <a:buChar char="•"/>
+              <a:defRPr sz="1800" kern="1200">
+                <a:solidFill>
+                  <a:schemeClr val="tx1"/>
+                </a:solidFill>
+                <a:latin typeface="+mn-lt"/>
+                <a:ea typeface="+mn-ea"/>
+                <a:cs typeface="+mn-cs"/>
+              </a:defRPr>
+            </a:lvl4pPr>
+            <a:lvl5pPr marL="2057400" indent="-228600" algn="l" defTabSz="914400" rtl="0" eaLnBrk="1" latinLnBrk="0" hangingPunct="1">
+              <a:lnSpc>
+                <a:spcPct val="90000"/>
+              </a:lnSpc>
+              <a:spcBef>
+                <a:spcPts val="500"/>
+              </a:spcBef>
+              <a:buFont typeface="Arial" panose="020B0604020202020204" pitchFamily="34" charset="0"/>
+              <a:buChar char="•"/>
+              <a:defRPr sz="1800" kern="1200">
+                <a:solidFill>
+                  <a:schemeClr val="tx1"/>
+                </a:solidFill>
+                <a:latin typeface="+mn-lt"/>
+                <a:ea typeface="+mn-ea"/>
+                <a:cs typeface="+mn-cs"/>
+              </a:defRPr>
+            </a:lvl5pPr>
+            <a:lvl6pPr marL="2514600" indent="-228600" algn="l" defTabSz="914400" rtl="0" eaLnBrk="1" latinLnBrk="0" hangingPunct="1">
+              <a:lnSpc>
+                <a:spcPct val="90000"/>
+              </a:lnSpc>
+              <a:spcBef>
+                <a:spcPts val="500"/>
+              </a:spcBef>
+              <a:buFont typeface="Arial" panose="020B0604020202020204" pitchFamily="34" charset="0"/>
+              <a:buChar char="•"/>
+              <a:defRPr sz="1800" kern="1200">
+                <a:solidFill>
+                  <a:schemeClr val="tx1"/>
+                </a:solidFill>
+                <a:latin typeface="+mn-lt"/>
+                <a:ea typeface="+mn-ea"/>
+                <a:cs typeface="+mn-cs"/>
+              </a:defRPr>
+            </a:lvl6pPr>
+            <a:lvl7pPr marL="2971800" indent="-228600" algn="l" defTabSz="914400" rtl="0" eaLnBrk="1" latinLnBrk="0" hangingPunct="1">
+              <a:lnSpc>
+                <a:spcPct val="90000"/>
+              </a:lnSpc>
+              <a:spcBef>
+                <a:spcPts val="500"/>
+              </a:spcBef>
+              <a:buFont typeface="Arial" panose="020B0604020202020204" pitchFamily="34" charset="0"/>
+              <a:buChar char="•"/>
+              <a:defRPr sz="1800" kern="1200">
+                <a:solidFill>
+                  <a:schemeClr val="tx1"/>
+                </a:solidFill>
+                <a:latin typeface="+mn-lt"/>
+                <a:ea typeface="+mn-ea"/>
+                <a:cs typeface="+mn-cs"/>
+              </a:defRPr>
+            </a:lvl7pPr>
+            <a:lvl8pPr marL="3429000" indent="-228600" algn="l" defTabSz="914400" rtl="0" eaLnBrk="1" latinLnBrk="0" hangingPunct="1">
+              <a:lnSpc>
+                <a:spcPct val="90000"/>
+              </a:lnSpc>
+              <a:spcBef>
+                <a:spcPts val="500"/>
+              </a:spcBef>
+              <a:buFont typeface="Arial" panose="020B0604020202020204" pitchFamily="34" charset="0"/>
+              <a:buChar char="•"/>
+              <a:defRPr sz="1800" kern="1200">
+                <a:solidFill>
+                  <a:schemeClr val="tx1"/>
+                </a:solidFill>
+                <a:latin typeface="+mn-lt"/>
+                <a:ea typeface="+mn-ea"/>
+                <a:cs typeface="+mn-cs"/>
+              </a:defRPr>
+            </a:lvl8pPr>
+            <a:lvl9pPr marL="3886200" indent="-228600" algn="l" defTabSz="914400" rtl="0" eaLnBrk="1" latinLnBrk="0" hangingPunct="1">
+              <a:lnSpc>
+                <a:spcPct val="90000"/>
+              </a:lnSpc>
+              <a:spcBef>
+                <a:spcPts val="500"/>
+              </a:spcBef>
+              <a:buFont typeface="Arial" panose="020B0604020202020204" pitchFamily="34" charset="0"/>
+              <a:buChar char="•"/>
+              <a:defRPr sz="1800" kern="1200">
+                <a:solidFill>
+                  <a:schemeClr val="tx1"/>
+                </a:solidFill>
+                <a:latin typeface="+mn-lt"/>
+                <a:ea typeface="+mn-ea"/>
+                <a:cs typeface="+mn-cs"/>
+              </a:defRPr>
+            </a:lvl9pPr>
+          </a:lstStyle>
+          <a:p>
+            <a:pPr marL="0" indent="0">
+              <a:buFont typeface="Arial" panose="020B0604020202020204" pitchFamily="34" charset="0"/>
+              <a:buNone/>
+            </a:pPr>
+            <a:r>
+              <a:rPr lang="en-US" dirty="0"/>
+              <a:t>Garrick Bruening</a:t>
+            </a:r>
+          </a:p>
+        </p:txBody>
+      </p:sp>
+      <p:pic>
+        <p:nvPicPr>
+          <p:cNvPr id="8" name="Picture 7" descr="A picture containing diagram&#10;&#10;Description automatically generated">
+            <a:extLst>
+              <a:ext uri="{FF2B5EF4-FFF2-40B4-BE49-F238E27FC236}">
+                <a16:creationId xmlns:a16="http://schemas.microsoft.com/office/drawing/2014/main" id="{4972E7F5-23E9-4368-B609-BF218AA92C0E}"/>
+              </a:ext>
+            </a:extLst>
+          </p:cNvPr>
+          <p:cNvPicPr>
+            <a:picLocks noChangeAspect="1"/>
+          </p:cNvPicPr>
+          <p:nvPr/>
+        </p:nvPicPr>
+        <p:blipFill>
+          <a:blip r:embed="rId3">
+            <a:extLst>
+              <a:ext uri="{28A0092B-C50C-407E-A947-70E740481C1C}">
+                <a14:useLocalDpi xmlns:a14="http://schemas.microsoft.com/office/drawing/2010/main" val="0"/>
+              </a:ext>
+            </a:extLst>
+          </a:blip>
+          <a:stretch>
+            <a:fillRect/>
+          </a:stretch>
+        </p:blipFill>
+        <p:spPr>
+          <a:xfrm>
+            <a:off x="4735587" y="1831796"/>
+            <a:ext cx="7124989" cy="3638943"/>
+          </a:xfrm>
+          <a:prstGeom prst="rect">
+            <a:avLst/>
+          </a:prstGeom>
+        </p:spPr>
+      </p:pic>
+      <p:sp>
+        <p:nvSpPr>
+          <p:cNvPr id="10" name="Title 1">
+            <a:extLst>
+              <a:ext uri="{FF2B5EF4-FFF2-40B4-BE49-F238E27FC236}">
+                <a16:creationId xmlns:a16="http://schemas.microsoft.com/office/drawing/2014/main" id="{3C8C8DA5-57B9-41A1-9737-C5FFDE372264}"/>
+              </a:ext>
+            </a:extLst>
+          </p:cNvPr>
+          <p:cNvSpPr txBox="1">
+            <a:spLocks/>
+          </p:cNvSpPr>
+          <p:nvPr/>
+        </p:nvSpPr>
+        <p:spPr>
+          <a:xfrm>
+            <a:off x="468365" y="244766"/>
+            <a:ext cx="9766768" cy="1860659"/>
+          </a:xfrm>
+          <a:prstGeom prst="rect">
+            <a:avLst/>
+          </a:prstGeom>
+        </p:spPr>
+        <p:txBody>
+          <a:bodyPr vert="horz" lIns="91440" tIns="45720" rIns="91440" bIns="45720" rtlCol="0" anchor="t">
+            <a:normAutofit/>
+          </a:bodyPr>
+          <a:lstStyle>
+            <a:lvl1pPr algn="ctr" defTabSz="914400" rtl="0" eaLnBrk="1" latinLnBrk="0" hangingPunct="1">
+              <a:lnSpc>
+                <a:spcPct val="90000"/>
+              </a:lnSpc>
+              <a:spcBef>
+                <a:spcPct val="0"/>
+              </a:spcBef>
+              <a:buNone/>
+              <a:defRPr sz="6000" kern="1200">
+                <a:solidFill>
+                  <a:schemeClr val="tx1"/>
+                </a:solidFill>
+                <a:latin typeface="+mj-lt"/>
+                <a:ea typeface="+mj-ea"/>
+                <a:cs typeface="+mj-cs"/>
+              </a:defRPr>
+            </a:lvl1pPr>
+          </a:lstStyle>
+          <a:p>
+            <a:pPr algn="l"/>
+            <a:r>
+              <a:rPr lang="en-US" sz="4000" dirty="0">
+                <a:solidFill>
+                  <a:srgbClr val="FFCC00"/>
+                </a:solidFill>
+                <a:latin typeface="+mn-lt"/>
+              </a:rPr>
+              <a:t>Aggregated Group data</a:t>
+            </a:r>
+          </a:p>
+        </p:txBody>
+      </p:sp>
+    </p:spTree>
+    <p:extLst>
+      <p:ext uri="{BB962C8B-B14F-4D97-AF65-F5344CB8AC3E}">
+        <p14:creationId xmlns:p14="http://schemas.microsoft.com/office/powerpoint/2010/main" val="2912885371"/>
+      </p:ext>
+    </p:extLst>
+  </p:cSld>
+  <p:clrMapOvr>
+    <a:masterClrMapping/>
+  </p:clrMapOvr>
+  <mc:AlternateContent xmlns:mc="http://schemas.openxmlformats.org/markup-compatibility/2006">
+    <mc:Choice xmlns:p14="http://schemas.microsoft.com/office/powerpoint/2010/main" Requires="p14">
+      <p:transition p14:dur="300">
+        <p:fade/>
+      </p:transition>
+    </mc:Choice>
+    <mc:Fallback>
+      <p:transition>
+        <p:fade/>
+      </p:transition>
+    </mc:Fallback>
+  </mc:AlternateContent>
+  <p:timing>
+    <p:tnLst>
+      <p:par>
+        <p:cTn id="1" dur="indefinite" restart="never" nodeType="tmRoot">
+          <p:childTnLst>
+            <p:seq concurrent="1" nextAc="seek">
+              <p:cTn id="2" dur="indefinite" nodeType="mainSeq">
+                <p:childTnLst>
+                  <p:par>
+                    <p:cTn id="3" fill="hold">
+                      <p:stCondLst>
+                        <p:cond delay="indefinite"/>
+                      </p:stCondLst>
+                      <p:childTnLst>
+                        <p:par>
+                          <p:cTn id="4" fill="hold">
+                            <p:stCondLst>
+                              <p:cond delay="0"/>
+                            </p:stCondLst>
+                            <p:childTnLst>
+                              <p:par>
+                                <p:cTn id="5" presetID="10" presetClass="entr" presetSubtype="0" fill="hold" nodeType="clickEffect">
+                                  <p:stCondLst>
+                                    <p:cond delay="0"/>
+                                  </p:stCondLst>
+                                  <p:childTnLst>
+                                    <p:set>
+                                      <p:cBhvr>
+                                        <p:cTn id="6" dur="1" fill="hold">
+                                          <p:stCondLst>
+                                            <p:cond delay="0"/>
+                                          </p:stCondLst>
+                                        </p:cTn>
+                                        <p:tgtEl>
+                                          <p:spTgt spid="7">
+                                            <p:txEl>
+                                              <p:pRg st="4" end="4"/>
+                                            </p:txEl>
+                                          </p:spTgt>
+                                        </p:tgtEl>
+                                        <p:attrNameLst>
+                                          <p:attrName>style.visibility</p:attrName>
+                                        </p:attrNameLst>
+                                      </p:cBhvr>
+                                      <p:to>
+                                        <p:strVal val="visible"/>
+                                      </p:to>
+                                    </p:set>
+                                    <p:animEffect transition="in" filter="fade">
+                                      <p:cBhvr>
+                                        <p:cTn id="7" dur="500"/>
+                                        <p:tgtEl>
+                                          <p:spTgt spid="7">
+                                            <p:txEl>
+                                              <p:pRg st="4" end="4"/>
+                                            </p:txEl>
+                                          </p:spTgt>
+                                        </p:tgtEl>
+                                      </p:cBhvr>
+                                    </p:animEffect>
+                                  </p:childTnLst>
+                                </p:cTn>
+                              </p:par>
+                            </p:childTnLst>
+                          </p:cTn>
+                        </p:par>
+                      </p:childTnLst>
+                    </p:cTn>
+                  </p:par>
+                </p:childTnLst>
+              </p:cTn>
+              <p:prevCondLst>
+                <p:cond evt="onPrev" delay="0">
+                  <p:tgtEl>
+                    <p:sldTgt/>
+                  </p:tgtEl>
+                </p:cond>
+              </p:prevCondLst>
+              <p:nextCondLst>
+                <p:cond evt="onNext" delay="0">
+                  <p:tgtEl>
+                    <p:sldTgt/>
+                  </p:tgtEl>
+                </p:cond>
+              </p:nextCondLst>
+            </p:seq>
+          </p:childTnLst>
+        </p:cTn>
+      </p:par>
+    </p:tnLst>
+  </p:timing>
+</p:sld>
+</file>
+
+<file path=ppt/slides/slide7.xml><?xml version="1.0" encoding="utf-8"?>
+<p:sld xmlns:a="http://schemas.openxmlformats.org/drawingml/2006/main" xmlns:r="http://schemas.openxmlformats.org/officeDocument/2006/relationships" xmlns:p="http://schemas.openxmlformats.org/presentationml/2006/main">
+  <p:cSld>
+    <p:spTree>
+      <p:nvGrpSpPr>
+        <p:cNvPr id="1" name=""/>
+        <p:cNvGrpSpPr/>
+        <p:nvPr/>
+      </p:nvGrpSpPr>
+      <p:grpSpPr>
+        <a:xfrm>
+          <a:off x="0" y="0"/>
+          <a:ext cx="0" cy="0"/>
+          <a:chOff x="0" y="0"/>
+          <a:chExt cx="0" cy="0"/>
+        </a:xfrm>
+      </p:grpSpPr>
+      <p:sp>
+        <p:nvSpPr>
           <p:cNvPr id="6" name="Title 1">
             <a:extLst>
               <a:ext uri="{FF2B5EF4-FFF2-40B4-BE49-F238E27FC236}">
@@ -6221,15 +7779,15 @@
         <p:spPr>
           <a:xfrm>
             <a:off x="468365" y="244766"/>
-            <a:ext cx="6025877" cy="872542"/>
+            <a:ext cx="9766768" cy="1860659"/>
           </a:xfrm>
           <a:prstGeom prst="rect">
             <a:avLst/>
           </a:prstGeom>
         </p:spPr>
         <p:txBody>
-          <a:bodyPr vert="horz" lIns="91440" tIns="45720" rIns="91440" bIns="45720" rtlCol="0" anchor="b">
-            <a:normAutofit lnSpcReduction="10000"/>
+          <a:bodyPr vert="horz" lIns="91440" tIns="45720" rIns="91440" bIns="45720" rtlCol="0" anchor="t">
+            <a:normAutofit/>
           </a:bodyPr>
           <a:lstStyle>
             <a:lvl1pPr algn="ctr" defTabSz="914400" rtl="0" eaLnBrk="1" latinLnBrk="0" hangingPunct="1">
@@ -6253,7 +7811,7 @@
           <a:p>
             <a:pPr algn="l"/>
             <a:r>
-              <a:rPr lang="en-US" dirty="0">
+              <a:rPr lang="en-US" sz="4000" dirty="0">
                 <a:solidFill>
                   <a:srgbClr val="FFCC00"/>
                 </a:solidFill>
@@ -6476,7 +8034,7 @@
         </p:nvSpPr>
         <p:spPr>
           <a:xfrm>
-            <a:off x="838200" y="1717720"/>
+            <a:off x="582150" y="1387052"/>
             <a:ext cx="3628121" cy="4282611"/>
           </a:xfrm>
           <a:prstGeom prst="rect">
@@ -6485,7 +8043,7 @@
         </p:spPr>
         <p:txBody>
           <a:bodyPr vert="horz" lIns="91440" tIns="45720" rIns="91440" bIns="45720" rtlCol="0">
-            <a:normAutofit/>
+            <a:normAutofit lnSpcReduction="10000"/>
           </a:bodyPr>
           <a:lstStyle>
             <a:lvl1pPr marL="0" indent="0" algn="ctr" defTabSz="914400" rtl="0" eaLnBrk="1" latinLnBrk="0" hangingPunct="1">
@@ -6658,7 +8216,24 @@
             </a:pPr>
             <a:r>
               <a:rPr lang="en-US" dirty="0"/>
-              <a:t>Create app that makes it easier for users to view their progress.</a:t>
+              <a:t>Create a tool that makes it easier for users to view their progress.</a:t>
+            </a:r>
+          </a:p>
+          <a:p>
+            <a:pPr marL="342900" indent="-342900" algn="l">
+              <a:buFont typeface="Arial" panose="020B0604020202020204" pitchFamily="34" charset="0"/>
+              <a:buChar char="•"/>
+            </a:pPr>
+            <a:endParaRPr lang="en-US" dirty="0"/>
+          </a:p>
+          <a:p>
+            <a:pPr marL="342900" indent="-342900" algn="l">
+              <a:buFont typeface="Arial" panose="020B0604020202020204" pitchFamily="34" charset="0"/>
+              <a:buChar char="•"/>
+            </a:pPr>
+            <a:r>
+              <a:rPr lang="en-US" dirty="0"/>
+              <a:t>Allow users to know how other groups defeated an encounter.</a:t>
             </a:r>
           </a:p>
           <a:p>
@@ -6706,50 +8281,15 @@
           <p:nvPr/>
         </p:nvPicPr>
         <p:blipFill>
-          <a:blip r:embed="rId2"/>
+          <a:blip r:embed="rId3"/>
           <a:stretch>
             <a:fillRect/>
           </a:stretch>
         </p:blipFill>
         <p:spPr>
           <a:xfrm>
-            <a:off x="6096000" y="1225213"/>
+            <a:off x="5675143" y="1157441"/>
             <a:ext cx="4843050" cy="1325563"/>
-          </a:xfrm>
-          <a:prstGeom prst="rect">
-            <a:avLst/>
-          </a:prstGeom>
-        </p:spPr>
-      </p:pic>
-      <p:pic>
-        <p:nvPicPr>
-          <p:cNvPr id="10" name="Picture 9" descr="Graphical user interface&#10;&#10;Description automatically generated">
-            <a:extLst>
-              <a:ext uri="{FF2B5EF4-FFF2-40B4-BE49-F238E27FC236}">
-                <a16:creationId xmlns:a16="http://schemas.microsoft.com/office/drawing/2014/main" id="{719859C6-7B55-4AFB-905E-7D132F4B4D8A}"/>
-              </a:ext>
-            </a:extLst>
-          </p:cNvPr>
-          <p:cNvPicPr>
-            <a:picLocks noChangeAspect="1"/>
-          </p:cNvPicPr>
-          <p:nvPr/>
-        </p:nvPicPr>
-        <p:blipFill rotWithShape="1">
-          <a:blip r:embed="rId3">
-            <a:extLst>
-              <a:ext uri="{28A0092B-C50C-407E-A947-70E740481C1C}">
-                <a14:useLocalDpi xmlns:a14="http://schemas.microsoft.com/office/drawing/2010/main" val="0"/>
-              </a:ext>
-            </a:extLst>
-          </a:blip>
-          <a:srcRect l="-472" t="36070" r="73077" b="31505"/>
-          <a:stretch/>
-        </p:blipFill>
-        <p:spPr>
-          <a:xfrm>
-            <a:off x="6716986" y="3439500"/>
-            <a:ext cx="3006922" cy="2647618"/>
           </a:xfrm>
           <a:prstGeom prst="rect">
             <a:avLst/>
@@ -6772,8 +8312,8 @@
         </p:nvCxnSpPr>
         <p:spPr>
           <a:xfrm flipH="1">
-            <a:off x="8288977" y="2713512"/>
-            <a:ext cx="6991" cy="585249"/>
+            <a:off x="6830458" y="2706278"/>
+            <a:ext cx="1266211" cy="636920"/>
           </a:xfrm>
           <a:prstGeom prst="straightConnector1">
             <a:avLst/>
@@ -7000,6 +8540,119 @@
           </a:p>
         </p:txBody>
       </p:sp>
+      <p:pic>
+        <p:nvPicPr>
+          <p:cNvPr id="13" name="Picture 12" descr="A screenshot of a computer&#10;&#10;Description automatically generated with medium confidence">
+            <a:extLst>
+              <a:ext uri="{FF2B5EF4-FFF2-40B4-BE49-F238E27FC236}">
+                <a16:creationId xmlns:a16="http://schemas.microsoft.com/office/drawing/2014/main" id="{066FA21E-264E-47C1-8936-639B5811A7B3}"/>
+              </a:ext>
+            </a:extLst>
+          </p:cNvPr>
+          <p:cNvPicPr>
+            <a:picLocks noChangeAspect="1"/>
+          </p:cNvPicPr>
+          <p:nvPr/>
+        </p:nvPicPr>
+        <p:blipFill>
+          <a:blip r:embed="rId4">
+            <a:extLst>
+              <a:ext uri="{28A0092B-C50C-407E-A947-70E740481C1C}">
+                <a14:useLocalDpi xmlns:a14="http://schemas.microsoft.com/office/drawing/2010/main" val="0"/>
+              </a:ext>
+            </a:extLst>
+          </a:blip>
+          <a:stretch>
+            <a:fillRect/>
+          </a:stretch>
+        </p:blipFill>
+        <p:spPr>
+          <a:xfrm>
+            <a:off x="4597596" y="3514802"/>
+            <a:ext cx="3499072" cy="1925055"/>
+          </a:xfrm>
+          <a:prstGeom prst="rect">
+            <a:avLst/>
+          </a:prstGeom>
+        </p:spPr>
+      </p:pic>
+      <p:pic>
+        <p:nvPicPr>
+          <p:cNvPr id="14" name="Picture 13" descr="A picture containing diagram&#10;&#10;Description automatically generated">
+            <a:extLst>
+              <a:ext uri="{FF2B5EF4-FFF2-40B4-BE49-F238E27FC236}">
+                <a16:creationId xmlns:a16="http://schemas.microsoft.com/office/drawing/2014/main" id="{9A646906-478E-4BA6-8D5A-1F5C826F3ADA}"/>
+              </a:ext>
+            </a:extLst>
+          </p:cNvPr>
+          <p:cNvPicPr>
+            <a:picLocks noChangeAspect="1"/>
+          </p:cNvPicPr>
+          <p:nvPr/>
+        </p:nvPicPr>
+        <p:blipFill>
+          <a:blip r:embed="rId5">
+            <a:extLst>
+              <a:ext uri="{28A0092B-C50C-407E-A947-70E740481C1C}">
+                <a14:useLocalDpi xmlns:a14="http://schemas.microsoft.com/office/drawing/2010/main" val="0"/>
+              </a:ext>
+            </a:extLst>
+          </a:blip>
+          <a:stretch>
+            <a:fillRect/>
+          </a:stretch>
+        </p:blipFill>
+        <p:spPr>
+          <a:xfrm>
+            <a:off x="8295968" y="3528358"/>
+            <a:ext cx="3769225" cy="1925055"/>
+          </a:xfrm>
+          <a:prstGeom prst="rect">
+            <a:avLst/>
+          </a:prstGeom>
+        </p:spPr>
+      </p:pic>
+      <p:cxnSp>
+        <p:nvCxnSpPr>
+          <p:cNvPr id="15" name="Straight Arrow Connector 14">
+            <a:extLst>
+              <a:ext uri="{FF2B5EF4-FFF2-40B4-BE49-F238E27FC236}">
+                <a16:creationId xmlns:a16="http://schemas.microsoft.com/office/drawing/2014/main" id="{7046BA26-BAEB-4E75-ABBC-3208709BA363}"/>
+              </a:ext>
+            </a:extLst>
+          </p:cNvPr>
+          <p:cNvCxnSpPr>
+            <a:cxnSpLocks/>
+          </p:cNvCxnSpPr>
+          <p:nvPr/>
+        </p:nvCxnSpPr>
+        <p:spPr>
+          <a:xfrm>
+            <a:off x="8056477" y="2706278"/>
+            <a:ext cx="1440063" cy="636920"/>
+          </a:xfrm>
+          <a:prstGeom prst="straightConnector1">
+            <a:avLst/>
+          </a:prstGeom>
+          <a:ln>
+            <a:tailEnd type="triangle"/>
+          </a:ln>
+        </p:spPr>
+        <p:style>
+          <a:lnRef idx="3">
+            <a:schemeClr val="accent5"/>
+          </a:lnRef>
+          <a:fillRef idx="0">
+            <a:schemeClr val="accent5"/>
+          </a:fillRef>
+          <a:effectRef idx="2">
+            <a:schemeClr val="accent5"/>
+          </a:effectRef>
+          <a:fontRef idx="minor">
+            <a:schemeClr val="tx1"/>
+          </a:fontRef>
+        </p:style>
+      </p:cxnSp>
     </p:spTree>
     <p:extLst>
       <p:ext uri="{BB962C8B-B14F-4D97-AF65-F5344CB8AC3E}">
@@ -7010,6 +8663,424 @@
   <p:clrMapOvr>
     <a:masterClrMapping/>
   </p:clrMapOvr>
+  <mc:AlternateContent xmlns:mc="http://schemas.openxmlformats.org/markup-compatibility/2006">
+    <mc:Choice xmlns:p14="http://schemas.microsoft.com/office/powerpoint/2010/main" Requires="p14">
+      <p:transition p14:dur="300">
+        <p:fade/>
+      </p:transition>
+    </mc:Choice>
+    <mc:Fallback>
+      <p:transition>
+        <p:fade/>
+      </p:transition>
+    </mc:Fallback>
+  </mc:AlternateContent>
+  <p:timing>
+    <p:tnLst>
+      <p:par>
+        <p:cTn id="1" dur="indefinite" restart="never" nodeType="tmRoot">
+          <p:childTnLst>
+            <p:seq concurrent="1" nextAc="seek">
+              <p:cTn id="2" dur="indefinite" nodeType="mainSeq">
+                <p:childTnLst>
+                  <p:par>
+                    <p:cTn id="3" fill="hold">
+                      <p:stCondLst>
+                        <p:cond delay="indefinite"/>
+                      </p:stCondLst>
+                      <p:childTnLst>
+                        <p:par>
+                          <p:cTn id="4" fill="hold">
+                            <p:stCondLst>
+                              <p:cond delay="0"/>
+                            </p:stCondLst>
+                            <p:childTnLst>
+                              <p:par>
+                                <p:cTn id="5" presetID="10" presetClass="entr" presetSubtype="0" fill="hold" nodeType="clickEffect">
+                                  <p:stCondLst>
+                                    <p:cond delay="0"/>
+                                  </p:stCondLst>
+                                  <p:childTnLst>
+                                    <p:set>
+                                      <p:cBhvr>
+                                        <p:cTn id="6" dur="1" fill="hold">
+                                          <p:stCondLst>
+                                            <p:cond delay="0"/>
+                                          </p:stCondLst>
+                                        </p:cTn>
+                                        <p:tgtEl>
+                                          <p:spTgt spid="11">
+                                            <p:txEl>
+                                              <p:pRg st="0" end="0"/>
+                                            </p:txEl>
+                                          </p:spTgt>
+                                        </p:tgtEl>
+                                        <p:attrNameLst>
+                                          <p:attrName>style.visibility</p:attrName>
+                                        </p:attrNameLst>
+                                      </p:cBhvr>
+                                      <p:to>
+                                        <p:strVal val="visible"/>
+                                      </p:to>
+                                    </p:set>
+                                    <p:animEffect transition="in" filter="fade">
+                                      <p:cBhvr>
+                                        <p:cTn id="7" dur="500"/>
+                                        <p:tgtEl>
+                                          <p:spTgt spid="11">
+                                            <p:txEl>
+                                              <p:pRg st="0" end="0"/>
+                                            </p:txEl>
+                                          </p:spTgt>
+                                        </p:tgtEl>
+                                      </p:cBhvr>
+                                    </p:animEffect>
+                                  </p:childTnLst>
+                                </p:cTn>
+                              </p:par>
+                              <p:par>
+                                <p:cTn id="8" presetID="10" presetClass="entr" presetSubtype="0" fill="hold" nodeType="withEffect">
+                                  <p:stCondLst>
+                                    <p:cond delay="0"/>
+                                  </p:stCondLst>
+                                  <p:childTnLst>
+                                    <p:set>
+                                      <p:cBhvr>
+                                        <p:cTn id="9" dur="1" fill="hold">
+                                          <p:stCondLst>
+                                            <p:cond delay="0"/>
+                                          </p:stCondLst>
+                                        </p:cTn>
+                                        <p:tgtEl>
+                                          <p:spTgt spid="9"/>
+                                        </p:tgtEl>
+                                        <p:attrNameLst>
+                                          <p:attrName>style.visibility</p:attrName>
+                                        </p:attrNameLst>
+                                      </p:cBhvr>
+                                      <p:to>
+                                        <p:strVal val="visible"/>
+                                      </p:to>
+                                    </p:set>
+                                    <p:animEffect transition="in" filter="fade">
+                                      <p:cBhvr>
+                                        <p:cTn id="10" dur="500"/>
+                                        <p:tgtEl>
+                                          <p:spTgt spid="9"/>
+                                        </p:tgtEl>
+                                      </p:cBhvr>
+                                    </p:animEffect>
+                                  </p:childTnLst>
+                                </p:cTn>
+                              </p:par>
+                            </p:childTnLst>
+                          </p:cTn>
+                        </p:par>
+                      </p:childTnLst>
+                    </p:cTn>
+                  </p:par>
+                  <p:par>
+                    <p:cTn id="11" fill="hold">
+                      <p:stCondLst>
+                        <p:cond delay="indefinite"/>
+                      </p:stCondLst>
+                      <p:childTnLst>
+                        <p:par>
+                          <p:cTn id="12" fill="hold">
+                            <p:stCondLst>
+                              <p:cond delay="0"/>
+                            </p:stCondLst>
+                            <p:childTnLst>
+                              <p:par>
+                                <p:cTn id="13" presetID="10" presetClass="entr" presetSubtype="0" fill="hold" nodeType="clickEffect">
+                                  <p:stCondLst>
+                                    <p:cond delay="0"/>
+                                  </p:stCondLst>
+                                  <p:childTnLst>
+                                    <p:set>
+                                      <p:cBhvr>
+                                        <p:cTn id="14" dur="1" fill="hold">
+                                          <p:stCondLst>
+                                            <p:cond delay="0"/>
+                                          </p:stCondLst>
+                                        </p:cTn>
+                                        <p:tgtEl>
+                                          <p:spTgt spid="3"/>
+                                        </p:tgtEl>
+                                        <p:attrNameLst>
+                                          <p:attrName>style.visibility</p:attrName>
+                                        </p:attrNameLst>
+                                      </p:cBhvr>
+                                      <p:to>
+                                        <p:strVal val="visible"/>
+                                      </p:to>
+                                    </p:set>
+                                    <p:animEffect transition="in" filter="fade">
+                                      <p:cBhvr>
+                                        <p:cTn id="15" dur="500"/>
+                                        <p:tgtEl>
+                                          <p:spTgt spid="3"/>
+                                        </p:tgtEl>
+                                      </p:cBhvr>
+                                    </p:animEffect>
+                                  </p:childTnLst>
+                                </p:cTn>
+                              </p:par>
+                              <p:par>
+                                <p:cTn id="16" presetID="10" presetClass="entr" presetSubtype="0" fill="hold" nodeType="withEffect">
+                                  <p:stCondLst>
+                                    <p:cond delay="0"/>
+                                  </p:stCondLst>
+                                  <p:childTnLst>
+                                    <p:set>
+                                      <p:cBhvr>
+                                        <p:cTn id="17" dur="1" fill="hold">
+                                          <p:stCondLst>
+                                            <p:cond delay="0"/>
+                                          </p:stCondLst>
+                                        </p:cTn>
+                                        <p:tgtEl>
+                                          <p:spTgt spid="13"/>
+                                        </p:tgtEl>
+                                        <p:attrNameLst>
+                                          <p:attrName>style.visibility</p:attrName>
+                                        </p:attrNameLst>
+                                      </p:cBhvr>
+                                      <p:to>
+                                        <p:strVal val="visible"/>
+                                      </p:to>
+                                    </p:set>
+                                    <p:animEffect transition="in" filter="fade">
+                                      <p:cBhvr>
+                                        <p:cTn id="18" dur="500"/>
+                                        <p:tgtEl>
+                                          <p:spTgt spid="13"/>
+                                        </p:tgtEl>
+                                      </p:cBhvr>
+                                    </p:animEffect>
+                                  </p:childTnLst>
+                                </p:cTn>
+                              </p:par>
+                            </p:childTnLst>
+                          </p:cTn>
+                        </p:par>
+                      </p:childTnLst>
+                    </p:cTn>
+                  </p:par>
+                  <p:par>
+                    <p:cTn id="19" fill="hold">
+                      <p:stCondLst>
+                        <p:cond delay="indefinite"/>
+                      </p:stCondLst>
+                      <p:childTnLst>
+                        <p:par>
+                          <p:cTn id="20" fill="hold">
+                            <p:stCondLst>
+                              <p:cond delay="0"/>
+                            </p:stCondLst>
+                            <p:childTnLst>
+                              <p:par>
+                                <p:cTn id="21" presetID="10" presetClass="entr" presetSubtype="0" fill="hold" nodeType="clickEffect">
+                                  <p:stCondLst>
+                                    <p:cond delay="0"/>
+                                  </p:stCondLst>
+                                  <p:childTnLst>
+                                    <p:set>
+                                      <p:cBhvr>
+                                        <p:cTn id="22" dur="1" fill="hold">
+                                          <p:stCondLst>
+                                            <p:cond delay="0"/>
+                                          </p:stCondLst>
+                                        </p:cTn>
+                                        <p:tgtEl>
+                                          <p:spTgt spid="11">
+                                            <p:txEl>
+                                              <p:pRg st="2" end="2"/>
+                                            </p:txEl>
+                                          </p:spTgt>
+                                        </p:tgtEl>
+                                        <p:attrNameLst>
+                                          <p:attrName>style.visibility</p:attrName>
+                                        </p:attrNameLst>
+                                      </p:cBhvr>
+                                      <p:to>
+                                        <p:strVal val="visible"/>
+                                      </p:to>
+                                    </p:set>
+                                    <p:animEffect transition="in" filter="fade">
+                                      <p:cBhvr>
+                                        <p:cTn id="23" dur="500"/>
+                                        <p:tgtEl>
+                                          <p:spTgt spid="11">
+                                            <p:txEl>
+                                              <p:pRg st="2" end="2"/>
+                                            </p:txEl>
+                                          </p:spTgt>
+                                        </p:tgtEl>
+                                      </p:cBhvr>
+                                    </p:animEffect>
+                                  </p:childTnLst>
+                                </p:cTn>
+                              </p:par>
+                              <p:par>
+                                <p:cTn id="24" presetID="10" presetClass="entr" presetSubtype="0" fill="hold" nodeType="withEffect">
+                                  <p:stCondLst>
+                                    <p:cond delay="0"/>
+                                  </p:stCondLst>
+                                  <p:childTnLst>
+                                    <p:set>
+                                      <p:cBhvr>
+                                        <p:cTn id="25" dur="1" fill="hold">
+                                          <p:stCondLst>
+                                            <p:cond delay="0"/>
+                                          </p:stCondLst>
+                                        </p:cTn>
+                                        <p:tgtEl>
+                                          <p:spTgt spid="15"/>
+                                        </p:tgtEl>
+                                        <p:attrNameLst>
+                                          <p:attrName>style.visibility</p:attrName>
+                                        </p:attrNameLst>
+                                      </p:cBhvr>
+                                      <p:to>
+                                        <p:strVal val="visible"/>
+                                      </p:to>
+                                    </p:set>
+                                    <p:animEffect transition="in" filter="fade">
+                                      <p:cBhvr>
+                                        <p:cTn id="26" dur="500"/>
+                                        <p:tgtEl>
+                                          <p:spTgt spid="15"/>
+                                        </p:tgtEl>
+                                      </p:cBhvr>
+                                    </p:animEffect>
+                                  </p:childTnLst>
+                                </p:cTn>
+                              </p:par>
+                              <p:par>
+                                <p:cTn id="27" presetID="10" presetClass="entr" presetSubtype="0" fill="hold" nodeType="withEffect">
+                                  <p:stCondLst>
+                                    <p:cond delay="0"/>
+                                  </p:stCondLst>
+                                  <p:childTnLst>
+                                    <p:set>
+                                      <p:cBhvr>
+                                        <p:cTn id="28" dur="1" fill="hold">
+                                          <p:stCondLst>
+                                            <p:cond delay="0"/>
+                                          </p:stCondLst>
+                                        </p:cTn>
+                                        <p:tgtEl>
+                                          <p:spTgt spid="14"/>
+                                        </p:tgtEl>
+                                        <p:attrNameLst>
+                                          <p:attrName>style.visibility</p:attrName>
+                                        </p:attrNameLst>
+                                      </p:cBhvr>
+                                      <p:to>
+                                        <p:strVal val="visible"/>
+                                      </p:to>
+                                    </p:set>
+                                    <p:animEffect transition="in" filter="fade">
+                                      <p:cBhvr>
+                                        <p:cTn id="29" dur="500"/>
+                                        <p:tgtEl>
+                                          <p:spTgt spid="14"/>
+                                        </p:tgtEl>
+                                      </p:cBhvr>
+                                    </p:animEffect>
+                                  </p:childTnLst>
+                                </p:cTn>
+                              </p:par>
+                            </p:childTnLst>
+                          </p:cTn>
+                        </p:par>
+                      </p:childTnLst>
+                    </p:cTn>
+                  </p:par>
+                  <p:par>
+                    <p:cTn id="30" fill="hold">
+                      <p:stCondLst>
+                        <p:cond delay="indefinite"/>
+                      </p:stCondLst>
+                      <p:childTnLst>
+                        <p:par>
+                          <p:cTn id="31" fill="hold">
+                            <p:stCondLst>
+                              <p:cond delay="0"/>
+                            </p:stCondLst>
+                            <p:childTnLst>
+                              <p:par>
+                                <p:cTn id="32" presetID="10" presetClass="entr" presetSubtype="0" fill="hold" nodeType="clickEffect">
+                                  <p:stCondLst>
+                                    <p:cond delay="0"/>
+                                  </p:stCondLst>
+                                  <p:childTnLst>
+                                    <p:set>
+                                      <p:cBhvr>
+                                        <p:cTn id="33" dur="1" fill="hold">
+                                          <p:stCondLst>
+                                            <p:cond delay="0"/>
+                                          </p:stCondLst>
+                                        </p:cTn>
+                                        <p:tgtEl>
+                                          <p:spTgt spid="11">
+                                            <p:txEl>
+                                              <p:pRg st="4" end="4"/>
+                                            </p:txEl>
+                                          </p:spTgt>
+                                        </p:tgtEl>
+                                        <p:attrNameLst>
+                                          <p:attrName>style.visibility</p:attrName>
+                                        </p:attrNameLst>
+                                      </p:cBhvr>
+                                      <p:to>
+                                        <p:strVal val="visible"/>
+                                      </p:to>
+                                    </p:set>
+                                    <p:animEffect transition="in" filter="fade">
+                                      <p:cBhvr>
+                                        <p:cTn id="34" dur="500"/>
+                                        <p:tgtEl>
+                                          <p:spTgt spid="11">
+                                            <p:txEl>
+                                              <p:pRg st="4" end="4"/>
+                                            </p:txEl>
+                                          </p:spTgt>
+                                        </p:tgtEl>
+                                      </p:cBhvr>
+                                    </p:animEffect>
+                                  </p:childTnLst>
+                                </p:cTn>
+                              </p:par>
+                            </p:childTnLst>
+                          </p:cTn>
+                        </p:par>
+                      </p:childTnLst>
+                    </p:cTn>
+                  </p:par>
+                </p:childTnLst>
+              </p:cTn>
+              <p:prevCondLst>
+                <p:cond evt="onPrev" delay="0">
+                  <p:tgtEl>
+                    <p:sldTgt/>
+                  </p:tgtEl>
+                </p:cond>
+              </p:prevCondLst>
+              <p:nextCondLst>
+                <p:cond evt="onNext" delay="0">
+                  <p:tgtEl>
+                    <p:sldTgt/>
+                  </p:tgtEl>
+                </p:cond>
+              </p:nextCondLst>
+            </p:seq>
+          </p:childTnLst>
+        </p:cTn>
+      </p:par>
+    </p:tnLst>
+  </p:timing>
 </p:sld>
 </file>
 

</xml_diff>

<commit_message>
Updating ML files. Got most of the ML models in, working on better training.
</commit_message>
<xml_diff>
--- a/TDI/TDI_pitch.pptx
+++ b/TDI/TDI_pitch.pptx
@@ -5,16 +5,17 @@
     <p:sldMasterId id="2147483660" r:id="rId1"/>
   </p:sldMasterIdLst>
   <p:notesMasterIdLst>
-    <p:notesMasterId r:id="rId9"/>
+    <p:notesMasterId r:id="rId10"/>
   </p:notesMasterIdLst>
   <p:sldIdLst>
     <p:sldId id="260" r:id="rId2"/>
     <p:sldId id="258" r:id="rId3"/>
     <p:sldId id="259" r:id="rId4"/>
-    <p:sldId id="256" r:id="rId5"/>
-    <p:sldId id="257" r:id="rId6"/>
-    <p:sldId id="263" r:id="rId7"/>
-    <p:sldId id="262" r:id="rId8"/>
+    <p:sldId id="264" r:id="rId5"/>
+    <p:sldId id="256" r:id="rId6"/>
+    <p:sldId id="257" r:id="rId7"/>
+    <p:sldId id="263" r:id="rId8"/>
+    <p:sldId id="262" r:id="rId9"/>
   </p:sldIdLst>
   <p:sldSz cx="12192000" cy="6858000"/>
   <p:notesSz cx="6858000" cy="9144000"/>
@@ -203,7 +204,7 @@
           <a:p>
             <a:fld id="{DF3E082A-6A49-4DD0-9794-99AC4565B14C}" type="datetimeFigureOut">
               <a:rPr lang="en-US" smtClean="0"/>
-              <a:t>10/14/2021</a:t>
+              <a:t>10/19/2021</a:t>
             </a:fld>
             <a:endParaRPr lang="en-US"/>
           </a:p>
@@ -849,19 +850,58 @@
           <a:p>
             <a:r>
               <a:rPr lang="en-US" dirty="0"/>
-              <a:t>To much on the method, need more on the business side of things</a:t>
+              <a:t>What I propose is building an interactive tool that allows players to better understand their groups progression from a much higher level.</a:t>
             </a:r>
           </a:p>
           <a:p>
             <a:endParaRPr lang="en-US" dirty="0"/>
           </a:p>
           <a:p>
+            <a:r>
+              <a:rPr lang="en-US" dirty="0"/>
+              <a:t>This will allow players a few things.</a:t>
+            </a:r>
+          </a:p>
+          <a:p>
             <a:endParaRPr lang="en-US" dirty="0"/>
           </a:p>
           <a:p>
             <a:r>
               <a:rPr lang="en-US" dirty="0"/>
-              <a:t>Change color/size to make it bigger for this</a:t>
+              <a:t>First is a better understanding of their progression.</a:t>
+            </a:r>
+          </a:p>
+          <a:p>
+            <a:r>
+              <a:rPr lang="en-US" dirty="0"/>
+              <a:t>Second, the ability to compare themselves to friends or other groups more easily.</a:t>
+            </a:r>
+          </a:p>
+          <a:p>
+            <a:r>
+              <a:rPr lang="en-US" dirty="0"/>
+              <a:t>And last, the ability to have a prediction of the chance they will succeed in the encounter.</a:t>
+            </a:r>
+          </a:p>
+          <a:p>
+            <a:endParaRPr lang="en-US" dirty="0"/>
+          </a:p>
+          <a:p>
+            <a:r>
+              <a:rPr lang="en-US" dirty="0"/>
+              <a:t>Here I’m showing an example for a group’s progression over time of the first two encounters.</a:t>
+            </a:r>
+          </a:p>
+          <a:p>
+            <a:r>
+              <a:rPr lang="en-US" dirty="0"/>
+              <a:t>We can see how groups progress over the entire time, instead of just on the specific day/week.</a:t>
+            </a:r>
+          </a:p>
+          <a:p>
+            <a:r>
+              <a:rPr lang="en-US" dirty="0"/>
+              <a:t>This visualization of group progression over time much more easily digestible than previous methods.</a:t>
             </a:r>
           </a:p>
         </p:txBody>
@@ -892,7 +932,7 @@
     </p:spTree>
     <p:extLst>
       <p:ext uri="{BB962C8B-B14F-4D97-AF65-F5344CB8AC3E}">
-        <p14:creationId xmlns:p14="http://schemas.microsoft.com/office/powerpoint/2010/main" val="2260032227"/>
+        <p14:creationId xmlns:p14="http://schemas.microsoft.com/office/powerpoint/2010/main" val="1213182375"/>
       </p:ext>
     </p:extLst>
   </p:cSld>
@@ -948,22 +988,19 @@
           <a:p>
             <a:r>
               <a:rPr lang="en-US" dirty="0"/>
-              <a:t>Along with showing individual group data, we can present the aggregated group data on a per encounter basis.</a:t>
-            </a:r>
+              <a:t>To much on the method, need more on the business side of things</a:t>
+            </a:r>
+          </a:p>
+          <a:p>
+            <a:endParaRPr lang="en-US" dirty="0"/>
+          </a:p>
+          <a:p>
+            <a:endParaRPr lang="en-US" dirty="0"/>
           </a:p>
           <a:p>
             <a:r>
               <a:rPr lang="en-US" dirty="0"/>
-              <a:t>This allows groups to understand how they compare to the average in pull count, total progression time, along with average level in the game.</a:t>
-            </a:r>
-          </a:p>
-          <a:p>
-            <a:endParaRPr lang="en-US" dirty="0"/>
-          </a:p>
-          <a:p>
-            <a:r>
-              <a:rPr lang="en-US" dirty="0"/>
-              <a:t>We can also integrate this with individual groups, to view how an individual group is comparing to the rest of everyone.</a:t>
+              <a:t>Change color/size to make it bigger for this</a:t>
             </a:r>
           </a:p>
         </p:txBody>
@@ -994,7 +1031,7 @@
     </p:spTree>
     <p:extLst>
       <p:ext uri="{BB962C8B-B14F-4D97-AF65-F5344CB8AC3E}">
-        <p14:creationId xmlns:p14="http://schemas.microsoft.com/office/powerpoint/2010/main" val="1761263340"/>
+        <p14:creationId xmlns:p14="http://schemas.microsoft.com/office/powerpoint/2010/main" val="2260032227"/>
       </p:ext>
     </p:extLst>
   </p:cSld>
@@ -1050,7 +1087,13 @@
           <a:p>
             <a:r>
               <a:rPr lang="en-US" dirty="0"/>
-              <a:t>As well as showing average time to defeat the encounter, we can provide information of the approximate group composition of groups that have defeated the encounter.</a:t>
+              <a:t>Along with showing individual group data, we can present the aggregated group data on a per encounter basis.</a:t>
+            </a:r>
+          </a:p>
+          <a:p>
+            <a:r>
+              <a:rPr lang="en-US" dirty="0"/>
+              <a:t>This allows groups to understand how they compare to the average in pull count, total progression time, along with average level in the game.</a:t>
             </a:r>
           </a:p>
           <a:p>
@@ -1059,7 +1102,7 @@
           <a:p>
             <a:r>
               <a:rPr lang="en-US" dirty="0"/>
-              <a:t>Using this aggregated data, I can develop a predictive model that can be used to individual groups to predict their chance of success.</a:t>
+              <a:t>We can also integrate this with individual groups, to view how an individual group is comparing to the rest of everyone.</a:t>
             </a:r>
           </a:p>
         </p:txBody>
@@ -1090,7 +1133,7 @@
     </p:spTree>
     <p:extLst>
       <p:ext uri="{BB962C8B-B14F-4D97-AF65-F5344CB8AC3E}">
-        <p14:creationId xmlns:p14="http://schemas.microsoft.com/office/powerpoint/2010/main" val="808985982"/>
+        <p14:creationId xmlns:p14="http://schemas.microsoft.com/office/powerpoint/2010/main" val="1761263340"/>
       </p:ext>
     </p:extLst>
   </p:cSld>
@@ -1146,7 +1189,7 @@
           <a:p>
             <a:r>
               <a:rPr lang="en-US" dirty="0"/>
-              <a:t>To summarize, </a:t>
+              <a:t>As well as showing average time to defeat the encounter, we can provide information of the approximate group composition of groups that have defeated the encounter.</a:t>
             </a:r>
           </a:p>
           <a:p>
@@ -1155,22 +1198,7 @@
           <a:p>
             <a:r>
               <a:rPr lang="en-US" dirty="0"/>
-              <a:t>I want to move from this outdated method of viewing group progression</a:t>
-            </a:r>
-          </a:p>
-          <a:p>
-            <a:r>
-              <a:rPr lang="en-US" dirty="0"/>
-              <a:t>To a much more digestible method that shows group progression over time along with aggregate statistics.</a:t>
-            </a:r>
-          </a:p>
-          <a:p>
-            <a:endParaRPr lang="en-US" dirty="0"/>
-          </a:p>
-          <a:p>
-            <a:r>
-              <a:rPr lang="en-US" dirty="0"/>
-              <a:t>This will allow the millions of individual players to understand their group progression to a much better degree along with provide them a tool to predict their groups success.</a:t>
+              <a:t>Using this aggregated data, I can develop a predictive model that can be used to individual groups to predict their chance of success.</a:t>
             </a:r>
           </a:p>
         </p:txBody>
@@ -1193,6 +1221,117 @@
             <a:fld id="{FCF85715-091D-4CC5-B0BD-9CC5D11D4EDF}" type="slidenum">
               <a:rPr lang="en-US" smtClean="0"/>
               <a:t>7</a:t>
+            </a:fld>
+            <a:endParaRPr lang="en-US"/>
+          </a:p>
+        </p:txBody>
+      </p:sp>
+    </p:spTree>
+    <p:extLst>
+      <p:ext uri="{BB962C8B-B14F-4D97-AF65-F5344CB8AC3E}">
+        <p14:creationId xmlns:p14="http://schemas.microsoft.com/office/powerpoint/2010/main" val="808985982"/>
+      </p:ext>
+    </p:extLst>
+  </p:cSld>
+  <p:clrMapOvr>
+    <a:masterClrMapping/>
+  </p:clrMapOvr>
+</p:notes>
+</file>
+
+<file path=ppt/notesSlides/notesSlide8.xml><?xml version="1.0" encoding="utf-8"?>
+<p:notes xmlns:a="http://schemas.openxmlformats.org/drawingml/2006/main" xmlns:r="http://schemas.openxmlformats.org/officeDocument/2006/relationships" xmlns:p="http://schemas.openxmlformats.org/presentationml/2006/main">
+  <p:cSld>
+    <p:spTree>
+      <p:nvGrpSpPr>
+        <p:cNvPr id="1" name=""/>
+        <p:cNvGrpSpPr/>
+        <p:nvPr/>
+      </p:nvGrpSpPr>
+      <p:grpSpPr>
+        <a:xfrm>
+          <a:off x="0" y="0"/>
+          <a:ext cx="0" cy="0"/>
+          <a:chOff x="0" y="0"/>
+          <a:chExt cx="0" cy="0"/>
+        </a:xfrm>
+      </p:grpSpPr>
+      <p:sp>
+        <p:nvSpPr>
+          <p:cNvPr id="2" name="Slide Image Placeholder 1"/>
+          <p:cNvSpPr>
+            <a:spLocks noGrp="1" noRot="1" noChangeAspect="1"/>
+          </p:cNvSpPr>
+          <p:nvPr>
+            <p:ph type="sldImg"/>
+          </p:nvPr>
+        </p:nvSpPr>
+        <p:spPr/>
+      </p:sp>
+      <p:sp>
+        <p:nvSpPr>
+          <p:cNvPr id="3" name="Notes Placeholder 2"/>
+          <p:cNvSpPr>
+            <a:spLocks noGrp="1"/>
+          </p:cNvSpPr>
+          <p:nvPr>
+            <p:ph type="body" idx="1"/>
+          </p:nvPr>
+        </p:nvSpPr>
+        <p:spPr/>
+        <p:txBody>
+          <a:bodyPr/>
+          <a:lstStyle/>
+          <a:p>
+            <a:r>
+              <a:rPr lang="en-US" dirty="0"/>
+              <a:t>To summarize, </a:t>
+            </a:r>
+          </a:p>
+          <a:p>
+            <a:endParaRPr lang="en-US" dirty="0"/>
+          </a:p>
+          <a:p>
+            <a:r>
+              <a:rPr lang="en-US" dirty="0"/>
+              <a:t>I want to move from this outdated method of viewing group progression</a:t>
+            </a:r>
+          </a:p>
+          <a:p>
+            <a:r>
+              <a:rPr lang="en-US" dirty="0"/>
+              <a:t>To a much more digestible method that shows group progression over time along with aggregate statistics.</a:t>
+            </a:r>
+          </a:p>
+          <a:p>
+            <a:endParaRPr lang="en-US" dirty="0"/>
+          </a:p>
+          <a:p>
+            <a:r>
+              <a:rPr lang="en-US" dirty="0"/>
+              <a:t>This will allow the millions of individual players to understand their group progression to a much better degree along with provide them a tool to predict their groups success.</a:t>
+            </a:r>
+          </a:p>
+        </p:txBody>
+      </p:sp>
+      <p:sp>
+        <p:nvSpPr>
+          <p:cNvPr id="4" name="Slide Number Placeholder 3"/>
+          <p:cNvSpPr>
+            <a:spLocks noGrp="1"/>
+          </p:cNvSpPr>
+          <p:nvPr>
+            <p:ph type="sldNum" sz="quarter" idx="5"/>
+          </p:nvPr>
+        </p:nvSpPr>
+        <p:spPr/>
+        <p:txBody>
+          <a:bodyPr/>
+          <a:lstStyle/>
+          <a:p>
+            <a:fld id="{FCF85715-091D-4CC5-B0BD-9CC5D11D4EDF}" type="slidenum">
+              <a:rPr lang="en-US" smtClean="0"/>
+              <a:t>8</a:t>
             </a:fld>
             <a:endParaRPr lang="en-US"/>
           </a:p>
@@ -1342,7 +1481,7 @@
           <a:p>
             <a:fld id="{E71A4870-E222-4CD6-881F-7AD8134D3EF7}" type="datetimeFigureOut">
               <a:rPr lang="en-US" smtClean="0"/>
-              <a:t>10/14/2021</a:t>
+              <a:t>10/19/2021</a:t>
             </a:fld>
             <a:endParaRPr lang="en-US"/>
           </a:p>
@@ -1512,7 +1651,7 @@
           <a:p>
             <a:fld id="{E71A4870-E222-4CD6-881F-7AD8134D3EF7}" type="datetimeFigureOut">
               <a:rPr lang="en-US" smtClean="0"/>
-              <a:t>10/14/2021</a:t>
+              <a:t>10/19/2021</a:t>
             </a:fld>
             <a:endParaRPr lang="en-US"/>
           </a:p>
@@ -1692,7 +1831,7 @@
           <a:p>
             <a:fld id="{E71A4870-E222-4CD6-881F-7AD8134D3EF7}" type="datetimeFigureOut">
               <a:rPr lang="en-US" smtClean="0"/>
-              <a:t>10/14/2021</a:t>
+              <a:t>10/19/2021</a:t>
             </a:fld>
             <a:endParaRPr lang="en-US"/>
           </a:p>
@@ -1862,7 +2001,7 @@
           <a:p>
             <a:fld id="{E71A4870-E222-4CD6-881F-7AD8134D3EF7}" type="datetimeFigureOut">
               <a:rPr lang="en-US" smtClean="0"/>
-              <a:t>10/14/2021</a:t>
+              <a:t>10/19/2021</a:t>
             </a:fld>
             <a:endParaRPr lang="en-US"/>
           </a:p>
@@ -2108,7 +2247,7 @@
           <a:p>
             <a:fld id="{E71A4870-E222-4CD6-881F-7AD8134D3EF7}" type="datetimeFigureOut">
               <a:rPr lang="en-US" smtClean="0"/>
-              <a:t>10/14/2021</a:t>
+              <a:t>10/19/2021</a:t>
             </a:fld>
             <a:endParaRPr lang="en-US"/>
           </a:p>
@@ -2340,7 +2479,7 @@
           <a:p>
             <a:fld id="{E71A4870-E222-4CD6-881F-7AD8134D3EF7}" type="datetimeFigureOut">
               <a:rPr lang="en-US" smtClean="0"/>
-              <a:t>10/14/2021</a:t>
+              <a:t>10/19/2021</a:t>
             </a:fld>
             <a:endParaRPr lang="en-US"/>
           </a:p>
@@ -2707,7 +2846,7 @@
           <a:p>
             <a:fld id="{E71A4870-E222-4CD6-881F-7AD8134D3EF7}" type="datetimeFigureOut">
               <a:rPr lang="en-US" smtClean="0"/>
-              <a:t>10/14/2021</a:t>
+              <a:t>10/19/2021</a:t>
             </a:fld>
             <a:endParaRPr lang="en-US"/>
           </a:p>
@@ -2825,7 +2964,7 @@
           <a:p>
             <a:fld id="{E71A4870-E222-4CD6-881F-7AD8134D3EF7}" type="datetimeFigureOut">
               <a:rPr lang="en-US" smtClean="0"/>
-              <a:t>10/14/2021</a:t>
+              <a:t>10/19/2021</a:t>
             </a:fld>
             <a:endParaRPr lang="en-US"/>
           </a:p>
@@ -2920,7 +3059,7 @@
           <a:p>
             <a:fld id="{E71A4870-E222-4CD6-881F-7AD8134D3EF7}" type="datetimeFigureOut">
               <a:rPr lang="en-US" smtClean="0"/>
-              <a:t>10/14/2021</a:t>
+              <a:t>10/19/2021</a:t>
             </a:fld>
             <a:endParaRPr lang="en-US"/>
           </a:p>
@@ -3197,7 +3336,7 @@
           <a:p>
             <a:fld id="{E71A4870-E222-4CD6-881F-7AD8134D3EF7}" type="datetimeFigureOut">
               <a:rPr lang="en-US" smtClean="0"/>
-              <a:t>10/14/2021</a:t>
+              <a:t>10/19/2021</a:t>
             </a:fld>
             <a:endParaRPr lang="en-US"/>
           </a:p>
@@ -3454,7 +3593,7 @@
           <a:p>
             <a:fld id="{E71A4870-E222-4CD6-881F-7AD8134D3EF7}" type="datetimeFigureOut">
               <a:rPr lang="en-US" smtClean="0"/>
-              <a:t>10/14/2021</a:t>
+              <a:t>10/19/2021</a:t>
             </a:fld>
             <a:endParaRPr lang="en-US"/>
           </a:p>
@@ -3667,7 +3806,7 @@
           <a:p>
             <a:fld id="{E71A4870-E222-4CD6-881F-7AD8134D3EF7}" type="datetimeFigureOut">
               <a:rPr lang="en-US" smtClean="0"/>
-              <a:t>10/14/2021</a:t>
+              <a:t>10/19/2021</a:t>
             </a:fld>
             <a:endParaRPr lang="en-US"/>
           </a:p>
@@ -4381,13 +4520,13 @@
   <p:clrMapOvr>
     <a:masterClrMapping/>
   </p:clrMapOvr>
-  <mc:AlternateContent xmlns:mc="http://schemas.openxmlformats.org/markup-compatibility/2006">
-    <mc:Choice xmlns:p14="http://schemas.microsoft.com/office/powerpoint/2010/main" Requires="p14">
+  <mc:AlternateContent xmlns:mc="http://schemas.openxmlformats.org/markup-compatibility/2006" xmlns:p14="http://schemas.microsoft.com/office/powerpoint/2010/main">
+    <mc:Choice Requires="p14">
       <p:transition p14:dur="300">
         <p:fade/>
       </p:transition>
     </mc:Choice>
-    <mc:Fallback>
+    <mc:Fallback xmlns="">
       <p:transition>
         <p:fade/>
       </p:transition>
@@ -4767,13 +4906,13 @@
   <p:clrMapOvr>
     <a:masterClrMapping/>
   </p:clrMapOvr>
-  <mc:AlternateContent xmlns:mc="http://schemas.openxmlformats.org/markup-compatibility/2006">
-    <mc:Choice xmlns:p14="http://schemas.microsoft.com/office/powerpoint/2010/main" Requires="p14">
+  <mc:AlternateContent xmlns:mc="http://schemas.openxmlformats.org/markup-compatibility/2006" xmlns:p14="http://schemas.microsoft.com/office/powerpoint/2010/main">
+    <mc:Choice Requires="p14">
       <p:transition p14:dur="300">
         <p:fade/>
       </p:transition>
     </mc:Choice>
-    <mc:Fallback>
+    <mc:Fallback xmlns="">
       <p:transition>
         <p:fade/>
       </p:transition>
@@ -5354,13 +5493,13 @@
   <p:clrMapOvr>
     <a:masterClrMapping/>
   </p:clrMapOvr>
-  <mc:AlternateContent xmlns:mc="http://schemas.openxmlformats.org/markup-compatibility/2006">
-    <mc:Choice xmlns:p14="http://schemas.microsoft.com/office/powerpoint/2010/main" Requires="p14">
+  <mc:AlternateContent xmlns:mc="http://schemas.openxmlformats.org/markup-compatibility/2006" xmlns:p14="http://schemas.microsoft.com/office/powerpoint/2010/main">
+    <mc:Choice Requires="p14">
       <p:transition p14:dur="300">
         <p:fade/>
       </p:transition>
     </mc:Choice>
-    <mc:Fallback>
+    <mc:Fallback xmlns="">
       <p:transition>
         <p:fade/>
       </p:transition>
@@ -5514,6 +5653,452 @@
 </file>
 
 <file path=ppt/slides/slide4.xml><?xml version="1.0" encoding="utf-8"?>
+<p:sld xmlns:a="http://schemas.openxmlformats.org/drawingml/2006/main" xmlns:r="http://schemas.openxmlformats.org/officeDocument/2006/relationships" xmlns:p="http://schemas.openxmlformats.org/presentationml/2006/main">
+  <p:cSld>
+    <p:spTree>
+      <p:nvGrpSpPr>
+        <p:cNvPr id="1" name=""/>
+        <p:cNvGrpSpPr/>
+        <p:nvPr/>
+      </p:nvGrpSpPr>
+      <p:grpSpPr>
+        <a:xfrm>
+          <a:off x="0" y="0"/>
+          <a:ext cx="0" cy="0"/>
+          <a:chOff x="0" y="0"/>
+          <a:chExt cx="0" cy="0"/>
+        </a:xfrm>
+      </p:grpSpPr>
+      <p:sp>
+        <p:nvSpPr>
+          <p:cNvPr id="3" name="Content Placeholder 2">
+            <a:extLst>
+              <a:ext uri="{FF2B5EF4-FFF2-40B4-BE49-F238E27FC236}">
+                <a16:creationId xmlns:a16="http://schemas.microsoft.com/office/drawing/2014/main" id="{4315D616-9DDA-4510-B093-DA562AA5C0A7}"/>
+              </a:ext>
+            </a:extLst>
+          </p:cNvPr>
+          <p:cNvSpPr>
+            <a:spLocks noGrp="1"/>
+          </p:cNvSpPr>
+          <p:nvPr>
+            <p:ph idx="1"/>
+          </p:nvPr>
+        </p:nvSpPr>
+        <p:spPr>
+          <a:xfrm>
+            <a:off x="838200" y="1825624"/>
+            <a:ext cx="4089400" cy="4787609"/>
+          </a:xfrm>
+        </p:spPr>
+        <p:txBody>
+          <a:bodyPr>
+            <a:normAutofit/>
+          </a:bodyPr>
+          <a:lstStyle/>
+          <a:p>
+            <a:r>
+              <a:rPr lang="en-US" dirty="0"/>
+              <a:t>I propose building a tool to show groups progress and a model to predict success.</a:t>
+            </a:r>
+          </a:p>
+          <a:p>
+            <a:endParaRPr lang="en-US" dirty="0"/>
+          </a:p>
+          <a:p>
+            <a:r>
+              <a:rPr lang="en-US" dirty="0"/>
+              <a:t>Understanding of progression, comparison to others, chance of success</a:t>
+            </a:r>
+          </a:p>
+          <a:p>
+            <a:endParaRPr lang="en-US" dirty="0"/>
+          </a:p>
+          <a:p>
+            <a:endParaRPr lang="en-US" dirty="0"/>
+          </a:p>
+        </p:txBody>
+      </p:sp>
+      <p:sp>
+        <p:nvSpPr>
+          <p:cNvPr id="6" name="Content Placeholder 2">
+            <a:extLst>
+              <a:ext uri="{FF2B5EF4-FFF2-40B4-BE49-F238E27FC236}">
+                <a16:creationId xmlns:a16="http://schemas.microsoft.com/office/drawing/2014/main" id="{E43796A1-C9AE-46E2-915D-D2A6BB87E09E}"/>
+              </a:ext>
+            </a:extLst>
+          </p:cNvPr>
+          <p:cNvSpPr txBox="1">
+            <a:spLocks/>
+          </p:cNvSpPr>
+          <p:nvPr/>
+        </p:nvSpPr>
+        <p:spPr>
+          <a:xfrm>
+            <a:off x="143426" y="6213805"/>
+            <a:ext cx="2754086" cy="558140"/>
+          </a:xfrm>
+          <a:prstGeom prst="rect">
+            <a:avLst/>
+          </a:prstGeom>
+        </p:spPr>
+        <p:txBody>
+          <a:bodyPr vert="horz" lIns="91440" tIns="45720" rIns="91440" bIns="45720" rtlCol="0">
+            <a:normAutofit/>
+          </a:bodyPr>
+          <a:lstStyle>
+            <a:lvl1pPr marL="228600" indent="-228600" algn="l" defTabSz="914400" rtl="0" eaLnBrk="1" latinLnBrk="0" hangingPunct="1">
+              <a:lnSpc>
+                <a:spcPct val="90000"/>
+              </a:lnSpc>
+              <a:spcBef>
+                <a:spcPts val="1000"/>
+              </a:spcBef>
+              <a:buFont typeface="Arial" panose="020B0604020202020204" pitchFamily="34" charset="0"/>
+              <a:buChar char="•"/>
+              <a:defRPr sz="2800" kern="1200">
+                <a:solidFill>
+                  <a:schemeClr val="tx1"/>
+                </a:solidFill>
+                <a:latin typeface="+mn-lt"/>
+                <a:ea typeface="+mn-ea"/>
+                <a:cs typeface="+mn-cs"/>
+              </a:defRPr>
+            </a:lvl1pPr>
+            <a:lvl2pPr marL="685800" indent="-228600" algn="l" defTabSz="914400" rtl="0" eaLnBrk="1" latinLnBrk="0" hangingPunct="1">
+              <a:lnSpc>
+                <a:spcPct val="90000"/>
+              </a:lnSpc>
+              <a:spcBef>
+                <a:spcPts val="500"/>
+              </a:spcBef>
+              <a:buFont typeface="Arial" panose="020B0604020202020204" pitchFamily="34" charset="0"/>
+              <a:buChar char="•"/>
+              <a:defRPr sz="2400" kern="1200">
+                <a:solidFill>
+                  <a:schemeClr val="tx1"/>
+                </a:solidFill>
+                <a:latin typeface="+mn-lt"/>
+                <a:ea typeface="+mn-ea"/>
+                <a:cs typeface="+mn-cs"/>
+              </a:defRPr>
+            </a:lvl2pPr>
+            <a:lvl3pPr marL="1143000" indent="-228600" algn="l" defTabSz="914400" rtl="0" eaLnBrk="1" latinLnBrk="0" hangingPunct="1">
+              <a:lnSpc>
+                <a:spcPct val="90000"/>
+              </a:lnSpc>
+              <a:spcBef>
+                <a:spcPts val="500"/>
+              </a:spcBef>
+              <a:buFont typeface="Arial" panose="020B0604020202020204" pitchFamily="34" charset="0"/>
+              <a:buChar char="•"/>
+              <a:defRPr sz="2000" kern="1200">
+                <a:solidFill>
+                  <a:schemeClr val="tx1"/>
+                </a:solidFill>
+                <a:latin typeface="+mn-lt"/>
+                <a:ea typeface="+mn-ea"/>
+                <a:cs typeface="+mn-cs"/>
+              </a:defRPr>
+            </a:lvl3pPr>
+            <a:lvl4pPr marL="1600200" indent="-228600" algn="l" defTabSz="914400" rtl="0" eaLnBrk="1" latinLnBrk="0" hangingPunct="1">
+              <a:lnSpc>
+                <a:spcPct val="90000"/>
+              </a:lnSpc>
+              <a:spcBef>
+                <a:spcPts val="500"/>
+              </a:spcBef>
+              <a:buFont typeface="Arial" panose="020B0604020202020204" pitchFamily="34" charset="0"/>
+              <a:buChar char="•"/>
+              <a:defRPr sz="1800" kern="1200">
+                <a:solidFill>
+                  <a:schemeClr val="tx1"/>
+                </a:solidFill>
+                <a:latin typeface="+mn-lt"/>
+                <a:ea typeface="+mn-ea"/>
+                <a:cs typeface="+mn-cs"/>
+              </a:defRPr>
+            </a:lvl4pPr>
+            <a:lvl5pPr marL="2057400" indent="-228600" algn="l" defTabSz="914400" rtl="0" eaLnBrk="1" latinLnBrk="0" hangingPunct="1">
+              <a:lnSpc>
+                <a:spcPct val="90000"/>
+              </a:lnSpc>
+              <a:spcBef>
+                <a:spcPts val="500"/>
+              </a:spcBef>
+              <a:buFont typeface="Arial" panose="020B0604020202020204" pitchFamily="34" charset="0"/>
+              <a:buChar char="•"/>
+              <a:defRPr sz="1800" kern="1200">
+                <a:solidFill>
+                  <a:schemeClr val="tx1"/>
+                </a:solidFill>
+                <a:latin typeface="+mn-lt"/>
+                <a:ea typeface="+mn-ea"/>
+                <a:cs typeface="+mn-cs"/>
+              </a:defRPr>
+            </a:lvl5pPr>
+            <a:lvl6pPr marL="2514600" indent="-228600" algn="l" defTabSz="914400" rtl="0" eaLnBrk="1" latinLnBrk="0" hangingPunct="1">
+              <a:lnSpc>
+                <a:spcPct val="90000"/>
+              </a:lnSpc>
+              <a:spcBef>
+                <a:spcPts val="500"/>
+              </a:spcBef>
+              <a:buFont typeface="Arial" panose="020B0604020202020204" pitchFamily="34" charset="0"/>
+              <a:buChar char="•"/>
+              <a:defRPr sz="1800" kern="1200">
+                <a:solidFill>
+                  <a:schemeClr val="tx1"/>
+                </a:solidFill>
+                <a:latin typeface="+mn-lt"/>
+                <a:ea typeface="+mn-ea"/>
+                <a:cs typeface="+mn-cs"/>
+              </a:defRPr>
+            </a:lvl6pPr>
+            <a:lvl7pPr marL="2971800" indent="-228600" algn="l" defTabSz="914400" rtl="0" eaLnBrk="1" latinLnBrk="0" hangingPunct="1">
+              <a:lnSpc>
+                <a:spcPct val="90000"/>
+              </a:lnSpc>
+              <a:spcBef>
+                <a:spcPts val="500"/>
+              </a:spcBef>
+              <a:buFont typeface="Arial" panose="020B0604020202020204" pitchFamily="34" charset="0"/>
+              <a:buChar char="•"/>
+              <a:defRPr sz="1800" kern="1200">
+                <a:solidFill>
+                  <a:schemeClr val="tx1"/>
+                </a:solidFill>
+                <a:latin typeface="+mn-lt"/>
+                <a:ea typeface="+mn-ea"/>
+                <a:cs typeface="+mn-cs"/>
+              </a:defRPr>
+            </a:lvl7pPr>
+            <a:lvl8pPr marL="3429000" indent="-228600" algn="l" defTabSz="914400" rtl="0" eaLnBrk="1" latinLnBrk="0" hangingPunct="1">
+              <a:lnSpc>
+                <a:spcPct val="90000"/>
+              </a:lnSpc>
+              <a:spcBef>
+                <a:spcPts val="500"/>
+              </a:spcBef>
+              <a:buFont typeface="Arial" panose="020B0604020202020204" pitchFamily="34" charset="0"/>
+              <a:buChar char="•"/>
+              <a:defRPr sz="1800" kern="1200">
+                <a:solidFill>
+                  <a:schemeClr val="tx1"/>
+                </a:solidFill>
+                <a:latin typeface="+mn-lt"/>
+                <a:ea typeface="+mn-ea"/>
+                <a:cs typeface="+mn-cs"/>
+              </a:defRPr>
+            </a:lvl8pPr>
+            <a:lvl9pPr marL="3886200" indent="-228600" algn="l" defTabSz="914400" rtl="0" eaLnBrk="1" latinLnBrk="0" hangingPunct="1">
+              <a:lnSpc>
+                <a:spcPct val="90000"/>
+              </a:lnSpc>
+              <a:spcBef>
+                <a:spcPts val="500"/>
+              </a:spcBef>
+              <a:buFont typeface="Arial" panose="020B0604020202020204" pitchFamily="34" charset="0"/>
+              <a:buChar char="•"/>
+              <a:defRPr sz="1800" kern="1200">
+                <a:solidFill>
+                  <a:schemeClr val="tx1"/>
+                </a:solidFill>
+                <a:latin typeface="+mn-lt"/>
+                <a:ea typeface="+mn-ea"/>
+                <a:cs typeface="+mn-cs"/>
+              </a:defRPr>
+            </a:lvl9pPr>
+          </a:lstStyle>
+          <a:p>
+            <a:pPr marL="0" indent="0">
+              <a:buFont typeface="Arial" panose="020B0604020202020204" pitchFamily="34" charset="0"/>
+              <a:buNone/>
+            </a:pPr>
+            <a:r>
+              <a:rPr lang="en-US" dirty="0"/>
+              <a:t>Garrick Bruening</a:t>
+            </a:r>
+          </a:p>
+        </p:txBody>
+      </p:sp>
+      <p:sp>
+        <p:nvSpPr>
+          <p:cNvPr id="9" name="Title 1">
+            <a:extLst>
+              <a:ext uri="{FF2B5EF4-FFF2-40B4-BE49-F238E27FC236}">
+                <a16:creationId xmlns:a16="http://schemas.microsoft.com/office/drawing/2014/main" id="{D60E9456-68EC-4D08-A3F0-4C53FE42D51B}"/>
+              </a:ext>
+            </a:extLst>
+          </p:cNvPr>
+          <p:cNvSpPr txBox="1">
+            <a:spLocks/>
+          </p:cNvSpPr>
+          <p:nvPr/>
+        </p:nvSpPr>
+        <p:spPr>
+          <a:xfrm>
+            <a:off x="468365" y="244766"/>
+            <a:ext cx="9766768" cy="1860659"/>
+          </a:xfrm>
+          <a:prstGeom prst="rect">
+            <a:avLst/>
+          </a:prstGeom>
+        </p:spPr>
+        <p:txBody>
+          <a:bodyPr vert="horz" lIns="91440" tIns="45720" rIns="91440" bIns="45720" rtlCol="0" anchor="t">
+            <a:normAutofit/>
+          </a:bodyPr>
+          <a:lstStyle>
+            <a:lvl1pPr algn="ctr" defTabSz="914400" rtl="0" eaLnBrk="1" latinLnBrk="0" hangingPunct="1">
+              <a:lnSpc>
+                <a:spcPct val="90000"/>
+              </a:lnSpc>
+              <a:spcBef>
+                <a:spcPct val="0"/>
+              </a:spcBef>
+              <a:buNone/>
+              <a:defRPr sz="6000" kern="1200">
+                <a:solidFill>
+                  <a:schemeClr val="tx1"/>
+                </a:solidFill>
+                <a:latin typeface="+mj-lt"/>
+                <a:ea typeface="+mj-ea"/>
+                <a:cs typeface="+mj-cs"/>
+              </a:defRPr>
+            </a:lvl1pPr>
+          </a:lstStyle>
+          <a:p>
+            <a:pPr algn="l"/>
+            <a:r>
+              <a:rPr lang="en-US" sz="4000" dirty="0">
+                <a:solidFill>
+                  <a:srgbClr val="FFCC00"/>
+                </a:solidFill>
+                <a:latin typeface="+mn-lt"/>
+              </a:rPr>
+              <a:t>Providing insights into group progression in world of warcraft.</a:t>
+            </a:r>
+          </a:p>
+        </p:txBody>
+      </p:sp>
+    </p:spTree>
+    <p:extLst>
+      <p:ext uri="{BB962C8B-B14F-4D97-AF65-F5344CB8AC3E}">
+        <p14:creationId xmlns:p14="http://schemas.microsoft.com/office/powerpoint/2010/main" val="2891816837"/>
+      </p:ext>
+    </p:extLst>
+  </p:cSld>
+  <p:clrMapOvr>
+    <a:masterClrMapping/>
+  </p:clrMapOvr>
+  <mc:AlternateContent xmlns:mc="http://schemas.openxmlformats.org/markup-compatibility/2006" xmlns:p14="http://schemas.microsoft.com/office/powerpoint/2010/main">
+    <mc:Choice Requires="p14">
+      <p:transition p14:dur="300">
+        <p:fade/>
+      </p:transition>
+    </mc:Choice>
+    <mc:Fallback xmlns="">
+      <p:transition>
+        <p:fade/>
+      </p:transition>
+    </mc:Fallback>
+  </mc:AlternateContent>
+  <p:timing>
+    <p:tnLst>
+      <p:par>
+        <p:cTn id="1" dur="indefinite" restart="never" nodeType="tmRoot">
+          <p:childTnLst>
+            <p:seq concurrent="1" nextAc="seek">
+              <p:cTn id="2" dur="indefinite" nodeType="mainSeq">
+                <p:childTnLst>
+                  <p:par>
+                    <p:cTn id="3" fill="hold">
+                      <p:stCondLst>
+                        <p:cond delay="indefinite"/>
+                      </p:stCondLst>
+                      <p:childTnLst>
+                        <p:par>
+                          <p:cTn id="4" fill="hold">
+                            <p:stCondLst>
+                              <p:cond delay="0"/>
+                            </p:stCondLst>
+                            <p:childTnLst>
+                              <p:par>
+                                <p:cTn id="5" presetID="10" presetClass="entr" presetSubtype="0" fill="hold" nodeType="clickEffect">
+                                  <p:stCondLst>
+                                    <p:cond delay="0"/>
+                                  </p:stCondLst>
+                                  <p:childTnLst>
+                                    <p:set>
+                                      <p:cBhvr>
+                                        <p:cTn id="6" dur="1" fill="hold">
+                                          <p:stCondLst>
+                                            <p:cond delay="0"/>
+                                          </p:stCondLst>
+                                        </p:cTn>
+                                        <p:tgtEl>
+                                          <p:spTgt spid="3">
+                                            <p:txEl>
+                                              <p:pRg st="2" end="2"/>
+                                            </p:txEl>
+                                          </p:spTgt>
+                                        </p:tgtEl>
+                                        <p:attrNameLst>
+                                          <p:attrName>style.visibility</p:attrName>
+                                        </p:attrNameLst>
+                                      </p:cBhvr>
+                                      <p:to>
+                                        <p:strVal val="visible"/>
+                                      </p:to>
+                                    </p:set>
+                                    <p:animEffect transition="in" filter="fade">
+                                      <p:cBhvr>
+                                        <p:cTn id="7" dur="500"/>
+                                        <p:tgtEl>
+                                          <p:spTgt spid="3">
+                                            <p:txEl>
+                                              <p:pRg st="2" end="2"/>
+                                            </p:txEl>
+                                          </p:spTgt>
+                                        </p:tgtEl>
+                                      </p:cBhvr>
+                                    </p:animEffect>
+                                  </p:childTnLst>
+                                </p:cTn>
+                              </p:par>
+                            </p:childTnLst>
+                          </p:cTn>
+                        </p:par>
+                      </p:childTnLst>
+                    </p:cTn>
+                  </p:par>
+                </p:childTnLst>
+              </p:cTn>
+              <p:prevCondLst>
+                <p:cond evt="onPrev" delay="0">
+                  <p:tgtEl>
+                    <p:sldTgt/>
+                  </p:tgtEl>
+                </p:cond>
+              </p:prevCondLst>
+              <p:nextCondLst>
+                <p:cond evt="onNext" delay="0">
+                  <p:tgtEl>
+                    <p:sldTgt/>
+                  </p:tgtEl>
+                </p:cond>
+              </p:nextCondLst>
+            </p:seq>
+          </p:childTnLst>
+        </p:cTn>
+      </p:par>
+    </p:tnLst>
+  </p:timing>
+</p:sld>
+</file>
+
+<file path=ppt/slides/slide5.xml><?xml version="1.0" encoding="utf-8"?>
 <p:sld xmlns:a="http://schemas.openxmlformats.org/drawingml/2006/main" xmlns:r="http://schemas.openxmlformats.org/officeDocument/2006/relationships" xmlns:p="http://schemas.openxmlformats.org/presentationml/2006/main" show="0">
   <p:cSld>
     <p:spTree>
@@ -6275,13 +6860,13 @@
   <p:clrMapOvr>
     <a:masterClrMapping/>
   </p:clrMapOvr>
-  <mc:AlternateContent xmlns:mc="http://schemas.openxmlformats.org/markup-compatibility/2006">
-    <mc:Choice xmlns:p14="http://schemas.microsoft.com/office/powerpoint/2010/main" Requires="p14">
+  <mc:AlternateContent xmlns:mc="http://schemas.openxmlformats.org/markup-compatibility/2006" xmlns:p14="http://schemas.microsoft.com/office/powerpoint/2010/main">
+    <mc:Choice Requires="p14">
       <p:transition p14:dur="300">
         <p:fade/>
       </p:transition>
     </mc:Choice>
-    <mc:Fallback>
+    <mc:Fallback xmlns="">
       <p:transition>
         <p:fade/>
       </p:transition>
@@ -6434,7 +7019,7 @@
 </p:sld>
 </file>
 
-<file path=ppt/slides/slide5.xml><?xml version="1.0" encoding="utf-8"?>
+<file path=ppt/slides/slide6.xml><?xml version="1.0" encoding="utf-8"?>
 <p:sld xmlns:a="http://schemas.openxmlformats.org/drawingml/2006/main" xmlns:r="http://schemas.openxmlformats.org/officeDocument/2006/relationships" xmlns:p="http://schemas.openxmlformats.org/presentationml/2006/main">
   <p:cSld>
     <p:spTree>
@@ -6970,13 +7555,13 @@
   <p:clrMapOvr>
     <a:masterClrMapping/>
   </p:clrMapOvr>
-  <mc:AlternateContent xmlns:mc="http://schemas.openxmlformats.org/markup-compatibility/2006">
-    <mc:Choice xmlns:p14="http://schemas.microsoft.com/office/powerpoint/2010/main" Requires="p14">
+  <mc:AlternateContent xmlns:mc="http://schemas.openxmlformats.org/markup-compatibility/2006" xmlns:p14="http://schemas.microsoft.com/office/powerpoint/2010/main">
+    <mc:Choice Requires="p14">
       <p:transition p14:dur="300">
         <p:fade/>
       </p:transition>
     </mc:Choice>
-    <mc:Fallback>
+    <mc:Fallback xmlns="">
       <p:transition>
         <p:fade/>
       </p:transition>
@@ -7068,7 +7653,7 @@
 </p:sld>
 </file>
 
-<file path=ppt/slides/slide6.xml><?xml version="1.0" encoding="utf-8"?>
+<file path=ppt/slides/slide7.xml><?xml version="1.0" encoding="utf-8"?>
 <p:sld xmlns:a="http://schemas.openxmlformats.org/drawingml/2006/main" xmlns:r="http://schemas.openxmlformats.org/officeDocument/2006/relationships" xmlns:p="http://schemas.openxmlformats.org/presentationml/2006/main">
   <p:cSld>
     <p:spTree>
@@ -7639,13 +8224,13 @@
   <p:clrMapOvr>
     <a:masterClrMapping/>
   </p:clrMapOvr>
-  <mc:AlternateContent xmlns:mc="http://schemas.openxmlformats.org/markup-compatibility/2006">
-    <mc:Choice xmlns:p14="http://schemas.microsoft.com/office/powerpoint/2010/main" Requires="p14">
+  <mc:AlternateContent xmlns:mc="http://schemas.openxmlformats.org/markup-compatibility/2006" xmlns:p14="http://schemas.microsoft.com/office/powerpoint/2010/main">
+    <mc:Choice Requires="p14">
       <p:transition p14:dur="300">
         <p:fade/>
       </p:transition>
     </mc:Choice>
-    <mc:Fallback>
+    <mc:Fallback xmlns="">
       <p:transition>
         <p:fade/>
       </p:transition>
@@ -7745,7 +8330,7 @@
 </p:sld>
 </file>
 
-<file path=ppt/slides/slide7.xml><?xml version="1.0" encoding="utf-8"?>
+<file path=ppt/slides/slide8.xml><?xml version="1.0" encoding="utf-8"?>
 <p:sld xmlns:a="http://schemas.openxmlformats.org/drawingml/2006/main" xmlns:r="http://schemas.openxmlformats.org/officeDocument/2006/relationships" xmlns:p="http://schemas.openxmlformats.org/presentationml/2006/main">
   <p:cSld>
     <p:spTree>
@@ -8663,13 +9248,13 @@
   <p:clrMapOvr>
     <a:masterClrMapping/>
   </p:clrMapOvr>
-  <mc:AlternateContent xmlns:mc="http://schemas.openxmlformats.org/markup-compatibility/2006">
-    <mc:Choice xmlns:p14="http://schemas.microsoft.com/office/powerpoint/2010/main" Requires="p14">
+  <mc:AlternateContent xmlns:mc="http://schemas.openxmlformats.org/markup-compatibility/2006" xmlns:p14="http://schemas.microsoft.com/office/powerpoint/2010/main">
+    <mc:Choice Requires="p14">
       <p:transition p14:dur="300">
         <p:fade/>
       </p:transition>
     </mc:Choice>
-    <mc:Fallback>
+    <mc:Fallback xmlns="">
       <p:transition>
         <p:fade/>
       </p:transition>

</xml_diff>